<commit_message>
Update exercises with Nina's comments
</commit_message>
<xml_diff>
--- a/docs/slides/6_Exercise.pptx
+++ b/docs/slides/6_Exercise.pptx
@@ -6664,19 +6664,19 @@
             </a:r>
             <a:r>
               <a:rPr lang="fr-CA" dirty="0" smtClean="0"/>
+              <a:t> on one of the 8 </a:t>
+            </a:r>
+            <a:r>
+              <a:rPr lang="fr-CA" dirty="0" err="1" smtClean="0"/>
+              <a:t>neighboring</a:t>
+            </a:r>
+            <a:r>
+              <a:rPr lang="fr-CA" dirty="0" smtClean="0"/>
               <a:t> </a:t>
             </a:r>
             <a:r>
-              <a:rPr lang="fr-CA" dirty="0" smtClean="0"/>
-              <a:t>on one </a:t>
-            </a:r>
-            <a:r>
-              <a:rPr lang="fr-CA" dirty="0" smtClean="0"/>
-              <a:t>of the 8 </a:t>
-            </a:r>
-            <a:r>
-              <a:rPr lang="fr-CA" dirty="0" err="1" smtClean="0"/>
-              <a:t>neighboring</a:t>
+              <a:rPr lang="fr-CA" dirty="0" err="1" smtClean="0"/>
+              <a:t>cells</a:t>
             </a:r>
             <a:r>
               <a:rPr lang="fr-CA" dirty="0" smtClean="0"/>
@@ -6684,6 +6684,22 @@
             </a:r>
             <a:r>
               <a:rPr lang="fr-CA" dirty="0" err="1" smtClean="0"/>
+              <a:t>randomly</a:t>
+            </a:r>
+            <a:endParaRPr lang="fr-CA" dirty="0" smtClean="0"/>
+          </a:p>
+          <a:p>
+            <a:pPr lvl="3"/>
+            <a:r>
+              <a:rPr lang="fr-CA" dirty="0" err="1" smtClean="0"/>
+              <a:t>What</a:t>
+            </a:r>
+            <a:r>
+              <a:rPr lang="fr-CA" dirty="0" smtClean="0"/>
+              <a:t> are the </a:t>
+            </a:r>
+            <a:r>
+              <a:rPr lang="fr-CA" dirty="0" err="1" smtClean="0"/>
               <a:t>cells</a:t>
             </a:r>
             <a:r>
@@ -6692,19 +6708,34 @@
             </a:r>
             <a:r>
               <a:rPr lang="fr-CA" dirty="0" err="1" smtClean="0"/>
-              <a:t>randomly</a:t>
-            </a:r>
-            <a:endParaRPr lang="fr-CA" dirty="0" smtClean="0"/>
+              <a:t>around</a:t>
+            </a:r>
+            <a:r>
+              <a:rPr lang="fr-CA" dirty="0" smtClean="0"/>
+              <a:t> the </a:t>
+            </a:r>
+            <a:r>
+              <a:rPr lang="fr-CA" dirty="0" err="1" smtClean="0"/>
+              <a:t>individuals</a:t>
+            </a:r>
+            <a:r>
+              <a:rPr lang="fr-CA" dirty="0" smtClean="0"/>
+              <a:t>?</a:t>
+            </a:r>
           </a:p>
           <a:p>
             <a:pPr lvl="3"/>
             <a:r>
-              <a:rPr lang="fr-CA" dirty="0" err="1" smtClean="0"/>
-              <a:t>What</a:t>
-            </a:r>
-            <a:r>
-              <a:rPr lang="fr-CA" dirty="0" smtClean="0"/>
-              <a:t> are the </a:t>
+              <a:rPr lang="fr-CA" dirty="0" smtClean="0"/>
+              <a:t>On </a:t>
+            </a:r>
+            <a:r>
+              <a:rPr lang="fr-CA" dirty="0" err="1" smtClean="0"/>
+              <a:t>which</a:t>
+            </a:r>
+            <a:r>
+              <a:rPr lang="fr-CA" dirty="0" smtClean="0"/>
+              <a:t> </a:t>
             </a:r>
             <a:r>
               <a:rPr lang="fr-CA" dirty="0" err="1" smtClean="0"/>
@@ -6716,61 +6747,20 @@
             </a:r>
             <a:r>
               <a:rPr lang="fr-CA" dirty="0" err="1" smtClean="0"/>
-              <a:t>around</a:t>
-            </a:r>
-            <a:r>
-              <a:rPr lang="fr-CA" dirty="0" smtClean="0"/>
-              <a:t> the </a:t>
-            </a:r>
-            <a:r>
-              <a:rPr lang="fr-CA" dirty="0" err="1" smtClean="0"/>
-              <a:t>individuals</a:t>
+              <a:t>there</a:t>
+            </a:r>
+            <a:r>
+              <a:rPr lang="fr-CA" dirty="0" smtClean="0"/>
+              <a:t> are </a:t>
+            </a:r>
+            <a:r>
+              <a:rPr lang="fr-CA" dirty="0" err="1" smtClean="0"/>
+              <a:t>females</a:t>
             </a:r>
             <a:r>
               <a:rPr lang="fr-CA" dirty="0" smtClean="0"/>
               <a:t>?</a:t>
             </a:r>
-            <a:endParaRPr lang="fr-CA" dirty="0" smtClean="0"/>
-          </a:p>
-          <a:p>
-            <a:pPr lvl="3"/>
-            <a:r>
-              <a:rPr lang="fr-CA" dirty="0" smtClean="0"/>
-              <a:t>On </a:t>
-            </a:r>
-            <a:r>
-              <a:rPr lang="fr-CA" dirty="0" err="1" smtClean="0"/>
-              <a:t>which</a:t>
-            </a:r>
-            <a:r>
-              <a:rPr lang="fr-CA" dirty="0" smtClean="0"/>
-              <a:t> </a:t>
-            </a:r>
-            <a:r>
-              <a:rPr lang="fr-CA" dirty="0" err="1" smtClean="0"/>
-              <a:t>cells</a:t>
-            </a:r>
-            <a:r>
-              <a:rPr lang="fr-CA" dirty="0" smtClean="0"/>
-              <a:t> </a:t>
-            </a:r>
-            <a:r>
-              <a:rPr lang="fr-CA" dirty="0" err="1" smtClean="0"/>
-              <a:t>there</a:t>
-            </a:r>
-            <a:r>
-              <a:rPr lang="fr-CA" dirty="0" smtClean="0"/>
-              <a:t> are </a:t>
-            </a:r>
-            <a:r>
-              <a:rPr lang="fr-CA" dirty="0" err="1" smtClean="0"/>
-              <a:t>females</a:t>
-            </a:r>
-            <a:r>
-              <a:rPr lang="fr-CA" dirty="0" smtClean="0"/>
-              <a:t>?</a:t>
-            </a:r>
-            <a:endParaRPr lang="fr-CA" dirty="0" smtClean="0"/>
           </a:p>
           <a:p>
             <a:pPr lvl="4"/>
@@ -7069,8 +7059,8 @@
         </p:nvSpPr>
         <p:spPr>
           <a:xfrm>
-            <a:off x="7651975" y="6233612"/>
-            <a:ext cx="4540025" cy="646331"/>
+            <a:off x="6018387" y="6233612"/>
+            <a:ext cx="6173613" cy="646331"/>
           </a:xfrm>
           <a:prstGeom prst="rect">
             <a:avLst/>
@@ -7101,8 +7091,13 @@
             </a:r>
             <a:r>
               <a:rPr lang="fr-CA" dirty="0" smtClean="0"/>
-              <a:t>: 10_ExerciseToDo.R</a:t>
-            </a:r>
+              <a:t>: </a:t>
+            </a:r>
+            <a:r>
+              <a:rPr lang="fr-CA" dirty="0" smtClean="0"/>
+              <a:t>10_ExerciseToDo.R. Help at the end</a:t>
+            </a:r>
+            <a:endParaRPr lang="fr-CA" dirty="0" smtClean="0"/>
           </a:p>
           <a:p>
             <a:pPr algn="r"/>
@@ -7116,13 +7111,8 @@
             </a:r>
             <a:r>
               <a:rPr lang="fr-CA" dirty="0"/>
-              <a:t>solutions: </a:t>
-            </a:r>
-            <a:r>
-              <a:rPr lang="fr-CA" dirty="0"/>
-              <a:t>11_ExerciseSolutions.R</a:t>
-            </a:r>
-            <a:endParaRPr lang="fr-CA" dirty="0"/>
+              <a:t>solutions: 11_ExerciseSolutions.R</a:t>
+            </a:r>
           </a:p>
         </p:txBody>
       </p:sp>
@@ -7286,178 +7276,6 @@
                 </a:solidFill>
               </a:rPr>
               <a:t> help</a:t>
-            </a:r>
-            <a:endParaRPr lang="fr-CA" sz="2800" dirty="0">
-              <a:solidFill>
-                <a:srgbClr val="92D050"/>
-              </a:solidFill>
-            </a:endParaRPr>
-          </a:p>
-        </p:txBody>
-      </p:sp>
-      <p:sp>
-        <p:nvSpPr>
-          <p:cNvPr id="11" name="ZoneTexte 10"/>
-          <p:cNvSpPr txBox="1"/>
-          <p:nvPr/>
-        </p:nvSpPr>
-        <p:spPr>
-          <a:xfrm>
-            <a:off x="9200114" y="5016220"/>
-            <a:ext cx="1826141" cy="523220"/>
-          </a:xfrm>
-          <a:prstGeom prst="rect">
-            <a:avLst/>
-          </a:prstGeom>
-          <a:solidFill>
-            <a:schemeClr val="accent1">
-              <a:lumMod val="20000"/>
-              <a:lumOff val="80000"/>
-            </a:schemeClr>
-          </a:solidFill>
-        </p:spPr>
-        <p:txBody>
-          <a:bodyPr wrap="none" rtlCol="0">
-            <a:spAutoFit/>
-          </a:bodyPr>
-          <a:lstStyle/>
-          <a:p>
-            <a:r>
-              <a:rPr lang="fr-CA" sz="2800" dirty="0" smtClean="0">
-                <a:solidFill>
-                  <a:srgbClr val="92D050"/>
-                </a:solidFill>
-              </a:rPr>
-              <a:t>Use help()</a:t>
-            </a:r>
-            <a:endParaRPr lang="fr-CA" sz="2800" dirty="0">
-              <a:solidFill>
-                <a:srgbClr val="92D050"/>
-              </a:solidFill>
-            </a:endParaRPr>
-          </a:p>
-        </p:txBody>
-      </p:sp>
-      <p:sp>
-        <p:nvSpPr>
-          <p:cNvPr id="12" name="ZoneTexte 11"/>
-          <p:cNvSpPr txBox="1"/>
-          <p:nvPr/>
-        </p:nvSpPr>
-        <p:spPr>
-          <a:xfrm rot="21060396">
-            <a:off x="6450994" y="2643588"/>
-            <a:ext cx="1826141" cy="523220"/>
-          </a:xfrm>
-          <a:prstGeom prst="rect">
-            <a:avLst/>
-          </a:prstGeom>
-          <a:solidFill>
-            <a:schemeClr val="accent1">
-              <a:lumMod val="20000"/>
-              <a:lumOff val="80000"/>
-            </a:schemeClr>
-          </a:solidFill>
-        </p:spPr>
-        <p:txBody>
-          <a:bodyPr wrap="none" rtlCol="0">
-            <a:spAutoFit/>
-          </a:bodyPr>
-          <a:lstStyle/>
-          <a:p>
-            <a:r>
-              <a:rPr lang="fr-CA" sz="2800" dirty="0" smtClean="0">
-                <a:solidFill>
-                  <a:srgbClr val="92D050"/>
-                </a:solidFill>
-              </a:rPr>
-              <a:t>Use help()</a:t>
-            </a:r>
-            <a:endParaRPr lang="fr-CA" sz="2800" dirty="0">
-              <a:solidFill>
-                <a:srgbClr val="92D050"/>
-              </a:solidFill>
-            </a:endParaRPr>
-          </a:p>
-        </p:txBody>
-      </p:sp>
-      <p:sp>
-        <p:nvSpPr>
-          <p:cNvPr id="13" name="ZoneTexte 12"/>
-          <p:cNvSpPr txBox="1"/>
-          <p:nvPr/>
-        </p:nvSpPr>
-        <p:spPr>
-          <a:xfrm rot="714107">
-            <a:off x="9958778" y="2805618"/>
-            <a:ext cx="1596762" cy="954107"/>
-          </a:xfrm>
-          <a:prstGeom prst="rect">
-            <a:avLst/>
-          </a:prstGeom>
-          <a:solidFill>
-            <a:schemeClr val="accent1">
-              <a:lumMod val="20000"/>
-              <a:lumOff val="80000"/>
-            </a:schemeClr>
-          </a:solidFill>
-        </p:spPr>
-        <p:txBody>
-          <a:bodyPr wrap="square" rtlCol="0">
-            <a:spAutoFit/>
-          </a:bodyPr>
-          <a:lstStyle/>
-          <a:p>
-            <a:r>
-              <a:rPr lang="fr-CA" sz="2800" dirty="0" smtClean="0">
-                <a:solidFill>
-                  <a:srgbClr val="92D050"/>
-                </a:solidFill>
-              </a:rPr>
-              <a:t>Use help()</a:t>
-            </a:r>
-            <a:endParaRPr lang="fr-CA" sz="2800" dirty="0">
-              <a:solidFill>
-                <a:srgbClr val="92D050"/>
-              </a:solidFill>
-            </a:endParaRPr>
-          </a:p>
-        </p:txBody>
-      </p:sp>
-      <p:sp>
-        <p:nvSpPr>
-          <p:cNvPr id="14" name="ZoneTexte 13"/>
-          <p:cNvSpPr txBox="1"/>
-          <p:nvPr/>
-        </p:nvSpPr>
-        <p:spPr>
-          <a:xfrm rot="21033023">
-            <a:off x="181050" y="5303105"/>
-            <a:ext cx="1826141" cy="523220"/>
-          </a:xfrm>
-          <a:prstGeom prst="rect">
-            <a:avLst/>
-          </a:prstGeom>
-          <a:solidFill>
-            <a:schemeClr val="accent1">
-              <a:lumMod val="20000"/>
-              <a:lumOff val="80000"/>
-            </a:schemeClr>
-          </a:solidFill>
-        </p:spPr>
-        <p:txBody>
-          <a:bodyPr wrap="none" rtlCol="0">
-            <a:spAutoFit/>
-          </a:bodyPr>
-          <a:lstStyle/>
-          <a:p>
-            <a:r>
-              <a:rPr lang="fr-CA" sz="2800" dirty="0" smtClean="0">
-                <a:solidFill>
-                  <a:srgbClr val="92D050"/>
-                </a:solidFill>
-              </a:rPr>
-              <a:t>Use help()</a:t>
             </a:r>
             <a:endParaRPr lang="fr-CA" sz="2800" dirty="0">
               <a:solidFill>
@@ -7584,132 +7402,6 @@
                       </p:childTnLst>
                     </p:cTn>
                   </p:par>
-                  <p:par>
-                    <p:cTn id="11" fill="hold">
-                      <p:stCondLst>
-                        <p:cond delay="indefinite"/>
-                      </p:stCondLst>
-                      <p:childTnLst>
-                        <p:par>
-                          <p:cTn id="12" fill="hold">
-                            <p:stCondLst>
-                              <p:cond delay="0"/>
-                            </p:stCondLst>
-                            <p:childTnLst>
-                              <p:par>
-                                <p:cTn id="13" presetID="1" presetClass="entr" presetSubtype="0" fill="hold" grpId="0" nodeType="clickEffect">
-                                  <p:stCondLst>
-                                    <p:cond delay="0"/>
-                                  </p:stCondLst>
-                                  <p:childTnLst>
-                                    <p:set>
-                                      <p:cBhvr>
-                                        <p:cTn id="14" dur="1" fill="hold">
-                                          <p:stCondLst>
-                                            <p:cond delay="0"/>
-                                          </p:stCondLst>
-                                        </p:cTn>
-                                        <p:tgtEl>
-                                          <p:spTgt spid="11"/>
-                                        </p:tgtEl>
-                                        <p:attrNameLst>
-                                          <p:attrName>style.visibility</p:attrName>
-                                        </p:attrNameLst>
-                                      </p:cBhvr>
-                                      <p:to>
-                                        <p:strVal val="visible"/>
-                                      </p:to>
-                                    </p:set>
-                                  </p:childTnLst>
-                                </p:cTn>
-                              </p:par>
-                              <p:par>
-                                <p:cTn id="15" presetID="1" presetClass="entr" presetSubtype="0" fill="hold" grpId="0" nodeType="withEffect">
-                                  <p:stCondLst>
-                                    <p:cond delay="0"/>
-                                  </p:stCondLst>
-                                  <p:childTnLst>
-                                    <p:set>
-                                      <p:cBhvr>
-                                        <p:cTn id="16" dur="1" fill="hold">
-                                          <p:stCondLst>
-                                            <p:cond delay="0"/>
-                                          </p:stCondLst>
-                                        </p:cTn>
-                                        <p:tgtEl>
-                                          <p:spTgt spid="12"/>
-                                        </p:tgtEl>
-                                        <p:attrNameLst>
-                                          <p:attrName>style.visibility</p:attrName>
-                                        </p:attrNameLst>
-                                      </p:cBhvr>
-                                      <p:to>
-                                        <p:strVal val="visible"/>
-                                      </p:to>
-                                    </p:set>
-                                  </p:childTnLst>
-                                </p:cTn>
-                              </p:par>
-                              <p:par>
-                                <p:cTn id="17" presetID="1" presetClass="entr" presetSubtype="0" fill="hold" grpId="0" nodeType="withEffect">
-                                  <p:stCondLst>
-                                    <p:cond delay="0"/>
-                                  </p:stCondLst>
-                                  <p:childTnLst>
-                                    <p:set>
-                                      <p:cBhvr>
-                                        <p:cTn id="18" dur="1" fill="hold">
-                                          <p:stCondLst>
-                                            <p:cond delay="0"/>
-                                          </p:stCondLst>
-                                        </p:cTn>
-                                        <p:tgtEl>
-                                          <p:spTgt spid="13"/>
-                                        </p:tgtEl>
-                                        <p:attrNameLst>
-                                          <p:attrName>style.visibility</p:attrName>
-                                        </p:attrNameLst>
-                                      </p:cBhvr>
-                                      <p:to>
-                                        <p:strVal val="visible"/>
-                                      </p:to>
-                                    </p:set>
-                                  </p:childTnLst>
-                                </p:cTn>
-                              </p:par>
-                              <p:par>
-                                <p:cTn id="19" presetID="1" presetClass="entr" presetSubtype="0" fill="hold" grpId="0" nodeType="withEffect">
-                                  <p:stCondLst>
-                                    <p:cond delay="0"/>
-                                  </p:stCondLst>
-                                  <p:childTnLst>
-                                    <p:set>
-                                      <p:cBhvr>
-                                        <p:cTn id="20" dur="1" fill="hold">
-                                          <p:stCondLst>
-                                            <p:cond delay="0"/>
-                                          </p:stCondLst>
-                                        </p:cTn>
-                                        <p:tgtEl>
-                                          <p:spTgt spid="14"/>
-                                        </p:tgtEl>
-                                        <p:attrNameLst>
-                                          <p:attrName>style.visibility</p:attrName>
-                                        </p:attrNameLst>
-                                      </p:cBhvr>
-                                      <p:to>
-                                        <p:strVal val="visible"/>
-                                      </p:to>
-                                    </p:set>
-                                  </p:childTnLst>
-                                </p:cTn>
-                              </p:par>
-                            </p:childTnLst>
-                          </p:cTn>
-                        </p:par>
-                      </p:childTnLst>
-                    </p:cTn>
-                  </p:par>
                 </p:childTnLst>
               </p:cTn>
               <p:prevCondLst>
@@ -7735,10 +7427,6 @@
       <p:bldP spid="5" grpId="0" animBg="1"/>
       <p:bldP spid="6" grpId="0" animBg="1"/>
       <p:bldP spid="7" grpId="0" animBg="1"/>
-      <p:bldP spid="11" grpId="0" animBg="1"/>
-      <p:bldP spid="12" grpId="0" animBg="1"/>
-      <p:bldP spid="13" grpId="0" animBg="1"/>
-      <p:bldP spid="14" grpId="0" animBg="1"/>
     </p:bldLst>
   </p:timing>
 </p:sld>
@@ -8890,8 +8578,8 @@
         </p:nvSpPr>
         <p:spPr>
           <a:xfrm>
-            <a:off x="7651975" y="6233612"/>
-            <a:ext cx="4540025" cy="646331"/>
+            <a:off x="6018387" y="6233612"/>
+            <a:ext cx="6173613" cy="646331"/>
           </a:xfrm>
           <a:prstGeom prst="rect">
             <a:avLst/>
@@ -8922,7 +8610,11 @@
             </a:r>
             <a:r>
               <a:rPr lang="fr-CA" dirty="0"/>
-              <a:t>: 10_ExerciseToDo.R</a:t>
+              <a:t>: </a:t>
+            </a:r>
+            <a:r>
+              <a:rPr lang="fr-CA" dirty="0"/>
+              <a:t>10_ExerciseToDo.R. Help at the end</a:t>
             </a:r>
           </a:p>
           <a:p>
@@ -8937,13 +8629,8 @@
             </a:r>
             <a:r>
               <a:rPr lang="fr-CA" dirty="0"/>
-              <a:t>solutions: </a:t>
-            </a:r>
-            <a:r>
-              <a:rPr lang="fr-CA" dirty="0"/>
-              <a:t>11_ExerciseSolutions.R</a:t>
-            </a:r>
-            <a:endParaRPr lang="fr-CA" dirty="0"/>
+              <a:t>solutions: 11_ExerciseSolutions.R</a:t>
+            </a:r>
           </a:p>
         </p:txBody>
       </p:sp>
@@ -9618,11 +9305,7 @@
             </a:r>
             <a:r>
               <a:rPr lang="fr-CA" dirty="0" smtClean="0"/>
-              <a:t> </a:t>
-            </a:r>
-            <a:r>
-              <a:rPr lang="fr-CA" dirty="0" smtClean="0"/>
-              <a:t>all </a:t>
+              <a:t> all </a:t>
             </a:r>
             <a:r>
               <a:rPr lang="fr-CA" dirty="0" err="1" smtClean="0"/>
@@ -10040,8 +9723,8 @@
         </p:nvSpPr>
         <p:spPr>
           <a:xfrm>
-            <a:off x="7651975" y="6233612"/>
-            <a:ext cx="4540025" cy="646331"/>
+            <a:off x="6018387" y="6233612"/>
+            <a:ext cx="6173613" cy="646331"/>
           </a:xfrm>
           <a:prstGeom prst="rect">
             <a:avLst/>
@@ -10072,7 +9755,11 @@
             </a:r>
             <a:r>
               <a:rPr lang="fr-CA" dirty="0"/>
-              <a:t>: 10_ExerciseToDo.R</a:t>
+              <a:t>: </a:t>
+            </a:r>
+            <a:r>
+              <a:rPr lang="fr-CA" dirty="0"/>
+              <a:t>10_ExerciseToDo.R. Help at the end</a:t>
             </a:r>
           </a:p>
           <a:p>
@@ -10087,13 +9774,8 @@
             </a:r>
             <a:r>
               <a:rPr lang="fr-CA" dirty="0"/>
-              <a:t>solutions: </a:t>
-            </a:r>
-            <a:r>
-              <a:rPr lang="fr-CA" dirty="0"/>
-              <a:t>11_ExerciseSolutions.R</a:t>
-            </a:r>
-            <a:endParaRPr lang="fr-CA" dirty="0"/>
+              <a:t>solutions: 11_ExerciseSolutions.R</a:t>
+            </a:r>
           </a:p>
         </p:txBody>
       </p:sp>
@@ -10817,7 +10499,6 @@
               <a:rPr lang="fr-CA" dirty="0"/>
               <a:t> solutions: 11_ExerciseSolutions.R</a:t>
             </a:r>
-            <a:endParaRPr lang="fr-CA" dirty="0"/>
           </a:p>
         </p:txBody>
       </p:sp>

</xml_diff>

<commit_message>
Mise à jour du dernier exercice
</commit_message>
<xml_diff>
--- a/docs/slides/6_Exercise.pptx
+++ b/docs/slides/6_Exercise.pptx
@@ -7,13 +7,12 @@
   <p:sldIdLst>
     <p:sldId id="256" r:id="rId2"/>
     <p:sldId id="333" r:id="rId3"/>
-    <p:sldId id="347" r:id="rId4"/>
+    <p:sldId id="529" r:id="rId4"/>
     <p:sldId id="527" r:id="rId5"/>
-    <p:sldId id="525" r:id="rId6"/>
-    <p:sldId id="528" r:id="rId7"/>
-    <p:sldId id="524" r:id="rId8"/>
-    <p:sldId id="526" r:id="rId9"/>
-    <p:sldId id="523" r:id="rId10"/>
+    <p:sldId id="347" r:id="rId6"/>
+    <p:sldId id="530" r:id="rId7"/>
+    <p:sldId id="525" r:id="rId8"/>
+    <p:sldId id="523" r:id="rId9"/>
   </p:sldIdLst>
   <p:sldSz cx="12192000" cy="6858000"/>
   <p:notesSz cx="6858000" cy="9144000"/>
@@ -854,7 +853,7 @@
             <a:fld id="{B61BEF0D-F0BB-DE4B-95CE-6DB70DBA9567}" type="datetimeFigureOut">
               <a:rPr lang="en-US" dirty="0"/>
               <a:pPr/>
-              <a:t>6/16/2021</a:t>
+              <a:t>3/18/2022</a:t>
             </a:fld>
             <a:endParaRPr lang="en-US" dirty="0"/>
           </a:p>
@@ -1102,7 +1101,7 @@
             <a:fld id="{B61BEF0D-F0BB-DE4B-95CE-6DB70DBA9567}" type="datetimeFigureOut">
               <a:rPr lang="en-US" dirty="0"/>
               <a:pPr/>
-              <a:t>6/16/2021</a:t>
+              <a:t>3/18/2022</a:t>
             </a:fld>
             <a:endParaRPr lang="en-US" dirty="0"/>
           </a:p>
@@ -1413,7 +1412,7 @@
             <a:fld id="{B61BEF0D-F0BB-DE4B-95CE-6DB70DBA9567}" type="datetimeFigureOut">
               <a:rPr lang="en-US" dirty="0"/>
               <a:pPr/>
-              <a:t>6/16/2021</a:t>
+              <a:t>3/18/2022</a:t>
             </a:fld>
             <a:endParaRPr lang="en-US" dirty="0"/>
           </a:p>
@@ -1751,7 +1750,7 @@
             <a:fld id="{B61BEF0D-F0BB-DE4B-95CE-6DB70DBA9567}" type="datetimeFigureOut">
               <a:rPr lang="en-US" dirty="0"/>
               <a:pPr/>
-              <a:t>6/16/2021</a:t>
+              <a:t>3/18/2022</a:t>
             </a:fld>
             <a:endParaRPr lang="en-US" dirty="0"/>
           </a:p>
@@ -2062,7 +2061,7 @@
             <a:fld id="{B61BEF0D-F0BB-DE4B-95CE-6DB70DBA9567}" type="datetimeFigureOut">
               <a:rPr lang="en-US" dirty="0"/>
               <a:pPr/>
-              <a:t>6/16/2021</a:t>
+              <a:t>3/18/2022</a:t>
             </a:fld>
             <a:endParaRPr lang="en-US" dirty="0"/>
           </a:p>
@@ -2452,7 +2451,7 @@
             <a:fld id="{B61BEF0D-F0BB-DE4B-95CE-6DB70DBA9567}" type="datetimeFigureOut">
               <a:rPr lang="en-US" dirty="0"/>
               <a:pPr/>
-              <a:t>6/16/2021</a:t>
+              <a:t>3/18/2022</a:t>
             </a:fld>
             <a:endParaRPr lang="en-US" dirty="0"/>
           </a:p>
@@ -2618,7 +2617,7 @@
           <a:p>
             <a:fld id="{55C6B4A9-1611-4792-9094-5F34BCA07E0B}" type="datetimeFigureOut">
               <a:rPr lang="en-US" dirty="0"/>
-              <a:t>6/16/2021</a:t>
+              <a:t>3/18/2022</a:t>
             </a:fld>
             <a:endParaRPr lang="en-US" dirty="0"/>
           </a:p>
@@ -2794,7 +2793,7 @@
             <a:fld id="{B61BEF0D-F0BB-DE4B-95CE-6DB70DBA9567}" type="datetimeFigureOut">
               <a:rPr lang="en-US" dirty="0"/>
               <a:pPr/>
-              <a:t>6/16/2021</a:t>
+              <a:t>3/18/2022</a:t>
             </a:fld>
             <a:endParaRPr lang="en-US" dirty="0"/>
           </a:p>
@@ -2967,7 +2966,7 @@
             <a:fld id="{B61BEF0D-F0BB-DE4B-95CE-6DB70DBA9567}" type="datetimeFigureOut">
               <a:rPr lang="en-US" dirty="0"/>
               <a:pPr/>
-              <a:t>6/16/2021</a:t>
+              <a:t>3/18/2022</a:t>
             </a:fld>
             <a:endParaRPr lang="en-US" dirty="0"/>
           </a:p>
@@ -3211,7 +3210,7 @@
             <a:fld id="{B61BEF0D-F0BB-DE4B-95CE-6DB70DBA9567}" type="datetimeFigureOut">
               <a:rPr lang="en-US" dirty="0"/>
               <a:pPr/>
-              <a:t>6/16/2021</a:t>
+              <a:t>3/18/2022</a:t>
             </a:fld>
             <a:endParaRPr lang="en-US" dirty="0"/>
           </a:p>
@@ -3439,7 +3438,7 @@
           <a:p>
             <a:fld id="{EB712588-04B1-427B-82EE-E8DB90309F08}" type="datetimeFigureOut">
               <a:rPr lang="en-US" dirty="0"/>
-              <a:t>6/16/2021</a:t>
+              <a:t>3/18/2022</a:t>
             </a:fld>
             <a:endParaRPr lang="en-US" dirty="0"/>
           </a:p>
@@ -3809,7 +3808,7 @@
             <a:fld id="{B61BEF0D-F0BB-DE4B-95CE-6DB70DBA9567}" type="datetimeFigureOut">
               <a:rPr lang="en-US" dirty="0"/>
               <a:pPr/>
-              <a:t>6/16/2021</a:t>
+              <a:t>3/18/2022</a:t>
             </a:fld>
             <a:endParaRPr lang="en-US" dirty="0"/>
           </a:p>
@@ -3929,7 +3928,7 @@
             <a:fld id="{B61BEF0D-F0BB-DE4B-95CE-6DB70DBA9567}" type="datetimeFigureOut">
               <a:rPr lang="en-US" dirty="0"/>
               <a:pPr/>
-              <a:t>6/16/2021</a:t>
+              <a:t>3/18/2022</a:t>
             </a:fld>
             <a:endParaRPr lang="en-US" dirty="0"/>
           </a:p>
@@ -4021,7 +4020,7 @@
             <a:fld id="{B61BEF0D-F0BB-DE4B-95CE-6DB70DBA9567}" type="datetimeFigureOut">
               <a:rPr lang="en-US" dirty="0"/>
               <a:pPr/>
-              <a:t>6/16/2021</a:t>
+              <a:t>3/18/2022</a:t>
             </a:fld>
             <a:endParaRPr lang="en-US" dirty="0"/>
           </a:p>
@@ -4272,7 +4271,7 @@
           <a:p>
             <a:fld id="{42A54C80-263E-416B-A8E0-580EDEADCBDC}" type="datetimeFigureOut">
               <a:rPr lang="en-US" dirty="0"/>
-              <a:t>6/16/2021</a:t>
+              <a:t>3/18/2022</a:t>
             </a:fld>
             <a:endParaRPr lang="en-US" dirty="0"/>
           </a:p>
@@ -4531,7 +4530,7 @@
             <a:fld id="{B61BEF0D-F0BB-DE4B-95CE-6DB70DBA9567}" type="datetimeFigureOut">
               <a:rPr lang="en-US" dirty="0"/>
               <a:pPr/>
-              <a:t>6/16/2021</a:t>
+              <a:t>3/18/2022</a:t>
             </a:fld>
             <a:endParaRPr lang="en-US" dirty="0"/>
           </a:p>
@@ -5271,7 +5270,7 @@
             <a:fld id="{B61BEF0D-F0BB-DE4B-95CE-6DB70DBA9567}" type="datetimeFigureOut">
               <a:rPr lang="en-US" dirty="0"/>
               <a:pPr/>
-              <a:t>6/16/2021</a:t>
+              <a:t>3/18/2022</a:t>
             </a:fld>
             <a:endParaRPr lang="en-US" dirty="0"/>
           </a:p>
@@ -6211,12 +6210,8 @@
           <a:lstStyle/>
           <a:p>
             <a:r>
-              <a:rPr lang="fr-CA" dirty="0" err="1" smtClean="0"/>
+              <a:rPr lang="fr-CA" dirty="0" err="1"/>
               <a:t>Exercise</a:t>
-            </a:r>
-            <a:r>
-              <a:rPr lang="fr-CA" dirty="0" smtClean="0"/>
-              <a:t> 1/3</a:t>
             </a:r>
             <a:endParaRPr lang="fr-CA" dirty="0"/>
           </a:p>
@@ -6234,14 +6229,12 @@
         </p:nvSpPr>
         <p:spPr>
           <a:xfrm>
-            <a:off x="246147" y="1359328"/>
-            <a:ext cx="10238268" cy="5197449"/>
+            <a:off x="677334" y="2160589"/>
+            <a:ext cx="9446380" cy="3880773"/>
           </a:xfrm>
         </p:spPr>
         <p:txBody>
-          <a:bodyPr>
-            <a:normAutofit lnSpcReduction="10000"/>
-          </a:bodyPr>
+          <a:bodyPr/>
           <a:lstStyle/>
           <a:p>
             <a:r>
@@ -6250,15 +6243,96 @@
             </a:r>
             <a:r>
               <a:rPr lang="fr-CA" dirty="0" smtClean="0"/>
-              <a:t> a population of </a:t>
+              <a:t> a population </a:t>
             </a:r>
             <a:r>
               <a:rPr lang="fr-CA" dirty="0" err="1" smtClean="0"/>
-              <a:t>moving</a:t>
+              <a:t>with</a:t>
             </a:r>
             <a:r>
               <a:rPr lang="fr-CA" dirty="0" smtClean="0"/>
-              <a:t> </a:t>
+              <a:t> males and </a:t>
+            </a:r>
+            <a:r>
+              <a:rPr lang="fr-CA" dirty="0" err="1" smtClean="0"/>
+              <a:t>females</a:t>
+            </a:r>
+            <a:r>
+              <a:rPr lang="fr-CA" dirty="0" smtClean="0"/>
+              <a:t> (1/3)</a:t>
+            </a:r>
+          </a:p>
+          <a:p>
+            <a:r>
+              <a:rPr lang="fr-CA" dirty="0" err="1" smtClean="0"/>
+              <a:t>Females</a:t>
+            </a:r>
+            <a:r>
+              <a:rPr lang="fr-CA" dirty="0" smtClean="0"/>
+              <a:t> move </a:t>
+            </a:r>
+            <a:r>
+              <a:rPr lang="fr-CA" dirty="0" err="1" smtClean="0"/>
+              <a:t>randomly</a:t>
+            </a:r>
+            <a:r>
+              <a:rPr lang="fr-CA" dirty="0" smtClean="0"/>
+              <a:t>, males move </a:t>
+            </a:r>
+            <a:r>
+              <a:rPr lang="fr-CA" dirty="0" err="1" smtClean="0"/>
+              <a:t>according</a:t>
+            </a:r>
+            <a:r>
+              <a:rPr lang="fr-CA" dirty="0" smtClean="0"/>
+              <a:t> to </a:t>
+            </a:r>
+            <a:r>
+              <a:rPr lang="fr-CA" dirty="0" err="1" smtClean="0"/>
+              <a:t>females</a:t>
+            </a:r>
+            <a:r>
+              <a:rPr lang="fr-CA" dirty="0" smtClean="0"/>
+              <a:t> (2/3)</a:t>
+            </a:r>
+          </a:p>
+          <a:p>
+            <a:r>
+              <a:rPr lang="fr-CA" dirty="0" smtClean="0"/>
+              <a:t>Reproduction </a:t>
+            </a:r>
+            <a:r>
+              <a:rPr lang="fr-CA" dirty="0" err="1" smtClean="0"/>
+              <a:t>creates</a:t>
+            </a:r>
+            <a:r>
+              <a:rPr lang="fr-CA" dirty="0" smtClean="0"/>
+              <a:t> a new </a:t>
+            </a:r>
+            <a:r>
+              <a:rPr lang="fr-CA" dirty="0" err="1" smtClean="0"/>
+              <a:t>individual</a:t>
+            </a:r>
+            <a:r>
+              <a:rPr lang="fr-CA" dirty="0" smtClean="0"/>
+              <a:t> (3/3)</a:t>
+            </a:r>
+          </a:p>
+          <a:p>
+            <a:endParaRPr lang="fr-CA" dirty="0" smtClean="0"/>
+          </a:p>
+          <a:p>
+            <a:r>
+              <a:rPr lang="fr-CA" dirty="0" smtClean="0"/>
+              <a:t>Plot the world, the population and the </a:t>
+            </a:r>
+            <a:r>
+              <a:rPr lang="fr-CA" dirty="0" err="1" smtClean="0"/>
+              <a:t>number</a:t>
+            </a:r>
+            <a:r>
+              <a:rPr lang="fr-CA" dirty="0" smtClean="0"/>
+              <a:t> of </a:t>
             </a:r>
             <a:r>
               <a:rPr lang="fr-CA" dirty="0" err="1" smtClean="0"/>
@@ -6266,15 +6340,7 @@
             </a:r>
             <a:r>
               <a:rPr lang="fr-CA" dirty="0" smtClean="0"/>
-              <a:t> </a:t>
-            </a:r>
-            <a:r>
-              <a:rPr lang="fr-CA" dirty="0" err="1" smtClean="0"/>
-              <a:t>where</a:t>
-            </a:r>
-            <a:r>
-              <a:rPr lang="fr-CA" dirty="0" smtClean="0"/>
-              <a:t> males and </a:t>
+              <a:t> (males and </a:t>
             </a:r>
             <a:r>
               <a:rPr lang="fr-CA" dirty="0" err="1" smtClean="0"/>
@@ -6282,757 +6348,21 @@
             </a:r>
             <a:r>
               <a:rPr lang="fr-CA" dirty="0" smtClean="0"/>
-              <a:t> have a </a:t>
-            </a:r>
-            <a:r>
-              <a:rPr lang="fr-CA" dirty="0" err="1" smtClean="0"/>
-              <a:t>different</a:t>
-            </a:r>
-            <a:r>
-              <a:rPr lang="fr-CA" dirty="0" smtClean="0"/>
-              <a:t> </a:t>
-            </a:r>
-            <a:r>
-              <a:rPr lang="fr-CA" dirty="0" err="1" smtClean="0"/>
-              <a:t>movement</a:t>
-            </a:r>
-            <a:r>
-              <a:rPr lang="fr-CA" dirty="0" smtClean="0"/>
-              <a:t> pattern</a:t>
-            </a:r>
-          </a:p>
-          <a:p>
-            <a:pPr lvl="1"/>
-            <a:r>
-              <a:rPr lang="fr-CA" dirty="0" err="1" smtClean="0"/>
-              <a:t>Create</a:t>
-            </a:r>
-            <a:r>
-              <a:rPr lang="fr-CA" dirty="0" smtClean="0"/>
-              <a:t> a world of 10 x 10 patches </a:t>
-            </a:r>
-            <a:r>
-              <a:rPr lang="fr-CA" dirty="0" err="1" smtClean="0"/>
-              <a:t>with</a:t>
-            </a:r>
-            <a:r>
-              <a:rPr lang="fr-CA" dirty="0" smtClean="0"/>
-              <a:t> </a:t>
-            </a:r>
-            <a:r>
-              <a:rPr lang="fr-CA" dirty="0" err="1" smtClean="0"/>
-              <a:t>random</a:t>
-            </a:r>
-            <a:r>
-              <a:rPr lang="fr-CA" dirty="0" smtClean="0"/>
-              <a:t> values on </a:t>
-            </a:r>
-            <a:r>
-              <a:rPr lang="fr-CA" dirty="0" err="1" smtClean="0"/>
-              <a:t>each</a:t>
-            </a:r>
-            <a:r>
-              <a:rPr lang="fr-CA" dirty="0" smtClean="0"/>
-              <a:t> patch </a:t>
-            </a:r>
-            <a:r>
-              <a:rPr lang="fr-CA" dirty="0" err="1" smtClean="0"/>
-              <a:t>between</a:t>
-            </a:r>
-            <a:r>
-              <a:rPr lang="fr-CA" dirty="0" smtClean="0"/>
-              <a:t> 0 and 1</a:t>
-            </a:r>
-          </a:p>
-          <a:p>
-            <a:pPr lvl="1"/>
-            <a:r>
-              <a:rPr lang="fr-CA" dirty="0" err="1" smtClean="0"/>
-              <a:t>Create</a:t>
-            </a:r>
-            <a:r>
-              <a:rPr lang="fr-CA" dirty="0" smtClean="0"/>
-              <a:t> a population </a:t>
-            </a:r>
-            <a:r>
-              <a:rPr lang="fr-CA" dirty="0" err="1" smtClean="0"/>
-              <a:t>with</a:t>
-            </a:r>
-            <a:r>
-              <a:rPr lang="fr-CA" dirty="0" smtClean="0"/>
-              <a:t> 15 males and 15 </a:t>
-            </a:r>
-            <a:r>
-              <a:rPr lang="fr-CA" dirty="0" err="1" smtClean="0"/>
-              <a:t>females</a:t>
-            </a:r>
-            <a:endParaRPr lang="fr-CA" dirty="0" smtClean="0"/>
-          </a:p>
-          <a:p>
-            <a:pPr lvl="2"/>
-            <a:r>
-              <a:rPr lang="fr-CA" dirty="0" err="1" smtClean="0"/>
-              <a:t>Random</a:t>
-            </a:r>
-            <a:r>
-              <a:rPr lang="fr-CA" dirty="0"/>
-              <a:t> </a:t>
-            </a:r>
-            <a:r>
-              <a:rPr lang="fr-CA" dirty="0" smtClean="0"/>
-              <a:t>locations </a:t>
-            </a:r>
-            <a:r>
-              <a:rPr lang="fr-CA" dirty="0" err="1" smtClean="0"/>
-              <a:t>using</a:t>
-            </a:r>
-            <a:r>
-              <a:rPr lang="fr-CA" dirty="0" smtClean="0"/>
-              <a:t> </a:t>
-            </a:r>
-            <a:r>
-              <a:rPr lang="fr-CA" dirty="0" err="1" smtClean="0"/>
-              <a:t>randomXYcor</a:t>
-            </a:r>
-            <a:r>
-              <a:rPr lang="fr-CA" dirty="0" smtClean="0"/>
-              <a:t>()</a:t>
-            </a:r>
-          </a:p>
-          <a:p>
-            <a:pPr lvl="2"/>
-            <a:r>
-              <a:rPr lang="fr-CA" dirty="0" err="1" smtClean="0"/>
-              <a:t>Color</a:t>
-            </a:r>
-            <a:r>
-              <a:rPr lang="fr-CA" dirty="0" smtClean="0"/>
-              <a:t> of males </a:t>
-            </a:r>
-            <a:r>
-              <a:rPr lang="fr-CA" dirty="0"/>
-              <a:t>= </a:t>
-            </a:r>
-            <a:r>
-              <a:rPr lang="fr-CA" dirty="0" err="1"/>
-              <a:t>red</a:t>
-            </a:r>
-            <a:r>
-              <a:rPr lang="fr-CA" dirty="0"/>
-              <a:t>, </a:t>
-            </a:r>
-            <a:r>
-              <a:rPr lang="fr-CA" dirty="0" err="1" smtClean="0"/>
-              <a:t>color</a:t>
-            </a:r>
-            <a:r>
-              <a:rPr lang="fr-CA" dirty="0" smtClean="0"/>
-              <a:t> of </a:t>
-            </a:r>
-            <a:r>
-              <a:rPr lang="fr-CA" dirty="0" err="1" smtClean="0"/>
-              <a:t>females</a:t>
-            </a:r>
-            <a:r>
-              <a:rPr lang="fr-CA" dirty="0" smtClean="0"/>
-              <a:t> </a:t>
-            </a:r>
-            <a:r>
-              <a:rPr lang="fr-CA" dirty="0"/>
-              <a:t>= </a:t>
-            </a:r>
-            <a:r>
-              <a:rPr lang="fr-CA" dirty="0" smtClean="0"/>
-              <a:t>black</a:t>
-            </a:r>
-          </a:p>
-          <a:p>
-            <a:pPr lvl="1"/>
-            <a:r>
-              <a:rPr lang="fr-CA" dirty="0" err="1" smtClean="0"/>
-              <a:t>Define</a:t>
-            </a:r>
-            <a:r>
-              <a:rPr lang="fr-CA" dirty="0" smtClean="0"/>
-              <a:t> 2 </a:t>
-            </a:r>
-            <a:r>
-              <a:rPr lang="fr-CA" dirty="0" err="1" smtClean="0"/>
-              <a:t>movement</a:t>
-            </a:r>
-            <a:r>
-              <a:rPr lang="fr-CA" dirty="0" smtClean="0"/>
-              <a:t> patterns/</a:t>
-            </a:r>
-            <a:r>
-              <a:rPr lang="fr-CA" dirty="0" err="1" smtClean="0"/>
-              <a:t>functions</a:t>
-            </a:r>
-            <a:endParaRPr lang="fr-CA" dirty="0" smtClean="0"/>
-          </a:p>
-          <a:p>
-            <a:pPr lvl="2"/>
-            <a:r>
-              <a:rPr lang="fr-CA" dirty="0" err="1" smtClean="0"/>
-              <a:t>Movement</a:t>
-            </a:r>
-            <a:r>
-              <a:rPr lang="fr-CA" dirty="0" smtClean="0"/>
-              <a:t> of </a:t>
-            </a:r>
-            <a:r>
-              <a:rPr lang="fr-CA" dirty="0" err="1" smtClean="0"/>
-              <a:t>females</a:t>
-            </a:r>
-            <a:r>
-              <a:rPr lang="fr-CA" dirty="0" smtClean="0"/>
-              <a:t>: in an </a:t>
-            </a:r>
-            <a:r>
-              <a:rPr lang="fr-CA" dirty="0" err="1" smtClean="0"/>
-              <a:t>random</a:t>
-            </a:r>
-            <a:r>
-              <a:rPr lang="fr-CA" dirty="0" smtClean="0"/>
-              <a:t> direction, move 2 patches at the time, in a </a:t>
-            </a:r>
-            <a:r>
-              <a:rPr lang="fr-CA" dirty="0" err="1" smtClean="0"/>
-              <a:t>wrapped</a:t>
-            </a:r>
-            <a:r>
-              <a:rPr lang="fr-CA" dirty="0" smtClean="0"/>
-              <a:t> world</a:t>
-            </a:r>
-          </a:p>
-          <a:p>
-            <a:pPr lvl="2"/>
-            <a:r>
-              <a:rPr lang="fr-CA" dirty="0" err="1" smtClean="0"/>
-              <a:t>Movement</a:t>
-            </a:r>
-            <a:r>
-              <a:rPr lang="fr-CA" dirty="0" smtClean="0"/>
-              <a:t> of males: move to one of the 8 </a:t>
-            </a:r>
-            <a:r>
-              <a:rPr lang="fr-CA" dirty="0" err="1" smtClean="0"/>
-              <a:t>neighboring</a:t>
-            </a:r>
-            <a:r>
-              <a:rPr lang="fr-CA" dirty="0" smtClean="0"/>
-              <a:t> </a:t>
-            </a:r>
-            <a:r>
-              <a:rPr lang="fr-CA" dirty="0" err="1" smtClean="0"/>
-              <a:t>cells</a:t>
-            </a:r>
-            <a:r>
-              <a:rPr lang="fr-CA" dirty="0" smtClean="0"/>
-              <a:t> </a:t>
-            </a:r>
-            <a:r>
-              <a:rPr lang="fr-CA" dirty="0" err="1" smtClean="0"/>
-              <a:t>where</a:t>
-            </a:r>
-            <a:r>
-              <a:rPr lang="fr-CA" dirty="0" smtClean="0"/>
-              <a:t> </a:t>
-            </a:r>
-            <a:r>
-              <a:rPr lang="fr-CA" dirty="0" err="1" smtClean="0"/>
-              <a:t>there</a:t>
-            </a:r>
-            <a:r>
-              <a:rPr lang="fr-CA" dirty="0" smtClean="0"/>
-              <a:t> </a:t>
-            </a:r>
-            <a:r>
-              <a:rPr lang="fr-CA" dirty="0" err="1" smtClean="0"/>
-              <a:t>is</a:t>
-            </a:r>
-            <a:r>
-              <a:rPr lang="fr-CA" dirty="0" smtClean="0"/>
-              <a:t> a </a:t>
-            </a:r>
-            <a:r>
-              <a:rPr lang="fr-CA" dirty="0" err="1" smtClean="0"/>
-              <a:t>female</a:t>
-            </a:r>
-            <a:r>
-              <a:rPr lang="fr-CA" dirty="0" smtClean="0"/>
-              <a:t> on </a:t>
-            </a:r>
-            <a:r>
-              <a:rPr lang="fr-CA" dirty="0" err="1" smtClean="0"/>
-              <a:t>it</a:t>
-            </a:r>
-            <a:r>
-              <a:rPr lang="fr-CA" dirty="0" smtClean="0"/>
-              <a:t>, </a:t>
-            </a:r>
-            <a:r>
-              <a:rPr lang="fr-CA" dirty="0" err="1" smtClean="0"/>
-              <a:t>otherwise</a:t>
-            </a:r>
-            <a:r>
-              <a:rPr lang="fr-CA" dirty="0" smtClean="0"/>
-              <a:t> on one of the 8 </a:t>
-            </a:r>
-            <a:r>
-              <a:rPr lang="fr-CA" dirty="0" err="1" smtClean="0"/>
-              <a:t>neighboring</a:t>
-            </a:r>
-            <a:r>
-              <a:rPr lang="fr-CA" dirty="0" smtClean="0"/>
-              <a:t> </a:t>
-            </a:r>
-            <a:r>
-              <a:rPr lang="fr-CA" dirty="0" err="1" smtClean="0"/>
-              <a:t>cells</a:t>
-            </a:r>
-            <a:r>
-              <a:rPr lang="fr-CA" dirty="0" smtClean="0"/>
-              <a:t> </a:t>
-            </a:r>
-            <a:r>
-              <a:rPr lang="fr-CA" dirty="0" err="1" smtClean="0"/>
-              <a:t>randomly</a:t>
-            </a:r>
-            <a:endParaRPr lang="fr-CA" dirty="0" smtClean="0"/>
-          </a:p>
-          <a:p>
-            <a:pPr lvl="3"/>
-            <a:r>
-              <a:rPr lang="fr-CA" dirty="0" err="1" smtClean="0"/>
-              <a:t>What</a:t>
-            </a:r>
-            <a:r>
-              <a:rPr lang="fr-CA" dirty="0" smtClean="0"/>
-              <a:t> are the </a:t>
-            </a:r>
-            <a:r>
-              <a:rPr lang="fr-CA" dirty="0" err="1" smtClean="0"/>
-              <a:t>cells</a:t>
-            </a:r>
-            <a:r>
-              <a:rPr lang="fr-CA" dirty="0" smtClean="0"/>
-              <a:t> </a:t>
-            </a:r>
-            <a:r>
-              <a:rPr lang="fr-CA" dirty="0" err="1" smtClean="0"/>
-              <a:t>around</a:t>
-            </a:r>
-            <a:r>
-              <a:rPr lang="fr-CA" dirty="0" smtClean="0"/>
-              <a:t> the </a:t>
-            </a:r>
-            <a:r>
-              <a:rPr lang="fr-CA" dirty="0" err="1" smtClean="0"/>
-              <a:t>individuals</a:t>
-            </a:r>
-            <a:r>
-              <a:rPr lang="fr-CA" dirty="0" smtClean="0"/>
-              <a:t>?</a:t>
-            </a:r>
-          </a:p>
-          <a:p>
-            <a:pPr lvl="3"/>
-            <a:r>
-              <a:rPr lang="fr-CA" dirty="0" smtClean="0"/>
-              <a:t>On </a:t>
-            </a:r>
-            <a:r>
-              <a:rPr lang="fr-CA" dirty="0" err="1" smtClean="0"/>
-              <a:t>which</a:t>
-            </a:r>
-            <a:r>
-              <a:rPr lang="fr-CA" dirty="0" smtClean="0"/>
-              <a:t> </a:t>
-            </a:r>
-            <a:r>
-              <a:rPr lang="fr-CA" dirty="0" err="1" smtClean="0"/>
-              <a:t>cells</a:t>
-            </a:r>
-            <a:r>
-              <a:rPr lang="fr-CA" dirty="0" smtClean="0"/>
-              <a:t> </a:t>
-            </a:r>
-            <a:r>
-              <a:rPr lang="fr-CA" dirty="0" err="1" smtClean="0"/>
-              <a:t>there</a:t>
-            </a:r>
-            <a:r>
-              <a:rPr lang="fr-CA" dirty="0" smtClean="0"/>
-              <a:t> are </a:t>
-            </a:r>
-            <a:r>
-              <a:rPr lang="fr-CA" dirty="0" err="1" smtClean="0"/>
-              <a:t>females</a:t>
-            </a:r>
-            <a:r>
-              <a:rPr lang="fr-CA" dirty="0" smtClean="0"/>
-              <a:t>?</a:t>
-            </a:r>
-          </a:p>
-          <a:p>
-            <a:pPr lvl="4"/>
-            <a:r>
-              <a:rPr lang="fr-CA" dirty="0" smtClean="0"/>
-              <a:t>If </a:t>
-            </a:r>
-            <a:r>
-              <a:rPr lang="fr-CA" dirty="0" err="1" smtClean="0"/>
-              <a:t>there</a:t>
-            </a:r>
-            <a:r>
-              <a:rPr lang="fr-CA" dirty="0" smtClean="0"/>
-              <a:t> are </a:t>
-            </a:r>
-            <a:r>
-              <a:rPr lang="fr-CA" dirty="0" err="1" smtClean="0"/>
-              <a:t>several</a:t>
-            </a:r>
-            <a:r>
-              <a:rPr lang="fr-CA" dirty="0" smtClean="0"/>
-              <a:t> </a:t>
-            </a:r>
-            <a:r>
-              <a:rPr lang="fr-CA" dirty="0" err="1" smtClean="0"/>
-              <a:t>cells</a:t>
-            </a:r>
-            <a:r>
-              <a:rPr lang="fr-CA" dirty="0" smtClean="0"/>
-              <a:t> </a:t>
-            </a:r>
-            <a:r>
-              <a:rPr lang="fr-CA" dirty="0" err="1" smtClean="0"/>
-              <a:t>with</a:t>
-            </a:r>
-            <a:r>
-              <a:rPr lang="fr-CA" dirty="0" smtClean="0"/>
-              <a:t> </a:t>
-            </a:r>
-            <a:r>
-              <a:rPr lang="fr-CA" dirty="0" err="1" smtClean="0"/>
-              <a:t>females</a:t>
-            </a:r>
-            <a:r>
-              <a:rPr lang="fr-CA" dirty="0" smtClean="0"/>
-              <a:t> on </a:t>
-            </a:r>
-            <a:r>
-              <a:rPr lang="fr-CA" dirty="0" err="1" smtClean="0"/>
-              <a:t>it</a:t>
-            </a:r>
-            <a:r>
-              <a:rPr lang="fr-CA" dirty="0" smtClean="0"/>
-              <a:t>, </a:t>
-            </a:r>
-            <a:r>
-              <a:rPr lang="fr-CA" dirty="0" err="1" smtClean="0"/>
-              <a:t>choose</a:t>
-            </a:r>
-            <a:r>
-              <a:rPr lang="fr-CA" dirty="0" smtClean="0"/>
-              <a:t> one </a:t>
-            </a:r>
-            <a:r>
-              <a:rPr lang="fr-CA" dirty="0" err="1" smtClean="0"/>
-              <a:t>cell</a:t>
-            </a:r>
-            <a:r>
-              <a:rPr lang="fr-CA" dirty="0" smtClean="0"/>
-              <a:t> </a:t>
-            </a:r>
-            <a:r>
-              <a:rPr lang="fr-CA" dirty="0" err="1" smtClean="0"/>
-              <a:t>among</a:t>
-            </a:r>
-            <a:r>
-              <a:rPr lang="fr-CA" dirty="0" smtClean="0"/>
-              <a:t> </a:t>
-            </a:r>
-            <a:r>
-              <a:rPr lang="fr-CA" dirty="0" err="1" smtClean="0"/>
-              <a:t>these</a:t>
-            </a:r>
-            <a:r>
-              <a:rPr lang="fr-CA" dirty="0" smtClean="0"/>
-              <a:t> </a:t>
-            </a:r>
-            <a:r>
-              <a:rPr lang="fr-CA" dirty="0" err="1" smtClean="0"/>
-              <a:t>ones</a:t>
-            </a:r>
-            <a:r>
-              <a:rPr lang="fr-CA" dirty="0" smtClean="0"/>
-              <a:t> </a:t>
-            </a:r>
-            <a:r>
-              <a:rPr lang="fr-CA" dirty="0" err="1" smtClean="0"/>
-              <a:t>randomly</a:t>
+              <a:t>)</a:t>
             </a:r>
             <a:endParaRPr lang="fr-CA" dirty="0"/>
           </a:p>
-          <a:p>
-            <a:pPr lvl="4"/>
-            <a:r>
-              <a:rPr lang="fr-CA" dirty="0" smtClean="0"/>
-              <a:t>If </a:t>
-            </a:r>
-            <a:r>
-              <a:rPr lang="fr-CA" dirty="0" err="1" smtClean="0"/>
-              <a:t>there</a:t>
-            </a:r>
-            <a:r>
-              <a:rPr lang="fr-CA" dirty="0" smtClean="0"/>
-              <a:t> </a:t>
-            </a:r>
-            <a:r>
-              <a:rPr lang="fr-CA" dirty="0" err="1" smtClean="0"/>
-              <a:t>is</a:t>
-            </a:r>
-            <a:r>
-              <a:rPr lang="fr-CA" dirty="0" smtClean="0"/>
-              <a:t> one </a:t>
-            </a:r>
-            <a:r>
-              <a:rPr lang="fr-CA" dirty="0" err="1" smtClean="0"/>
-              <a:t>cell</a:t>
-            </a:r>
-            <a:r>
-              <a:rPr lang="fr-CA" dirty="0" smtClean="0"/>
-              <a:t> </a:t>
-            </a:r>
-            <a:r>
-              <a:rPr lang="fr-CA" dirty="0" err="1" smtClean="0"/>
-              <a:t>with</a:t>
-            </a:r>
-            <a:r>
-              <a:rPr lang="fr-CA" dirty="0" smtClean="0"/>
-              <a:t> </a:t>
-            </a:r>
-            <a:r>
-              <a:rPr lang="fr-CA" dirty="0" err="1" smtClean="0"/>
-              <a:t>female</a:t>
-            </a:r>
-            <a:r>
-              <a:rPr lang="fr-CA" dirty="0" smtClean="0"/>
-              <a:t>(s) on </a:t>
-            </a:r>
-            <a:r>
-              <a:rPr lang="fr-CA" dirty="0" err="1" smtClean="0"/>
-              <a:t>it</a:t>
-            </a:r>
-            <a:r>
-              <a:rPr lang="fr-CA" dirty="0" smtClean="0"/>
-              <a:t>, </a:t>
-            </a:r>
-            <a:r>
-              <a:rPr lang="fr-CA" dirty="0" err="1" smtClean="0"/>
-              <a:t>choose</a:t>
-            </a:r>
-            <a:r>
-              <a:rPr lang="fr-CA" dirty="0" smtClean="0"/>
-              <a:t> </a:t>
-            </a:r>
-            <a:r>
-              <a:rPr lang="fr-CA" dirty="0" err="1" smtClean="0"/>
-              <a:t>this</a:t>
-            </a:r>
-            <a:r>
-              <a:rPr lang="fr-CA" dirty="0" smtClean="0"/>
-              <a:t> </a:t>
-            </a:r>
-            <a:r>
-              <a:rPr lang="fr-CA" dirty="0" err="1" smtClean="0"/>
-              <a:t>cell</a:t>
-            </a:r>
-            <a:endParaRPr lang="fr-CA" dirty="0" smtClean="0"/>
-          </a:p>
-          <a:p>
-            <a:pPr lvl="4"/>
-            <a:r>
-              <a:rPr lang="fr-CA" dirty="0" smtClean="0"/>
-              <a:t>If </a:t>
-            </a:r>
-            <a:r>
-              <a:rPr lang="fr-CA" dirty="0" err="1" smtClean="0"/>
-              <a:t>there</a:t>
-            </a:r>
-            <a:r>
-              <a:rPr lang="fr-CA" dirty="0" smtClean="0"/>
-              <a:t> are no </a:t>
-            </a:r>
-            <a:r>
-              <a:rPr lang="fr-CA" dirty="0" err="1" smtClean="0"/>
-              <a:t>females</a:t>
-            </a:r>
-            <a:r>
-              <a:rPr lang="fr-CA" dirty="0" smtClean="0"/>
-              <a:t> on the </a:t>
-            </a:r>
-            <a:r>
-              <a:rPr lang="fr-CA" dirty="0" err="1" smtClean="0"/>
-              <a:t>cells</a:t>
-            </a:r>
-            <a:r>
-              <a:rPr lang="fr-CA" dirty="0" smtClean="0"/>
-              <a:t> </a:t>
-            </a:r>
-            <a:r>
-              <a:rPr lang="fr-CA" dirty="0" err="1" smtClean="0"/>
-              <a:t>around</a:t>
-            </a:r>
-            <a:r>
-              <a:rPr lang="fr-CA" dirty="0" smtClean="0"/>
-              <a:t>, </a:t>
-            </a:r>
-            <a:r>
-              <a:rPr lang="fr-CA" dirty="0" err="1" smtClean="0"/>
-              <a:t>choose</a:t>
-            </a:r>
-            <a:r>
-              <a:rPr lang="fr-CA" dirty="0" smtClean="0"/>
-              <a:t> one </a:t>
-            </a:r>
-            <a:r>
-              <a:rPr lang="fr-CA" dirty="0" err="1" smtClean="0"/>
-              <a:t>cell</a:t>
-            </a:r>
-            <a:r>
-              <a:rPr lang="fr-CA" dirty="0" smtClean="0"/>
-              <a:t> </a:t>
-            </a:r>
-            <a:r>
-              <a:rPr lang="fr-CA" dirty="0" err="1" smtClean="0"/>
-              <a:t>randomly</a:t>
-            </a:r>
-            <a:endParaRPr lang="fr-CA" dirty="0" smtClean="0"/>
-          </a:p>
-          <a:p>
-            <a:pPr lvl="1"/>
-            <a:r>
-              <a:rPr lang="fr-CA" dirty="0" err="1" smtClean="0"/>
-              <a:t>Create</a:t>
-            </a:r>
-            <a:r>
-              <a:rPr lang="fr-CA" dirty="0" smtClean="0"/>
-              <a:t> a </a:t>
-            </a:r>
-            <a:r>
-              <a:rPr lang="fr-CA" dirty="0" err="1" smtClean="0"/>
-              <a:t>loop</a:t>
-            </a:r>
-            <a:r>
-              <a:rPr lang="fr-CA" dirty="0" smtClean="0"/>
-              <a:t> of 20 times </a:t>
-            </a:r>
-            <a:r>
-              <a:rPr lang="fr-CA" dirty="0" err="1" smtClean="0"/>
-              <a:t>steps</a:t>
-            </a:r>
-            <a:r>
-              <a:rPr lang="fr-CA" dirty="0" smtClean="0"/>
-              <a:t> </a:t>
-            </a:r>
-            <a:r>
-              <a:rPr lang="fr-CA" dirty="0" err="1" smtClean="0"/>
-              <a:t>where</a:t>
-            </a:r>
-            <a:r>
-              <a:rPr lang="fr-CA" dirty="0" smtClean="0"/>
-              <a:t> all </a:t>
-            </a:r>
-            <a:r>
-              <a:rPr lang="fr-CA" dirty="0" err="1" smtClean="0"/>
-              <a:t>females</a:t>
-            </a:r>
-            <a:r>
-              <a:rPr lang="fr-CA" dirty="0" smtClean="0"/>
-              <a:t> move first </a:t>
-            </a:r>
-            <a:r>
-              <a:rPr lang="fr-CA" dirty="0" err="1" smtClean="0"/>
-              <a:t>then</a:t>
-            </a:r>
-            <a:r>
-              <a:rPr lang="fr-CA" dirty="0" smtClean="0"/>
-              <a:t> all the males</a:t>
-            </a:r>
-          </a:p>
-        </p:txBody>
-      </p:sp>
-      <p:sp>
-        <p:nvSpPr>
-          <p:cNvPr id="4" name="Rectangle 3"/>
-          <p:cNvSpPr/>
-          <p:nvPr/>
-        </p:nvSpPr>
-        <p:spPr>
-          <a:xfrm>
-            <a:off x="6018387" y="6233612"/>
-            <a:ext cx="6173613" cy="646331"/>
-          </a:xfrm>
-          <a:prstGeom prst="rect">
-            <a:avLst/>
-          </a:prstGeom>
-        </p:spPr>
-        <p:txBody>
-          <a:bodyPr wrap="none">
-            <a:spAutoFit/>
-          </a:bodyPr>
-          <a:lstStyle/>
-          <a:p>
-            <a:pPr algn="r"/>
-            <a:r>
-              <a:rPr lang="fr-CA" dirty="0" smtClean="0"/>
-              <a:t>Do the </a:t>
-            </a:r>
-            <a:r>
-              <a:rPr lang="fr-CA" dirty="0" err="1" smtClean="0"/>
-              <a:t>exercise</a:t>
-            </a:r>
-            <a:r>
-              <a:rPr lang="fr-CA" dirty="0"/>
-              <a:t> </a:t>
-            </a:r>
-            <a:r>
-              <a:rPr lang="fr-CA" dirty="0" err="1" smtClean="0"/>
-              <a:t>with</a:t>
-            </a:r>
-            <a:r>
-              <a:rPr lang="fr-CA" dirty="0" smtClean="0"/>
-              <a:t>: 10_ExerciseToDo.R. Help at the end</a:t>
-            </a:r>
-          </a:p>
-          <a:p>
-            <a:pPr algn="r"/>
-            <a:r>
-              <a:rPr lang="fr-CA" dirty="0" err="1" smtClean="0"/>
-              <a:t>Exercise</a:t>
-            </a:r>
-            <a:r>
-              <a:rPr lang="fr-CA" dirty="0" smtClean="0"/>
-              <a:t> </a:t>
-            </a:r>
-            <a:r>
-              <a:rPr lang="fr-CA" dirty="0"/>
-              <a:t>solutions: 11_ExerciseSolutions.R</a:t>
-            </a:r>
-          </a:p>
-        </p:txBody>
-      </p:sp>
-      <p:sp>
-        <p:nvSpPr>
-          <p:cNvPr id="5" name="ZoneTexte 4"/>
+        </p:txBody>
+      </p:sp>
+      <p:sp>
+        <p:nvSpPr>
+          <p:cNvPr id="6" name="ZoneTexte 5"/>
           <p:cNvSpPr txBox="1"/>
           <p:nvPr/>
         </p:nvSpPr>
         <p:spPr>
           <a:xfrm rot="21033023">
-            <a:off x="5547728" y="388530"/>
+            <a:off x="3980184" y="1007843"/>
             <a:ext cx="1826141" cy="523220"/>
           </a:xfrm>
           <a:prstGeom prst="rect">
@@ -7069,13 +6399,13 @@
       </p:sp>
       <p:sp>
         <p:nvSpPr>
-          <p:cNvPr id="6" name="ZoneTexte 5"/>
+          <p:cNvPr id="7" name="ZoneTexte 6"/>
           <p:cNvSpPr txBox="1"/>
           <p:nvPr/>
         </p:nvSpPr>
         <p:spPr>
           <a:xfrm rot="469770">
-            <a:off x="7750728" y="292280"/>
+            <a:off x="6183184" y="911593"/>
             <a:ext cx="3799438" cy="523220"/>
           </a:xfrm>
           <a:prstGeom prst="rect">
@@ -7134,69 +6464,10 @@
           </a:p>
         </p:txBody>
       </p:sp>
-      <p:sp>
-        <p:nvSpPr>
-          <p:cNvPr id="7" name="ZoneTexte 6"/>
-          <p:cNvSpPr txBox="1"/>
-          <p:nvPr/>
-        </p:nvSpPr>
-        <p:spPr>
-          <a:xfrm>
-            <a:off x="7156491" y="779329"/>
-            <a:ext cx="2300630" cy="523220"/>
-          </a:xfrm>
-          <a:prstGeom prst="rect">
-            <a:avLst/>
-          </a:prstGeom>
-          <a:solidFill>
-            <a:schemeClr val="accent1">
-              <a:lumMod val="20000"/>
-              <a:lumOff val="80000"/>
-            </a:schemeClr>
-          </a:solidFill>
-        </p:spPr>
-        <p:txBody>
-          <a:bodyPr wrap="none" rtlCol="0">
-            <a:spAutoFit/>
-          </a:bodyPr>
-          <a:lstStyle/>
-          <a:p>
-            <a:r>
-              <a:rPr lang="fr-CA" sz="2800" dirty="0" smtClean="0">
-                <a:solidFill>
-                  <a:srgbClr val="92D050"/>
-                </a:solidFill>
-              </a:rPr>
-              <a:t>Plot </a:t>
-            </a:r>
-            <a:r>
-              <a:rPr lang="fr-CA" sz="2800" dirty="0" err="1" smtClean="0">
-                <a:solidFill>
-                  <a:srgbClr val="92D050"/>
-                </a:solidFill>
-              </a:rPr>
-              <a:t>can</a:t>
-            </a:r>
-            <a:r>
-              <a:rPr lang="fr-CA" sz="2800" dirty="0" smtClean="0">
-                <a:solidFill>
-                  <a:srgbClr val="92D050"/>
-                </a:solidFill>
-              </a:rPr>
-              <a:t> help</a:t>
-            </a:r>
-            <a:endParaRPr lang="fr-CA" sz="2800" dirty="0">
-              <a:solidFill>
-                <a:srgbClr val="92D050"/>
-              </a:solidFill>
-            </a:endParaRPr>
-          </a:p>
-        </p:txBody>
-      </p:sp>
     </p:spTree>
     <p:extLst>
       <p:ext uri="{BB962C8B-B14F-4D97-AF65-F5344CB8AC3E}">
-        <p14:creationId xmlns:p14="http://schemas.microsoft.com/office/powerpoint/2010/main" val="1923339499"/>
+        <p14:creationId xmlns:p14="http://schemas.microsoft.com/office/powerpoint/2010/main" val="3611004591"/>
       </p:ext>
     </p:extLst>
   </p:cSld>
@@ -7237,7 +6508,7 @@
                                           </p:stCondLst>
                                         </p:cTn>
                                         <p:tgtEl>
-                                          <p:spTgt spid="5"/>
+                                          <p:spTgt spid="6"/>
                                         </p:tgtEl>
                                         <p:attrNameLst>
                                           <p:attrName>style.visibility</p:attrName>
@@ -7259,33 +6530,6 @@
                                     <p:set>
                                       <p:cBhvr>
                                         <p:cTn id="8" dur="1" fill="hold">
-                                          <p:stCondLst>
-                                            <p:cond delay="0"/>
-                                          </p:stCondLst>
-                                        </p:cTn>
-                                        <p:tgtEl>
-                                          <p:spTgt spid="6"/>
-                                        </p:tgtEl>
-                                        <p:attrNameLst>
-                                          <p:attrName>style.visibility</p:attrName>
-                                        </p:attrNameLst>
-                                      </p:cBhvr>
-                                      <p:to>
-                                        <p:strVal val="visible"/>
-                                      </p:to>
-                                    </p:set>
-                                  </p:childTnLst>
-                                </p:cTn>
-                              </p:par>
-                              <p:par>
-                                <p:cTn id="9" presetID="1" presetClass="entr" presetSubtype="0" fill="hold" grpId="0" nodeType="withEffect">
-                                  <p:stCondLst>
-                                    <p:cond delay="0"/>
-                                  </p:stCondLst>
-                                  <p:childTnLst>
-                                    <p:set>
-                                      <p:cBhvr>
-                                        <p:cTn id="10" dur="1" fill="hold">
                                           <p:stCondLst>
                                             <p:cond delay="0"/>
                                           </p:stCondLst>
@@ -7332,7 +6576,6 @@
       </p:par>
     </p:tnLst>
     <p:bldLst>
-      <p:bldP spid="5" grpId="0" animBg="1"/>
       <p:bldP spid="6" grpId="0" animBg="1"/>
       <p:bldP spid="7" grpId="0" animBg="1"/>
     </p:bldLst>
@@ -7869,124 +7112,37 @@
             <p:ph type="title"/>
           </p:nvPr>
         </p:nvSpPr>
-        <p:spPr/>
-        <p:txBody>
-          <a:bodyPr/>
-          <a:lstStyle/>
-          <a:p>
-            <a:r>
-              <a:rPr lang="fr-CA" dirty="0" err="1" smtClean="0"/>
-              <a:t>Exercise</a:t>
-            </a:r>
-            <a:r>
-              <a:rPr lang="fr-CA" dirty="0" smtClean="0"/>
-              <a:t> 2/3</a:t>
-            </a:r>
-            <a:endParaRPr lang="fr-CA" dirty="0"/>
-          </a:p>
-        </p:txBody>
-      </p:sp>
-      <p:sp>
-        <p:nvSpPr>
-          <p:cNvPr id="3" name="Espace réservé du contenu 2"/>
-          <p:cNvSpPr>
-            <a:spLocks noGrp="1"/>
-          </p:cNvSpPr>
-          <p:nvPr>
-            <p:ph idx="1"/>
-          </p:nvPr>
-        </p:nvSpPr>
         <p:spPr>
           <a:xfrm>
-            <a:off x="398033" y="1733702"/>
-            <a:ext cx="10238268" cy="5124297"/>
+            <a:off x="677333" y="609600"/>
+            <a:ext cx="9694575" cy="1320800"/>
           </a:xfrm>
         </p:spPr>
         <p:txBody>
           <a:bodyPr>
-            <a:normAutofit/>
+            <a:normAutofit fontScale="90000"/>
           </a:bodyPr>
           <a:lstStyle/>
           <a:p>
             <a:r>
               <a:rPr lang="fr-CA" dirty="0" err="1" smtClean="0"/>
-              <a:t>Make</a:t>
-            </a:r>
-            <a:r>
-              <a:rPr lang="fr-CA" dirty="0" smtClean="0"/>
-              <a:t> reproduction </a:t>
-            </a:r>
-            <a:r>
-              <a:rPr lang="fr-CA" dirty="0" err="1" smtClean="0"/>
-              <a:t>happens</a:t>
+              <a:t>Create</a:t>
             </a:r>
             <a:r>
               <a:rPr lang="fr-CA" dirty="0" smtClean="0"/>
               <a:t> </a:t>
             </a:r>
             <a:r>
-              <a:rPr lang="fr-CA" dirty="0" err="1" smtClean="0"/>
-              <a:t>when</a:t>
-            </a:r>
-            <a:r>
-              <a:rPr lang="fr-CA" dirty="0" smtClean="0"/>
-              <a:t> a male </a:t>
-            </a:r>
-            <a:r>
-              <a:rPr lang="fr-CA" dirty="0" err="1" smtClean="0"/>
-              <a:t>meets</a:t>
-            </a:r>
-            <a:r>
-              <a:rPr lang="fr-CA" dirty="0" smtClean="0"/>
-              <a:t> a </a:t>
-            </a:r>
-            <a:r>
-              <a:rPr lang="fr-CA" dirty="0" err="1" smtClean="0"/>
-              <a:t>female</a:t>
-            </a:r>
-            <a:r>
-              <a:rPr lang="fr-CA" dirty="0" smtClean="0"/>
-              <a:t>, </a:t>
-            </a:r>
-            <a:r>
-              <a:rPr lang="fr-CA" dirty="0" err="1" smtClean="0"/>
+              <a:rPr lang="fr-CA" dirty="0"/>
+              <a:t>a population </a:t>
+            </a:r>
+            <a:r>
+              <a:rPr lang="fr-CA" dirty="0" err="1"/>
               <a:t>with</a:t>
             </a:r>
             <a:r>
-              <a:rPr lang="fr-CA" dirty="0" smtClean="0"/>
-              <a:t> the production of one </a:t>
-            </a:r>
-            <a:r>
-              <a:rPr lang="fr-CA" dirty="0" err="1" smtClean="0"/>
-              <a:t>offspring</a:t>
-            </a:r>
-            <a:endParaRPr lang="fr-CA" dirty="0"/>
-          </a:p>
-          <a:p>
-            <a:pPr lvl="1"/>
-            <a:r>
-              <a:rPr lang="fr-CA" dirty="0" err="1" smtClean="0"/>
-              <a:t>Define</a:t>
-            </a:r>
-            <a:r>
-              <a:rPr lang="fr-CA" dirty="0" smtClean="0"/>
-              <a:t> a reproduction </a:t>
-            </a:r>
-            <a:r>
-              <a:rPr lang="fr-CA" dirty="0" err="1" smtClean="0"/>
-              <a:t>function</a:t>
-            </a:r>
-            <a:r>
-              <a:rPr lang="fr-CA" dirty="0" smtClean="0"/>
-              <a:t> </a:t>
-            </a:r>
-            <a:r>
-              <a:rPr lang="fr-CA" dirty="0" err="1" smtClean="0"/>
-              <a:t>where</a:t>
-            </a:r>
-            <a:r>
-              <a:rPr lang="fr-CA" dirty="0" smtClean="0"/>
-              <a:t> all </a:t>
+              <a:rPr lang="fr-CA" dirty="0"/>
+              <a:t> males and </a:t>
             </a:r>
             <a:r>
               <a:rPr lang="fr-CA" dirty="0" err="1" smtClean="0"/>
@@ -7994,493 +7150,306 @@
             </a:r>
             <a:r>
               <a:rPr lang="fr-CA" dirty="0" smtClean="0"/>
-              <a:t> </a:t>
-            </a:r>
-            <a:r>
-              <a:rPr lang="fr-CA" dirty="0" err="1" smtClean="0"/>
-              <a:t>produce</a:t>
-            </a:r>
-            <a:r>
-              <a:rPr lang="fr-CA" dirty="0" smtClean="0"/>
-              <a:t> one </a:t>
-            </a:r>
-            <a:r>
-              <a:rPr lang="fr-CA" dirty="0" err="1" smtClean="0"/>
-              <a:t>offspring</a:t>
-            </a:r>
-            <a:r>
-              <a:rPr lang="fr-CA" dirty="0" smtClean="0"/>
-              <a:t> </a:t>
-            </a:r>
-            <a:r>
-              <a:rPr lang="fr-CA" dirty="0" err="1" smtClean="0"/>
-              <a:t>each</a:t>
-            </a:r>
-            <a:endParaRPr lang="fr-CA" dirty="0" smtClean="0"/>
-          </a:p>
-          <a:p>
-            <a:pPr lvl="2"/>
-            <a:r>
-              <a:rPr lang="fr-CA" dirty="0" smtClean="0"/>
-              <a:t>Update the </a:t>
-            </a:r>
-            <a:r>
-              <a:rPr lang="fr-CA" dirty="0" err="1" smtClean="0"/>
-              <a:t>sex</a:t>
-            </a:r>
-            <a:r>
-              <a:rPr lang="fr-CA" dirty="0" smtClean="0"/>
-              <a:t>, </a:t>
-            </a:r>
-            <a:r>
-              <a:rPr lang="fr-CA" dirty="0" err="1" smtClean="0"/>
-              <a:t>breed</a:t>
-            </a:r>
-            <a:r>
-              <a:rPr lang="fr-CA" dirty="0" smtClean="0"/>
-              <a:t> and </a:t>
-            </a:r>
-            <a:r>
-              <a:rPr lang="fr-CA" dirty="0" err="1" smtClean="0"/>
-              <a:t>color</a:t>
-            </a:r>
-            <a:r>
-              <a:rPr lang="fr-CA" dirty="0" smtClean="0"/>
-              <a:t> of the </a:t>
-            </a:r>
-            <a:r>
-              <a:rPr lang="fr-CA" dirty="0" err="1" smtClean="0"/>
-              <a:t>offspring</a:t>
-            </a:r>
-            <a:endParaRPr lang="fr-CA" dirty="0" smtClean="0"/>
-          </a:p>
-          <a:p>
-            <a:pPr lvl="1"/>
-            <a:r>
-              <a:rPr lang="fr-CA" dirty="0" err="1" smtClean="0"/>
-              <a:t>Identify</a:t>
-            </a:r>
-            <a:r>
-              <a:rPr lang="fr-CA" dirty="0" smtClean="0"/>
-              <a:t> </a:t>
-            </a:r>
-            <a:r>
-              <a:rPr lang="fr-CA" dirty="0" err="1" smtClean="0"/>
-              <a:t>when</a:t>
-            </a:r>
-            <a:r>
-              <a:rPr lang="fr-CA" dirty="0" smtClean="0"/>
-              <a:t> a male and a </a:t>
-            </a:r>
-            <a:r>
-              <a:rPr lang="fr-CA" dirty="0" err="1" smtClean="0"/>
-              <a:t>female</a:t>
-            </a:r>
-            <a:r>
-              <a:rPr lang="fr-CA" dirty="0" smtClean="0"/>
-              <a:t> are on a patch </a:t>
-            </a:r>
-            <a:r>
-              <a:rPr lang="fr-CA" dirty="0" err="1" smtClean="0"/>
-              <a:t>together</a:t>
-            </a:r>
-            <a:endParaRPr lang="fr-CA" dirty="0" smtClean="0"/>
-          </a:p>
-          <a:p>
-            <a:pPr lvl="2"/>
-            <a:r>
-              <a:rPr lang="fr-CA" dirty="0" smtClean="0"/>
-              <a:t>And </a:t>
-            </a:r>
-            <a:r>
-              <a:rPr lang="fr-CA" dirty="0" err="1" smtClean="0"/>
-              <a:t>keep</a:t>
-            </a:r>
-            <a:r>
-              <a:rPr lang="fr-CA" dirty="0" smtClean="0"/>
-              <a:t> in memory the ID of </a:t>
-            </a:r>
-            <a:r>
-              <a:rPr lang="fr-CA" dirty="0" err="1" smtClean="0"/>
-              <a:t>these</a:t>
-            </a:r>
-            <a:r>
-              <a:rPr lang="fr-CA" dirty="0" smtClean="0"/>
-              <a:t> </a:t>
-            </a:r>
-            <a:r>
-              <a:rPr lang="fr-CA" dirty="0" err="1" smtClean="0"/>
-              <a:t>females</a:t>
-            </a:r>
-            <a:r>
-              <a:rPr lang="fr-CA" dirty="0" smtClean="0"/>
-              <a:t> </a:t>
-            </a:r>
-            <a:r>
-              <a:rPr lang="fr-CA" dirty="0" err="1" smtClean="0"/>
-              <a:t>which</a:t>
-            </a:r>
-            <a:r>
-              <a:rPr lang="fr-CA" dirty="0" smtClean="0"/>
-              <a:t> </a:t>
-            </a:r>
-            <a:r>
-              <a:rPr lang="fr-CA" dirty="0" err="1" smtClean="0"/>
-              <a:t>will</a:t>
-            </a:r>
-            <a:r>
-              <a:rPr lang="fr-CA" dirty="0" smtClean="0"/>
-              <a:t> </a:t>
-            </a:r>
-            <a:r>
-              <a:rPr lang="fr-CA" dirty="0" err="1" smtClean="0"/>
-              <a:t>reproduce</a:t>
-            </a:r>
-            <a:endParaRPr lang="fr-CA" dirty="0" smtClean="0"/>
-          </a:p>
-          <a:p>
-            <a:pPr lvl="1"/>
-            <a:r>
-              <a:rPr lang="fr-CA" dirty="0" err="1" smtClean="0"/>
-              <a:t>Apply</a:t>
-            </a:r>
-            <a:r>
-              <a:rPr lang="fr-CA" dirty="0" smtClean="0"/>
-              <a:t> the reproduction </a:t>
-            </a:r>
-            <a:r>
-              <a:rPr lang="fr-CA" dirty="0" err="1" smtClean="0"/>
-              <a:t>function</a:t>
-            </a:r>
-            <a:r>
-              <a:rPr lang="fr-CA" dirty="0" smtClean="0"/>
-              <a:t> in </a:t>
-            </a:r>
-            <a:r>
-              <a:rPr lang="fr-CA" dirty="0" err="1" smtClean="0"/>
-              <a:t>this</a:t>
-            </a:r>
-            <a:r>
-              <a:rPr lang="fr-CA" dirty="0" smtClean="0"/>
-              <a:t> case</a:t>
-            </a:r>
-          </a:p>
-          <a:p>
-            <a:pPr lvl="2"/>
-            <a:r>
-              <a:rPr lang="fr-CA" dirty="0" smtClean="0"/>
-              <a:t>Use the </a:t>
-            </a:r>
-            <a:r>
-              <a:rPr lang="fr-CA" dirty="0" err="1" smtClean="0"/>
-              <a:t>movement</a:t>
-            </a:r>
-            <a:r>
-              <a:rPr lang="fr-CA" dirty="0" smtClean="0"/>
-              <a:t> </a:t>
-            </a:r>
-            <a:r>
-              <a:rPr lang="fr-CA" dirty="0" err="1" smtClean="0"/>
-              <a:t>loop</a:t>
-            </a:r>
-            <a:r>
-              <a:rPr lang="fr-CA" dirty="0" smtClean="0"/>
-              <a:t> </a:t>
-            </a:r>
-            <a:r>
-              <a:rPr lang="fr-CA" dirty="0" err="1" smtClean="0"/>
-              <a:t>written</a:t>
-            </a:r>
-            <a:r>
-              <a:rPr lang="fr-CA" dirty="0" smtClean="0"/>
-              <a:t> </a:t>
-            </a:r>
-            <a:r>
-              <a:rPr lang="fr-CA" dirty="0" err="1" smtClean="0"/>
-              <a:t>before</a:t>
-            </a:r>
+              <a:t> (1/3)</a:t>
+            </a:r>
+            <a:r>
+              <a:rPr lang="fr-CA" dirty="0"/>
+              <a:t/>
+            </a:r>
+            <a:br>
+              <a:rPr lang="fr-CA" dirty="0"/>
+            </a:br>
             <a:endParaRPr lang="fr-CA" dirty="0"/>
           </a:p>
-          <a:p>
-            <a:pPr lvl="2"/>
-            <a:r>
-              <a:rPr lang="fr-CA" dirty="0" err="1" smtClean="0"/>
-              <a:t>After</a:t>
-            </a:r>
-            <a:r>
-              <a:rPr lang="fr-CA" dirty="0" smtClean="0"/>
-              <a:t> the </a:t>
-            </a:r>
-            <a:r>
-              <a:rPr lang="fr-CA" dirty="0" err="1" smtClean="0"/>
-              <a:t>movement</a:t>
-            </a:r>
-            <a:r>
-              <a:rPr lang="fr-CA" dirty="0" smtClean="0"/>
-              <a:t>, </a:t>
-            </a:r>
-            <a:r>
-              <a:rPr lang="fr-CA" dirty="0" err="1" smtClean="0"/>
-              <a:t>evaluate</a:t>
-            </a:r>
-            <a:r>
-              <a:rPr lang="fr-CA" dirty="0" smtClean="0"/>
-              <a:t> </a:t>
-            </a:r>
-            <a:r>
-              <a:rPr lang="fr-CA" dirty="0" err="1" smtClean="0"/>
-              <a:t>which</a:t>
-            </a:r>
-            <a:r>
-              <a:rPr lang="fr-CA" dirty="0" smtClean="0"/>
-              <a:t> </a:t>
-            </a:r>
-            <a:r>
-              <a:rPr lang="fr-CA" dirty="0" err="1" smtClean="0"/>
-              <a:t>females</a:t>
-            </a:r>
-            <a:r>
-              <a:rPr lang="fr-CA" dirty="0" smtClean="0"/>
-              <a:t> </a:t>
-            </a:r>
-            <a:r>
-              <a:rPr lang="fr-CA" dirty="0" err="1" smtClean="0"/>
-              <a:t>will</a:t>
-            </a:r>
-            <a:r>
-              <a:rPr lang="fr-CA" dirty="0" smtClean="0"/>
-              <a:t> </a:t>
-            </a:r>
-            <a:r>
-              <a:rPr lang="fr-CA" dirty="0" err="1" smtClean="0"/>
-              <a:t>reproduce</a:t>
-            </a:r>
-            <a:r>
-              <a:rPr lang="fr-CA" dirty="0" smtClean="0"/>
-              <a:t> (i.e., are on a patch </a:t>
-            </a:r>
-            <a:r>
-              <a:rPr lang="fr-CA" dirty="0" err="1" smtClean="0"/>
-              <a:t>with</a:t>
-            </a:r>
-            <a:r>
-              <a:rPr lang="fr-CA" dirty="0" smtClean="0"/>
-              <a:t> a male)</a:t>
-            </a:r>
-          </a:p>
-          <a:p>
-            <a:pPr lvl="2"/>
-            <a:r>
-              <a:rPr lang="fr-CA" dirty="0" smtClean="0"/>
-              <a:t>If </a:t>
-            </a:r>
-            <a:r>
-              <a:rPr lang="fr-CA" dirty="0" err="1" smtClean="0"/>
-              <a:t>there</a:t>
-            </a:r>
-            <a:r>
-              <a:rPr lang="fr-CA" dirty="0" smtClean="0"/>
-              <a:t> are </a:t>
-            </a:r>
-            <a:r>
-              <a:rPr lang="fr-CA" dirty="0" err="1" smtClean="0"/>
-              <a:t>reproducing</a:t>
-            </a:r>
-            <a:r>
-              <a:rPr lang="fr-CA" dirty="0" smtClean="0"/>
-              <a:t> </a:t>
-            </a:r>
-            <a:r>
-              <a:rPr lang="fr-CA" dirty="0" err="1" smtClean="0"/>
-              <a:t>females</a:t>
-            </a:r>
-            <a:r>
-              <a:rPr lang="fr-CA" dirty="0" smtClean="0"/>
-              <a:t>, </a:t>
-            </a:r>
-            <a:r>
-              <a:rPr lang="fr-CA" dirty="0" err="1" smtClean="0"/>
-              <a:t>apply</a:t>
-            </a:r>
-            <a:r>
-              <a:rPr lang="fr-CA" dirty="0" smtClean="0"/>
-              <a:t> reproduction</a:t>
-            </a:r>
-          </a:p>
-        </p:txBody>
-      </p:sp>
-      <p:sp>
-        <p:nvSpPr>
-          <p:cNvPr id="5" name="ZoneTexte 4"/>
-          <p:cNvSpPr txBox="1"/>
-          <p:nvPr/>
+        </p:txBody>
+      </p:sp>
+      <p:sp>
+        <p:nvSpPr>
+          <p:cNvPr id="3" name="Espace réservé du contenu 2"/>
+          <p:cNvSpPr>
+            <a:spLocks noGrp="1"/>
+          </p:cNvSpPr>
+          <p:nvPr>
+            <p:ph idx="1"/>
+          </p:nvPr>
         </p:nvSpPr>
         <p:spPr>
-          <a:xfrm rot="21033023">
-            <a:off x="5299788" y="709127"/>
-            <a:ext cx="1826141" cy="523220"/>
+          <a:xfrm>
+            <a:off x="677333" y="1606732"/>
+            <a:ext cx="10883407" cy="4741040"/>
           </a:xfrm>
-          <a:prstGeom prst="rect">
-            <a:avLst/>
-          </a:prstGeom>
-          <a:solidFill>
-            <a:schemeClr val="accent1">
-              <a:lumMod val="20000"/>
-              <a:lumOff val="80000"/>
-            </a:schemeClr>
-          </a:solidFill>
         </p:spPr>
         <p:txBody>
-          <a:bodyPr wrap="none" rtlCol="0">
-            <a:spAutoFit/>
+          <a:bodyPr>
+            <a:noAutofit/>
           </a:bodyPr>
           <a:lstStyle/>
           <a:p>
             <a:r>
-              <a:rPr lang="fr-CA" sz="2800" dirty="0" smtClean="0">
-                <a:solidFill>
-                  <a:srgbClr val="92D050"/>
-                </a:solidFill>
-              </a:rPr>
-              <a:t>Use help()</a:t>
-            </a:r>
-            <a:endParaRPr lang="fr-CA" sz="2800" dirty="0">
-              <a:solidFill>
-                <a:srgbClr val="92D050"/>
-              </a:solidFill>
-            </a:endParaRPr>
-          </a:p>
-        </p:txBody>
-      </p:sp>
-      <p:sp>
-        <p:nvSpPr>
-          <p:cNvPr id="6" name="ZoneTexte 5"/>
-          <p:cNvSpPr txBox="1"/>
-          <p:nvPr/>
-        </p:nvSpPr>
-        <p:spPr>
-          <a:xfrm rot="469770">
-            <a:off x="7535291" y="377723"/>
-            <a:ext cx="3799438" cy="523220"/>
-          </a:xfrm>
-          <a:prstGeom prst="rect">
-            <a:avLst/>
-          </a:prstGeom>
-          <a:solidFill>
-            <a:schemeClr val="accent1">
-              <a:lumMod val="20000"/>
-              <a:lumOff val="80000"/>
-            </a:schemeClr>
-          </a:solidFill>
-        </p:spPr>
-        <p:txBody>
-          <a:bodyPr wrap="none" rtlCol="0">
-            <a:spAutoFit/>
-          </a:bodyPr>
-          <a:lstStyle/>
-          <a:p>
-            <a:r>
-              <a:rPr lang="fr-CA" sz="2800" dirty="0" smtClean="0">
-                <a:solidFill>
-                  <a:srgbClr val="92D050"/>
-                </a:solidFill>
-              </a:rPr>
-              <a:t>Use </a:t>
-            </a:r>
-            <a:r>
-              <a:rPr lang="fr-CA" sz="2800" dirty="0" err="1" smtClean="0">
-                <a:solidFill>
-                  <a:srgbClr val="92D050"/>
-                </a:solidFill>
-              </a:rPr>
-              <a:t>previous</a:t>
-            </a:r>
-            <a:r>
-              <a:rPr lang="fr-CA" sz="2800" dirty="0" smtClean="0">
-                <a:solidFill>
-                  <a:srgbClr val="92D050"/>
-                </a:solidFill>
-              </a:rPr>
+              <a:rPr lang="fr-CA" sz="2400" dirty="0" err="1" smtClean="0"/>
+              <a:t>Create</a:t>
+            </a:r>
+            <a:r>
+              <a:rPr lang="fr-CA" sz="2400" dirty="0" smtClean="0"/>
+              <a:t> a world of 10 x 10 patches </a:t>
+            </a:r>
+            <a:r>
+              <a:rPr lang="fr-CA" sz="2400" dirty="0" err="1" smtClean="0"/>
+              <a:t>with</a:t>
+            </a:r>
+            <a:r>
+              <a:rPr lang="fr-CA" sz="2400" dirty="0" smtClean="0"/>
               <a:t> </a:t>
             </a:r>
             <a:r>
-              <a:rPr lang="fr-CA" sz="2800" dirty="0" err="1" smtClean="0">
-                <a:solidFill>
-                  <a:srgbClr val="92D050"/>
-                </a:solidFill>
-              </a:rPr>
-              <a:t>exercises</a:t>
-            </a:r>
-            <a:endParaRPr lang="fr-CA" sz="2800" dirty="0">
-              <a:solidFill>
-                <a:srgbClr val="92D050"/>
-              </a:solidFill>
-            </a:endParaRPr>
-          </a:p>
-        </p:txBody>
-      </p:sp>
-      <p:sp>
-        <p:nvSpPr>
-          <p:cNvPr id="7" name="ZoneTexte 6"/>
-          <p:cNvSpPr txBox="1"/>
-          <p:nvPr/>
-        </p:nvSpPr>
-        <p:spPr>
-          <a:xfrm>
-            <a:off x="7156491" y="915919"/>
-            <a:ext cx="2300630" cy="523220"/>
-          </a:xfrm>
-          <a:prstGeom prst="rect">
-            <a:avLst/>
-          </a:prstGeom>
-          <a:solidFill>
-            <a:schemeClr val="accent1">
-              <a:lumMod val="20000"/>
-              <a:lumOff val="80000"/>
-            </a:schemeClr>
-          </a:solidFill>
-        </p:spPr>
-        <p:txBody>
-          <a:bodyPr wrap="none" rtlCol="0">
-            <a:spAutoFit/>
-          </a:bodyPr>
-          <a:lstStyle/>
-          <a:p>
-            <a:r>
-              <a:rPr lang="fr-CA" sz="2800" dirty="0" smtClean="0">
-                <a:solidFill>
-                  <a:srgbClr val="92D050"/>
-                </a:solidFill>
-              </a:rPr>
+              <a:rPr lang="fr-CA" sz="2400" dirty="0" err="1" smtClean="0"/>
+              <a:t>random</a:t>
+            </a:r>
+            <a:r>
+              <a:rPr lang="fr-CA" sz="2400" dirty="0" smtClean="0"/>
+              <a:t> values on </a:t>
+            </a:r>
+            <a:r>
+              <a:rPr lang="fr-CA" sz="2400" dirty="0" err="1" smtClean="0"/>
+              <a:t>each</a:t>
+            </a:r>
+            <a:r>
+              <a:rPr lang="fr-CA" sz="2400" dirty="0" smtClean="0"/>
+              <a:t> patch </a:t>
+            </a:r>
+            <a:r>
+              <a:rPr lang="fr-CA" sz="2400" dirty="0" err="1" smtClean="0"/>
+              <a:t>between</a:t>
+            </a:r>
+            <a:r>
+              <a:rPr lang="fr-CA" sz="2400" dirty="0" smtClean="0"/>
+              <a:t> 0 and 1</a:t>
+            </a:r>
+          </a:p>
+          <a:p>
+            <a:r>
+              <a:rPr lang="fr-CA" sz="2400" dirty="0" err="1" smtClean="0"/>
+              <a:t>Create</a:t>
+            </a:r>
+            <a:r>
+              <a:rPr lang="fr-CA" sz="2400" dirty="0" smtClean="0"/>
+              <a:t> a population </a:t>
+            </a:r>
+            <a:r>
+              <a:rPr lang="fr-CA" sz="2400" dirty="0" err="1" smtClean="0"/>
+              <a:t>with</a:t>
+            </a:r>
+            <a:r>
+              <a:rPr lang="fr-CA" sz="2400" dirty="0" smtClean="0"/>
+              <a:t> 15 males and 15 </a:t>
+            </a:r>
+            <a:r>
+              <a:rPr lang="fr-CA" sz="2400" dirty="0" err="1" smtClean="0"/>
+              <a:t>females</a:t>
+            </a:r>
+            <a:endParaRPr lang="fr-CA" sz="2400" dirty="0" smtClean="0"/>
+          </a:p>
+          <a:p>
+            <a:pPr lvl="1"/>
+            <a:r>
+              <a:rPr lang="fr-CA" sz="2000" dirty="0" err="1" smtClean="0"/>
+              <a:t>Random</a:t>
+            </a:r>
+            <a:r>
+              <a:rPr lang="fr-CA" sz="2000" dirty="0"/>
+              <a:t> </a:t>
+            </a:r>
+            <a:r>
+              <a:rPr lang="fr-CA" sz="2000" dirty="0" smtClean="0"/>
+              <a:t>locations </a:t>
+            </a:r>
+            <a:r>
+              <a:rPr lang="fr-CA" sz="2000" dirty="0" err="1" smtClean="0"/>
+              <a:t>using</a:t>
+            </a:r>
+            <a:r>
+              <a:rPr lang="fr-CA" sz="2000" dirty="0" smtClean="0"/>
+              <a:t> </a:t>
+            </a:r>
+            <a:r>
+              <a:rPr lang="fr-CA" sz="2000" dirty="0" err="1" smtClean="0"/>
+              <a:t>randomXYcor</a:t>
+            </a:r>
+            <a:r>
+              <a:rPr lang="fr-CA" sz="2000" dirty="0" smtClean="0"/>
+              <a:t>()</a:t>
+            </a:r>
+          </a:p>
+          <a:p>
+            <a:pPr lvl="1"/>
+            <a:r>
+              <a:rPr lang="fr-CA" sz="2000" dirty="0" err="1" smtClean="0"/>
+              <a:t>Color</a:t>
+            </a:r>
+            <a:r>
+              <a:rPr lang="fr-CA" sz="2000" dirty="0" smtClean="0"/>
+              <a:t> of males </a:t>
+            </a:r>
+            <a:r>
+              <a:rPr lang="fr-CA" sz="2000" dirty="0"/>
+              <a:t>= </a:t>
+            </a:r>
+            <a:r>
+              <a:rPr lang="fr-CA" sz="2000" dirty="0" err="1"/>
+              <a:t>red</a:t>
+            </a:r>
+            <a:r>
+              <a:rPr lang="fr-CA" sz="2000" dirty="0"/>
+              <a:t>, </a:t>
+            </a:r>
+            <a:r>
+              <a:rPr lang="fr-CA" sz="2000" dirty="0" err="1" smtClean="0"/>
+              <a:t>color</a:t>
+            </a:r>
+            <a:r>
+              <a:rPr lang="fr-CA" sz="2000" dirty="0" smtClean="0"/>
+              <a:t> of </a:t>
+            </a:r>
+            <a:r>
+              <a:rPr lang="fr-CA" sz="2000" dirty="0" err="1" smtClean="0"/>
+              <a:t>females</a:t>
+            </a:r>
+            <a:r>
+              <a:rPr lang="fr-CA" sz="2000" dirty="0" smtClean="0"/>
+              <a:t> </a:t>
+            </a:r>
+            <a:r>
+              <a:rPr lang="fr-CA" sz="2000" dirty="0"/>
+              <a:t>= </a:t>
+            </a:r>
+            <a:r>
+              <a:rPr lang="fr-CA" sz="2000" dirty="0" smtClean="0"/>
+              <a:t>black</a:t>
+            </a:r>
+          </a:p>
+          <a:p>
+            <a:pPr lvl="1"/>
+            <a:endParaRPr lang="fr-CA" sz="2000" dirty="0"/>
+          </a:p>
+          <a:p>
+            <a:r>
+              <a:rPr lang="fr-CA" sz="2400" dirty="0" smtClean="0"/>
               <a:t>Plot </a:t>
             </a:r>
             <a:r>
-              <a:rPr lang="fr-CA" sz="2800" dirty="0" err="1" smtClean="0">
-                <a:solidFill>
-                  <a:srgbClr val="92D050"/>
-                </a:solidFill>
-              </a:rPr>
-              <a:t>can</a:t>
-            </a:r>
-            <a:r>
-              <a:rPr lang="fr-CA" sz="2800" dirty="0" smtClean="0">
-                <a:solidFill>
-                  <a:srgbClr val="92D050"/>
-                </a:solidFill>
-              </a:rPr>
-              <a:t> help</a:t>
-            </a:r>
-            <a:endParaRPr lang="fr-CA" sz="2800" dirty="0">
-              <a:solidFill>
-                <a:srgbClr val="92D050"/>
-              </a:solidFill>
-            </a:endParaRPr>
-          </a:p>
-        </p:txBody>
-      </p:sp>
-      <p:sp>
-        <p:nvSpPr>
-          <p:cNvPr id="8" name="Rectangle 7"/>
+              <a:rPr lang="fr-CA" sz="2400" dirty="0"/>
+              <a:t>the </a:t>
+            </a:r>
+            <a:r>
+              <a:rPr lang="fr-CA" sz="2400" dirty="0" smtClean="0"/>
+              <a:t>world </a:t>
+            </a:r>
+            <a:r>
+              <a:rPr lang="fr-CA" sz="2400" dirty="0" err="1" smtClean="0"/>
+              <a:t>with</a:t>
+            </a:r>
+            <a:r>
+              <a:rPr lang="fr-CA" sz="2400" dirty="0" smtClean="0"/>
+              <a:t> the </a:t>
+            </a:r>
+            <a:r>
+              <a:rPr lang="fr-CA" sz="2400" dirty="0" err="1" smtClean="0"/>
+              <a:t>individuals</a:t>
+            </a:r>
+            <a:r>
+              <a:rPr lang="fr-CA" sz="2400" dirty="0" smtClean="0"/>
+              <a:t> (</a:t>
+            </a:r>
+            <a:r>
+              <a:rPr lang="fr-CA" sz="2400" dirty="0" err="1" smtClean="0"/>
+              <a:t>with</a:t>
+            </a:r>
+            <a:r>
+              <a:rPr lang="fr-CA" sz="2400" dirty="0" smtClean="0"/>
+              <a:t> </a:t>
+            </a:r>
+            <a:r>
+              <a:rPr lang="fr-CA" sz="2400" dirty="0" err="1" smtClean="0"/>
+              <a:t>their</a:t>
+            </a:r>
+            <a:r>
+              <a:rPr lang="fr-CA" sz="2400" dirty="0" smtClean="0"/>
+              <a:t> respective </a:t>
+            </a:r>
+            <a:r>
+              <a:rPr lang="fr-CA" sz="2400" dirty="0" err="1" smtClean="0"/>
+              <a:t>color</a:t>
+            </a:r>
+            <a:r>
+              <a:rPr lang="fr-CA" sz="2400" dirty="0" smtClean="0"/>
+              <a:t>)</a:t>
+            </a:r>
+            <a:endParaRPr lang="fr-CA" sz="2400" dirty="0"/>
+          </a:p>
+          <a:p>
+            <a:r>
+              <a:rPr lang="fr-CA" sz="2400" dirty="0" smtClean="0"/>
+              <a:t>Count </a:t>
+            </a:r>
+            <a:r>
+              <a:rPr lang="fr-CA" sz="2400" dirty="0"/>
+              <a:t>the </a:t>
+            </a:r>
+            <a:r>
+              <a:rPr lang="fr-CA" sz="2400" dirty="0" err="1"/>
+              <a:t>number</a:t>
+            </a:r>
+            <a:r>
+              <a:rPr lang="fr-CA" sz="2400" dirty="0"/>
+              <a:t> </a:t>
+            </a:r>
+            <a:r>
+              <a:rPr lang="fr-CA" sz="2400" dirty="0" smtClean="0"/>
+              <a:t>of total </a:t>
+            </a:r>
+            <a:r>
+              <a:rPr lang="fr-CA" sz="2400" dirty="0" err="1"/>
+              <a:t>individuals</a:t>
+            </a:r>
+            <a:r>
+              <a:rPr lang="fr-CA" sz="2400" dirty="0"/>
+              <a:t>, of males and of </a:t>
+            </a:r>
+            <a:r>
+              <a:rPr lang="fr-CA" sz="2400" dirty="0" err="1"/>
+              <a:t>females</a:t>
+            </a:r>
+            <a:r>
+              <a:rPr lang="fr-CA" sz="2400" dirty="0"/>
+              <a:t> </a:t>
+            </a:r>
+            <a:endParaRPr lang="fr-CA" sz="2400" dirty="0" smtClean="0"/>
+          </a:p>
+          <a:p>
+            <a:pPr lvl="1"/>
+            <a:r>
+              <a:rPr lang="fr-CA" sz="2000" dirty="0" smtClean="0"/>
+              <a:t>Put </a:t>
+            </a:r>
+            <a:r>
+              <a:rPr lang="fr-CA" sz="2000" dirty="0" err="1" smtClean="0"/>
+              <a:t>it</a:t>
+            </a:r>
+            <a:r>
+              <a:rPr lang="fr-CA" sz="2000" dirty="0" smtClean="0"/>
+              <a:t> in 3 </a:t>
+            </a:r>
+            <a:r>
+              <a:rPr lang="fr-CA" sz="2000" dirty="0" err="1" smtClean="0"/>
+              <a:t>vectors</a:t>
+            </a:r>
+            <a:endParaRPr lang="fr-CA" sz="2000" dirty="0"/>
+          </a:p>
+        </p:txBody>
+      </p:sp>
+      <p:sp>
+        <p:nvSpPr>
+          <p:cNvPr id="4" name="Rectangle 3"/>
           <p:cNvSpPr/>
           <p:nvPr/>
         </p:nvSpPr>
@@ -8501,11 +7470,11 @@
           <a:p>
             <a:pPr algn="r"/>
             <a:r>
-              <a:rPr lang="fr-CA" dirty="0"/>
+              <a:rPr lang="fr-CA" dirty="0" smtClean="0"/>
               <a:t>Do the </a:t>
             </a:r>
             <a:r>
-              <a:rPr lang="fr-CA" dirty="0" err="1"/>
+              <a:rPr lang="fr-CA" dirty="0" err="1" smtClean="0"/>
               <a:t>exercise</a:t>
             </a:r>
             <a:r>
@@ -8513,11 +7482,11 @@
               <a:t> </a:t>
             </a:r>
             <a:r>
-              <a:rPr lang="fr-CA" dirty="0" err="1"/>
+              <a:rPr lang="fr-CA" dirty="0" err="1" smtClean="0"/>
               <a:t>with</a:t>
             </a:r>
             <a:r>
-              <a:rPr lang="fr-CA" dirty="0"/>
+              <a:rPr lang="fr-CA" dirty="0" smtClean="0"/>
               <a:t>: 10_ExerciseToDo.R. Help at the end</a:t>
             </a:r>
           </a:p>
@@ -8541,7 +7510,7 @@
     </p:spTree>
     <p:extLst>
       <p:ext uri="{BB962C8B-B14F-4D97-AF65-F5344CB8AC3E}">
-        <p14:creationId xmlns:p14="http://schemas.microsoft.com/office/powerpoint/2010/main" val="3744910360"/>
+        <p14:creationId xmlns:p14="http://schemas.microsoft.com/office/powerpoint/2010/main" val="1923339499"/>
       </p:ext>
     </p:extLst>
   </p:cSld>
@@ -8587,463 +7556,823 @@
         </p:nvSpPr>
         <p:spPr>
           <a:xfrm>
-            <a:off x="677333" y="324307"/>
-            <a:ext cx="9886675" cy="1320800"/>
+            <a:off x="677334" y="609600"/>
+            <a:ext cx="9080620" cy="1320800"/>
           </a:xfrm>
         </p:spPr>
         <p:txBody>
-          <a:bodyPr/>
+          <a:bodyPr>
+            <a:normAutofit fontScale="90000"/>
+          </a:bodyPr>
           <a:lstStyle/>
           <a:p>
             <a:r>
-              <a:rPr lang="fr-CA" dirty="0" smtClean="0"/>
-              <a:t>Main </a:t>
-            </a:r>
+              <a:rPr lang="fr-CA" dirty="0" err="1"/>
+              <a:t>Females</a:t>
+            </a:r>
+            <a:r>
+              <a:rPr lang="fr-CA" dirty="0"/>
+              <a:t> move </a:t>
+            </a:r>
+            <a:r>
+              <a:rPr lang="fr-CA" dirty="0" err="1"/>
+              <a:t>randomly</a:t>
+            </a:r>
+            <a:r>
+              <a:rPr lang="fr-CA" dirty="0"/>
+              <a:t>, males move </a:t>
+            </a:r>
+            <a:r>
+              <a:rPr lang="fr-CA" dirty="0" err="1"/>
+              <a:t>according</a:t>
+            </a:r>
+            <a:r>
+              <a:rPr lang="fr-CA" dirty="0"/>
+              <a:t> to </a:t>
+            </a:r>
+            <a:r>
+              <a:rPr lang="fr-CA" dirty="0" err="1"/>
+              <a:t>females</a:t>
+            </a:r>
+            <a:r>
+              <a:rPr lang="fr-CA" dirty="0"/>
+              <a:t> (2/3)</a:t>
+            </a:r>
+            <a:br>
+              <a:rPr lang="fr-CA" dirty="0"/>
+            </a:br>
+            <a:endParaRPr lang="fr-CA" dirty="0"/>
+          </a:p>
+        </p:txBody>
+      </p:sp>
+      <p:sp>
+        <p:nvSpPr>
+          <p:cNvPr id="3" name="Espace réservé du contenu 2"/>
+          <p:cNvSpPr>
+            <a:spLocks noGrp="1"/>
+          </p:cNvSpPr>
+          <p:nvPr>
+            <p:ph idx="1"/>
+          </p:nvPr>
+        </p:nvSpPr>
+        <p:spPr>
+          <a:xfrm>
+            <a:off x="677333" y="1724297"/>
+            <a:ext cx="10217089" cy="4924697"/>
+          </a:xfrm>
+        </p:spPr>
+        <p:txBody>
+          <a:bodyPr>
+            <a:normAutofit fontScale="92500" lnSpcReduction="20000"/>
+          </a:bodyPr>
+          <a:lstStyle/>
+          <a:p>
+            <a:r>
+              <a:rPr lang="fr-CA" sz="2000" dirty="0" err="1" smtClean="0"/>
+              <a:t>Create</a:t>
+            </a:r>
+            <a:r>
+              <a:rPr lang="fr-CA" sz="2000" dirty="0" smtClean="0"/>
+              <a:t> </a:t>
+            </a:r>
+            <a:r>
+              <a:rPr lang="fr-CA" sz="2000" dirty="0"/>
+              <a:t>2 </a:t>
+            </a:r>
+            <a:r>
+              <a:rPr lang="fr-CA" sz="2000" dirty="0" err="1"/>
+              <a:t>movement</a:t>
+            </a:r>
+            <a:r>
+              <a:rPr lang="fr-CA" sz="2000" dirty="0"/>
+              <a:t> </a:t>
+            </a:r>
+            <a:r>
+              <a:rPr lang="fr-CA" sz="2000" dirty="0" err="1" smtClean="0"/>
+              <a:t>functions</a:t>
+            </a:r>
+            <a:endParaRPr lang="fr-CA" sz="2000" dirty="0"/>
+          </a:p>
+          <a:p>
+            <a:pPr lvl="1"/>
+            <a:r>
+              <a:rPr lang="fr-CA" sz="1800" dirty="0" err="1"/>
+              <a:t>Movement</a:t>
+            </a:r>
+            <a:r>
+              <a:rPr lang="fr-CA" sz="1800" dirty="0"/>
+              <a:t> of </a:t>
+            </a:r>
+            <a:r>
+              <a:rPr lang="fr-CA" sz="1800" dirty="0" err="1"/>
+              <a:t>females</a:t>
+            </a:r>
+            <a:r>
+              <a:rPr lang="fr-CA" sz="1800" dirty="0"/>
+              <a:t>: in an </a:t>
+            </a:r>
+            <a:r>
+              <a:rPr lang="fr-CA" sz="1800" dirty="0" err="1"/>
+              <a:t>random</a:t>
+            </a:r>
+            <a:r>
+              <a:rPr lang="fr-CA" sz="1800" dirty="0"/>
+              <a:t> direction, move </a:t>
+            </a:r>
+            <a:r>
+              <a:rPr lang="fr-CA" sz="1800" dirty="0" smtClean="0"/>
+              <a:t>the distance of 2 </a:t>
+            </a:r>
+            <a:r>
+              <a:rPr lang="fr-CA" sz="1800" dirty="0"/>
+              <a:t>patches at the time, in a </a:t>
+            </a:r>
+            <a:r>
+              <a:rPr lang="fr-CA" sz="1800" dirty="0" err="1"/>
+              <a:t>wrapped</a:t>
+            </a:r>
+            <a:r>
+              <a:rPr lang="fr-CA" sz="1800" dirty="0"/>
+              <a:t> world</a:t>
+            </a:r>
+          </a:p>
+          <a:p>
+            <a:pPr lvl="1"/>
+            <a:r>
+              <a:rPr lang="fr-CA" sz="1800" dirty="0" err="1"/>
+              <a:t>Movement</a:t>
+            </a:r>
+            <a:r>
+              <a:rPr lang="fr-CA" sz="1800" dirty="0"/>
+              <a:t> of males: move </a:t>
+            </a:r>
+            <a:r>
+              <a:rPr lang="fr-CA" sz="1800" dirty="0" smtClean="0"/>
+              <a:t>to the center of </a:t>
+            </a:r>
+            <a:r>
+              <a:rPr lang="fr-CA" sz="1800" dirty="0"/>
+              <a:t>one of the 8 </a:t>
+            </a:r>
+            <a:r>
+              <a:rPr lang="fr-CA" sz="1800" dirty="0" err="1"/>
+              <a:t>neighboring</a:t>
+            </a:r>
+            <a:r>
+              <a:rPr lang="fr-CA" sz="1800" dirty="0"/>
+              <a:t> </a:t>
+            </a:r>
+            <a:r>
+              <a:rPr lang="fr-CA" sz="1800" dirty="0" err="1"/>
+              <a:t>cells</a:t>
+            </a:r>
+            <a:r>
+              <a:rPr lang="fr-CA" sz="1800" dirty="0"/>
+              <a:t> </a:t>
+            </a:r>
+            <a:r>
+              <a:rPr lang="fr-CA" sz="1800" dirty="0" err="1"/>
+              <a:t>where</a:t>
+            </a:r>
+            <a:r>
+              <a:rPr lang="fr-CA" sz="1800" dirty="0"/>
+              <a:t> </a:t>
+            </a:r>
+            <a:r>
+              <a:rPr lang="fr-CA" sz="1800" dirty="0" err="1"/>
+              <a:t>there</a:t>
+            </a:r>
+            <a:r>
+              <a:rPr lang="fr-CA" sz="1800" dirty="0"/>
+              <a:t> </a:t>
+            </a:r>
+            <a:r>
+              <a:rPr lang="fr-CA" sz="1800" dirty="0" err="1"/>
+              <a:t>is</a:t>
+            </a:r>
+            <a:r>
+              <a:rPr lang="fr-CA" sz="1800" dirty="0"/>
+              <a:t> a </a:t>
+            </a:r>
+            <a:r>
+              <a:rPr lang="fr-CA" sz="1800" dirty="0" err="1"/>
+              <a:t>female</a:t>
+            </a:r>
+            <a:r>
+              <a:rPr lang="fr-CA" sz="1800" dirty="0"/>
+              <a:t> on </a:t>
+            </a:r>
+            <a:r>
+              <a:rPr lang="fr-CA" sz="1800" dirty="0" err="1"/>
+              <a:t>it</a:t>
+            </a:r>
+            <a:r>
+              <a:rPr lang="fr-CA" sz="1800" dirty="0"/>
+              <a:t>, </a:t>
+            </a:r>
+            <a:r>
+              <a:rPr lang="fr-CA" sz="1800" dirty="0" err="1"/>
+              <a:t>otherwise</a:t>
+            </a:r>
+            <a:r>
+              <a:rPr lang="fr-CA" sz="1800" dirty="0"/>
+              <a:t> on one of the 8 </a:t>
+            </a:r>
+            <a:r>
+              <a:rPr lang="fr-CA" sz="1800" dirty="0" err="1"/>
+              <a:t>neighboring</a:t>
+            </a:r>
+            <a:r>
+              <a:rPr lang="fr-CA" sz="1800" dirty="0"/>
+              <a:t> </a:t>
+            </a:r>
+            <a:r>
+              <a:rPr lang="fr-CA" sz="1800" dirty="0" err="1"/>
+              <a:t>cells</a:t>
+            </a:r>
+            <a:r>
+              <a:rPr lang="fr-CA" sz="1800" dirty="0"/>
+              <a:t> </a:t>
+            </a:r>
+            <a:r>
+              <a:rPr lang="fr-CA" sz="1800" dirty="0" err="1"/>
+              <a:t>randomly</a:t>
+            </a:r>
+            <a:endParaRPr lang="fr-CA" sz="1800" dirty="0"/>
+          </a:p>
+          <a:p>
+            <a:pPr lvl="2"/>
+            <a:r>
+              <a:rPr lang="fr-CA" sz="1600" dirty="0" err="1"/>
+              <a:t>What</a:t>
+            </a:r>
+            <a:r>
+              <a:rPr lang="fr-CA" sz="1600" dirty="0"/>
+              <a:t> are the </a:t>
+            </a:r>
+            <a:r>
+              <a:rPr lang="fr-CA" sz="1600" dirty="0" err="1"/>
+              <a:t>cells</a:t>
+            </a:r>
+            <a:r>
+              <a:rPr lang="fr-CA" sz="1600" dirty="0"/>
+              <a:t> </a:t>
+            </a:r>
+            <a:r>
+              <a:rPr lang="fr-CA" sz="1600" dirty="0" err="1"/>
+              <a:t>around</a:t>
+            </a:r>
+            <a:r>
+              <a:rPr lang="fr-CA" sz="1600" dirty="0"/>
+              <a:t> the </a:t>
+            </a:r>
+            <a:r>
+              <a:rPr lang="fr-CA" sz="1600" dirty="0" err="1"/>
+              <a:t>individuals</a:t>
+            </a:r>
+            <a:r>
+              <a:rPr lang="fr-CA" sz="1600" dirty="0"/>
+              <a:t>?</a:t>
+            </a:r>
+          </a:p>
+          <a:p>
+            <a:pPr lvl="2"/>
+            <a:r>
+              <a:rPr lang="fr-CA" sz="1600" dirty="0"/>
+              <a:t>On </a:t>
+            </a:r>
+            <a:r>
+              <a:rPr lang="fr-CA" sz="1600" dirty="0" err="1"/>
+              <a:t>which</a:t>
+            </a:r>
+            <a:r>
+              <a:rPr lang="fr-CA" sz="1600" dirty="0"/>
+              <a:t> </a:t>
+            </a:r>
+            <a:r>
+              <a:rPr lang="fr-CA" sz="1600" dirty="0" err="1"/>
+              <a:t>cells</a:t>
+            </a:r>
+            <a:r>
+              <a:rPr lang="fr-CA" sz="1600" dirty="0"/>
+              <a:t> </a:t>
+            </a:r>
+            <a:r>
+              <a:rPr lang="fr-CA" sz="1600" dirty="0" err="1"/>
+              <a:t>there</a:t>
+            </a:r>
+            <a:r>
+              <a:rPr lang="fr-CA" sz="1600" dirty="0"/>
+              <a:t> are </a:t>
+            </a:r>
+            <a:r>
+              <a:rPr lang="fr-CA" sz="1600" dirty="0" err="1"/>
+              <a:t>females</a:t>
+            </a:r>
+            <a:r>
+              <a:rPr lang="fr-CA" sz="1600" dirty="0"/>
+              <a:t>?</a:t>
+            </a:r>
+          </a:p>
+          <a:p>
+            <a:pPr lvl="3"/>
+            <a:r>
+              <a:rPr lang="fr-CA" sz="1400" dirty="0"/>
+              <a:t>If </a:t>
+            </a:r>
+            <a:r>
+              <a:rPr lang="fr-CA" sz="1400" dirty="0" err="1"/>
+              <a:t>there</a:t>
+            </a:r>
+            <a:r>
+              <a:rPr lang="fr-CA" sz="1400" dirty="0"/>
+              <a:t> are </a:t>
+            </a:r>
+            <a:r>
+              <a:rPr lang="fr-CA" sz="1400" dirty="0" err="1"/>
+              <a:t>several</a:t>
+            </a:r>
+            <a:r>
+              <a:rPr lang="fr-CA" sz="1400" dirty="0"/>
+              <a:t> </a:t>
+            </a:r>
+            <a:r>
+              <a:rPr lang="fr-CA" sz="1400" dirty="0" err="1"/>
+              <a:t>cells</a:t>
+            </a:r>
+            <a:r>
+              <a:rPr lang="fr-CA" sz="1400" dirty="0"/>
+              <a:t> </a:t>
+            </a:r>
+            <a:r>
+              <a:rPr lang="fr-CA" sz="1400" dirty="0" err="1"/>
+              <a:t>with</a:t>
+            </a:r>
+            <a:r>
+              <a:rPr lang="fr-CA" sz="1400" dirty="0"/>
+              <a:t> </a:t>
+            </a:r>
+            <a:r>
+              <a:rPr lang="fr-CA" sz="1400" dirty="0" err="1"/>
+              <a:t>females</a:t>
+            </a:r>
+            <a:r>
+              <a:rPr lang="fr-CA" sz="1400" dirty="0"/>
+              <a:t> on </a:t>
+            </a:r>
+            <a:r>
+              <a:rPr lang="fr-CA" sz="1400" dirty="0" err="1"/>
+              <a:t>it</a:t>
+            </a:r>
+            <a:r>
+              <a:rPr lang="fr-CA" sz="1400" dirty="0"/>
+              <a:t>, </a:t>
+            </a:r>
+            <a:r>
+              <a:rPr lang="fr-CA" sz="1400" dirty="0" err="1"/>
+              <a:t>choose</a:t>
+            </a:r>
+            <a:r>
+              <a:rPr lang="fr-CA" sz="1400" dirty="0"/>
+              <a:t> one </a:t>
+            </a:r>
+            <a:r>
+              <a:rPr lang="fr-CA" sz="1400" dirty="0" err="1"/>
+              <a:t>cell</a:t>
+            </a:r>
+            <a:r>
+              <a:rPr lang="fr-CA" sz="1400" dirty="0"/>
+              <a:t> </a:t>
+            </a:r>
+            <a:r>
+              <a:rPr lang="fr-CA" sz="1400" dirty="0" err="1"/>
+              <a:t>among</a:t>
+            </a:r>
+            <a:r>
+              <a:rPr lang="fr-CA" sz="1400" dirty="0"/>
+              <a:t> </a:t>
+            </a:r>
+            <a:r>
+              <a:rPr lang="fr-CA" sz="1400" dirty="0" err="1"/>
+              <a:t>these</a:t>
+            </a:r>
+            <a:r>
+              <a:rPr lang="fr-CA" sz="1400" dirty="0"/>
+              <a:t> </a:t>
+            </a:r>
+            <a:r>
+              <a:rPr lang="fr-CA" sz="1400" dirty="0" err="1"/>
+              <a:t>ones</a:t>
+            </a:r>
+            <a:r>
+              <a:rPr lang="fr-CA" sz="1400" dirty="0"/>
+              <a:t> </a:t>
+            </a:r>
+            <a:r>
+              <a:rPr lang="fr-CA" sz="1400" dirty="0" err="1"/>
+              <a:t>randomly</a:t>
+            </a:r>
+            <a:endParaRPr lang="fr-CA" sz="1400" dirty="0"/>
+          </a:p>
+          <a:p>
+            <a:pPr lvl="3"/>
+            <a:r>
+              <a:rPr lang="fr-CA" sz="1400" dirty="0"/>
+              <a:t>If </a:t>
+            </a:r>
+            <a:r>
+              <a:rPr lang="fr-CA" sz="1400" dirty="0" err="1"/>
+              <a:t>there</a:t>
+            </a:r>
+            <a:r>
+              <a:rPr lang="fr-CA" sz="1400" dirty="0"/>
+              <a:t> </a:t>
+            </a:r>
+            <a:r>
+              <a:rPr lang="fr-CA" sz="1400" dirty="0" err="1"/>
+              <a:t>is</a:t>
+            </a:r>
+            <a:r>
+              <a:rPr lang="fr-CA" sz="1400" dirty="0"/>
+              <a:t> one </a:t>
+            </a:r>
+            <a:r>
+              <a:rPr lang="fr-CA" sz="1400" dirty="0" err="1"/>
+              <a:t>cell</a:t>
+            </a:r>
+            <a:r>
+              <a:rPr lang="fr-CA" sz="1400" dirty="0"/>
+              <a:t> </a:t>
+            </a:r>
+            <a:r>
+              <a:rPr lang="fr-CA" sz="1400" dirty="0" err="1"/>
+              <a:t>with</a:t>
+            </a:r>
+            <a:r>
+              <a:rPr lang="fr-CA" sz="1400" dirty="0"/>
+              <a:t> </a:t>
+            </a:r>
+            <a:r>
+              <a:rPr lang="fr-CA" sz="1400" dirty="0" err="1"/>
+              <a:t>female</a:t>
+            </a:r>
+            <a:r>
+              <a:rPr lang="fr-CA" sz="1400" dirty="0"/>
+              <a:t>(s) on </a:t>
+            </a:r>
+            <a:r>
+              <a:rPr lang="fr-CA" sz="1400" dirty="0" err="1"/>
+              <a:t>it</a:t>
+            </a:r>
+            <a:r>
+              <a:rPr lang="fr-CA" sz="1400" dirty="0"/>
+              <a:t>, </a:t>
+            </a:r>
+            <a:r>
+              <a:rPr lang="fr-CA" sz="1400" dirty="0" err="1"/>
+              <a:t>choose</a:t>
+            </a:r>
+            <a:r>
+              <a:rPr lang="fr-CA" sz="1400" dirty="0"/>
+              <a:t> </a:t>
+            </a:r>
+            <a:r>
+              <a:rPr lang="fr-CA" sz="1400" dirty="0" err="1"/>
+              <a:t>this</a:t>
+            </a:r>
+            <a:r>
+              <a:rPr lang="fr-CA" sz="1400" dirty="0"/>
+              <a:t> </a:t>
+            </a:r>
+            <a:r>
+              <a:rPr lang="fr-CA" sz="1400" dirty="0" err="1"/>
+              <a:t>cell</a:t>
+            </a:r>
+            <a:endParaRPr lang="fr-CA" sz="1400" dirty="0"/>
+          </a:p>
+          <a:p>
+            <a:pPr lvl="3"/>
+            <a:r>
+              <a:rPr lang="fr-CA" sz="1400" dirty="0"/>
+              <a:t>If </a:t>
+            </a:r>
+            <a:r>
+              <a:rPr lang="fr-CA" sz="1400" dirty="0" err="1"/>
+              <a:t>there</a:t>
+            </a:r>
+            <a:r>
+              <a:rPr lang="fr-CA" sz="1400" dirty="0"/>
+              <a:t> are no </a:t>
+            </a:r>
+            <a:r>
+              <a:rPr lang="fr-CA" sz="1400" dirty="0" err="1"/>
+              <a:t>females</a:t>
+            </a:r>
+            <a:r>
+              <a:rPr lang="fr-CA" sz="1400" dirty="0"/>
+              <a:t> on the </a:t>
+            </a:r>
+            <a:r>
+              <a:rPr lang="fr-CA" sz="1400" dirty="0" err="1"/>
+              <a:t>cells</a:t>
+            </a:r>
+            <a:r>
+              <a:rPr lang="fr-CA" sz="1400" dirty="0"/>
+              <a:t> </a:t>
+            </a:r>
+            <a:r>
+              <a:rPr lang="fr-CA" sz="1400" dirty="0" err="1"/>
+              <a:t>around</a:t>
+            </a:r>
+            <a:r>
+              <a:rPr lang="fr-CA" sz="1400" dirty="0"/>
+              <a:t>, </a:t>
+            </a:r>
+            <a:r>
+              <a:rPr lang="fr-CA" sz="1400" dirty="0" err="1"/>
+              <a:t>choose</a:t>
+            </a:r>
+            <a:r>
+              <a:rPr lang="fr-CA" sz="1400" dirty="0"/>
+              <a:t> one </a:t>
+            </a:r>
+            <a:r>
+              <a:rPr lang="fr-CA" sz="1400" dirty="0" err="1"/>
+              <a:t>cell</a:t>
+            </a:r>
+            <a:r>
+              <a:rPr lang="fr-CA" sz="1400" dirty="0"/>
+              <a:t> </a:t>
+            </a:r>
+            <a:r>
+              <a:rPr lang="fr-CA" sz="1400" dirty="0" err="1" smtClean="0"/>
+              <a:t>randomly</a:t>
+            </a:r>
+            <a:endParaRPr lang="fr-CA" sz="1400" dirty="0" smtClean="0"/>
+          </a:p>
+          <a:p>
+            <a:pPr lvl="3"/>
+            <a:endParaRPr lang="fr-CA" sz="1400" dirty="0"/>
+          </a:p>
+          <a:p>
+            <a:r>
+              <a:rPr lang="fr-CA" sz="2000" dirty="0" err="1"/>
+              <a:t>Create</a:t>
+            </a:r>
+            <a:r>
+              <a:rPr lang="fr-CA" sz="2000" dirty="0"/>
+              <a:t> a </a:t>
+            </a:r>
+            <a:r>
+              <a:rPr lang="fr-CA" sz="2000" dirty="0" err="1"/>
+              <a:t>loop</a:t>
+            </a:r>
+            <a:r>
+              <a:rPr lang="fr-CA" sz="2000" dirty="0"/>
+              <a:t> of 20 times </a:t>
+            </a:r>
+            <a:r>
+              <a:rPr lang="fr-CA" sz="2000" dirty="0" err="1"/>
+              <a:t>steps</a:t>
+            </a:r>
+            <a:r>
+              <a:rPr lang="fr-CA" sz="2000" dirty="0"/>
+              <a:t> </a:t>
+            </a:r>
+            <a:r>
+              <a:rPr lang="fr-CA" sz="2000" dirty="0" err="1"/>
+              <a:t>where</a:t>
+            </a:r>
+            <a:r>
+              <a:rPr lang="fr-CA" sz="2000" dirty="0"/>
+              <a:t> all </a:t>
+            </a:r>
+            <a:r>
+              <a:rPr lang="fr-CA" sz="2000" dirty="0" err="1"/>
+              <a:t>females</a:t>
+            </a:r>
+            <a:r>
+              <a:rPr lang="fr-CA" sz="2000" dirty="0"/>
+              <a:t> move first </a:t>
+            </a:r>
+            <a:r>
+              <a:rPr lang="fr-CA" sz="2000" dirty="0" err="1"/>
+              <a:t>then</a:t>
+            </a:r>
+            <a:r>
+              <a:rPr lang="fr-CA" sz="2000" dirty="0"/>
+              <a:t> all the </a:t>
+            </a:r>
+            <a:r>
+              <a:rPr lang="fr-CA" sz="2000" dirty="0" smtClean="0"/>
+              <a:t>males</a:t>
+            </a:r>
+          </a:p>
+          <a:p>
+            <a:pPr lvl="1"/>
+            <a:r>
+              <a:rPr lang="fr-CA" sz="1800" dirty="0" smtClean="0"/>
+              <a:t>Plot the world and the </a:t>
+            </a:r>
+            <a:r>
+              <a:rPr lang="fr-CA" sz="1800" dirty="0" err="1" smtClean="0"/>
+              <a:t>individuals</a:t>
+            </a:r>
+            <a:r>
+              <a:rPr lang="fr-CA" sz="1800" dirty="0" smtClean="0"/>
+              <a:t> at </a:t>
+            </a:r>
+            <a:r>
+              <a:rPr lang="fr-CA" sz="1800" dirty="0" err="1" smtClean="0"/>
+              <a:t>each</a:t>
+            </a:r>
+            <a:r>
+              <a:rPr lang="fr-CA" sz="1800" dirty="0" smtClean="0"/>
+              <a:t> time </a:t>
+            </a:r>
+            <a:r>
+              <a:rPr lang="fr-CA" sz="1800" dirty="0" err="1" smtClean="0"/>
+              <a:t>step</a:t>
+            </a:r>
+            <a:endParaRPr lang="fr-CA" sz="1800" dirty="0" smtClean="0"/>
+          </a:p>
+          <a:p>
+            <a:pPr lvl="2"/>
             <a:r>
               <a:rPr lang="fr-CA" dirty="0" err="1" smtClean="0"/>
-              <a:t>steps</a:t>
-            </a:r>
-            <a:r>
-              <a:rPr lang="fr-CA" dirty="0" smtClean="0"/>
-              <a:t> to </a:t>
-            </a:r>
-            <a:r>
-              <a:rPr lang="fr-CA" dirty="0" err="1" smtClean="0"/>
-              <a:t>build</a:t>
-            </a:r>
-            <a:r>
-              <a:rPr lang="fr-CA" dirty="0" smtClean="0"/>
-              <a:t> an IBM </a:t>
-            </a:r>
-            <a:r>
-              <a:rPr lang="fr-CA" dirty="0" err="1" smtClean="0"/>
-              <a:t>with</a:t>
+              <a:t>Add</a:t>
             </a:r>
             <a:r>
               <a:rPr lang="fr-CA" dirty="0" smtClean="0"/>
               <a:t> </a:t>
             </a:r>
             <a:r>
-              <a:rPr lang="fr-CA" dirty="0" err="1" smtClean="0"/>
-              <a:t>NetLogoR</a:t>
+              <a:rPr lang="fr-CA" dirty="0" err="1"/>
+              <a:t>plotting</a:t>
+            </a:r>
+            <a:r>
+              <a:rPr lang="fr-CA" dirty="0"/>
+              <a:t> </a:t>
+            </a:r>
+            <a:r>
+              <a:rPr lang="fr-CA" dirty="0" err="1"/>
+              <a:t>functions</a:t>
+            </a:r>
+            <a:r>
+              <a:rPr lang="fr-CA" dirty="0"/>
+              <a:t> </a:t>
+            </a:r>
+            <a:r>
+              <a:rPr lang="fr-CA" dirty="0" err="1"/>
+              <a:t>after</a:t>
+            </a:r>
+            <a:r>
+              <a:rPr lang="fr-CA" dirty="0"/>
+              <a:t> all </a:t>
+            </a:r>
+            <a:r>
+              <a:rPr lang="fr-CA" dirty="0" err="1"/>
+              <a:t>other</a:t>
+            </a:r>
+            <a:r>
+              <a:rPr lang="fr-CA" dirty="0"/>
+              <a:t> </a:t>
+            </a:r>
+            <a:r>
+              <a:rPr lang="fr-CA" dirty="0" err="1"/>
+              <a:t>functions</a:t>
             </a:r>
             <a:endParaRPr lang="fr-CA" dirty="0"/>
           </a:p>
-        </p:txBody>
-      </p:sp>
-      <p:sp>
-        <p:nvSpPr>
-          <p:cNvPr id="3" name="Espace réservé du contenu 2"/>
-          <p:cNvSpPr>
-            <a:spLocks noGrp="1"/>
-          </p:cNvSpPr>
-          <p:nvPr>
-            <p:ph idx="1"/>
-          </p:nvPr>
+          <a:p>
+            <a:pPr lvl="2"/>
+            <a:r>
+              <a:rPr lang="fr-CA" dirty="0"/>
+              <a:t>Plot males and </a:t>
+            </a:r>
+            <a:r>
+              <a:rPr lang="fr-CA" dirty="0" err="1"/>
+              <a:t>females</a:t>
+            </a:r>
+            <a:r>
+              <a:rPr lang="fr-CA" dirty="0"/>
+              <a:t> </a:t>
+            </a:r>
+            <a:r>
+              <a:rPr lang="fr-CA" dirty="0" err="1"/>
+              <a:t>with</a:t>
+            </a:r>
+            <a:r>
+              <a:rPr lang="fr-CA" dirty="0"/>
+              <a:t> </a:t>
+            </a:r>
+            <a:r>
+              <a:rPr lang="fr-CA" dirty="0" err="1"/>
+              <a:t>their</a:t>
+            </a:r>
+            <a:r>
+              <a:rPr lang="fr-CA" dirty="0"/>
+              <a:t> respective </a:t>
+            </a:r>
+            <a:r>
+              <a:rPr lang="fr-CA" dirty="0" err="1"/>
+              <a:t>colors</a:t>
+            </a:r>
+            <a:endParaRPr lang="fr-CA" dirty="0"/>
+          </a:p>
+          <a:p>
+            <a:pPr lvl="2"/>
+            <a:r>
+              <a:rPr lang="fr-CA" dirty="0"/>
+              <a:t>Use </a:t>
+            </a:r>
+            <a:r>
+              <a:rPr lang="fr-CA" dirty="0" err="1"/>
+              <a:t>Sys.sleep</a:t>
+            </a:r>
+            <a:r>
+              <a:rPr lang="fr-CA" dirty="0"/>
+              <a:t>(1) to slow the </a:t>
+            </a:r>
+            <a:r>
+              <a:rPr lang="fr-CA" dirty="0" err="1"/>
+              <a:t>function</a:t>
+            </a:r>
+            <a:endParaRPr lang="fr-CA" dirty="0"/>
+          </a:p>
+          <a:p>
+            <a:pPr lvl="1"/>
+            <a:endParaRPr lang="fr-CA" sz="1800" dirty="0"/>
+          </a:p>
+          <a:p>
+            <a:endParaRPr lang="fr-CA" dirty="0"/>
+          </a:p>
+        </p:txBody>
+      </p:sp>
+      <p:sp>
+        <p:nvSpPr>
+          <p:cNvPr id="4" name="Rectangle 3"/>
+          <p:cNvSpPr/>
+          <p:nvPr/>
         </p:nvSpPr>
         <p:spPr>
           <a:xfrm>
-            <a:off x="395021" y="1243584"/>
-            <a:ext cx="10351007" cy="5464453"/>
+            <a:off x="6018387" y="6233612"/>
+            <a:ext cx="6173613" cy="646331"/>
           </a:xfrm>
+          <a:prstGeom prst="rect">
+            <a:avLst/>
+          </a:prstGeom>
         </p:spPr>
         <p:txBody>
-          <a:bodyPr>
-            <a:normAutofit fontScale="85000" lnSpcReduction="10000"/>
+          <a:bodyPr wrap="none">
+            <a:spAutoFit/>
           </a:bodyPr>
           <a:lstStyle/>
           <a:p>
-            <a:r>
-              <a:rPr lang="en-US" dirty="0" smtClean="0"/>
-              <a:t>Draw the </a:t>
-            </a:r>
-            <a:r>
-              <a:rPr lang="en-US" sz="2100" b="1" u="sng" dirty="0" smtClean="0"/>
-              <a:t>model diagram</a:t>
-            </a:r>
-            <a:r>
-              <a:rPr lang="en-US" sz="2100" dirty="0" smtClean="0"/>
+            <a:pPr algn="r"/>
+            <a:r>
+              <a:rPr lang="fr-CA" dirty="0"/>
+              <a:t>Do the </a:t>
+            </a:r>
+            <a:r>
+              <a:rPr lang="fr-CA" dirty="0" err="1"/>
+              <a:t>exercise</a:t>
+            </a:r>
+            <a:r>
+              <a:rPr lang="fr-CA" dirty="0"/>
               <a:t> </a:t>
             </a:r>
             <a:r>
-              <a:rPr lang="en-US" dirty="0" smtClean="0"/>
-              <a:t>to define the workflow</a:t>
-            </a:r>
-            <a:r>
-              <a:rPr lang="en-US" dirty="0"/>
+              <a:rPr lang="fr-CA" dirty="0" err="1"/>
+              <a:t>with</a:t>
+            </a:r>
+            <a:r>
+              <a:rPr lang="fr-CA" dirty="0"/>
+              <a:t>: 10_ExerciseToDo.R. Help at the end</a:t>
+            </a:r>
+          </a:p>
+          <a:p>
+            <a:pPr algn="r"/>
+            <a:r>
+              <a:rPr lang="fr-CA" dirty="0" err="1" smtClean="0"/>
+              <a:t>Exercise</a:t>
+            </a:r>
+            <a:r>
+              <a:rPr lang="fr-CA" dirty="0" smtClean="0"/>
               <a:t> </a:t>
             </a:r>
             <a:r>
-              <a:rPr lang="en-US" dirty="0" smtClean="0"/>
-              <a:t>and identify the different processes and their relationships.</a:t>
-            </a:r>
-            <a:endParaRPr lang="en-US" dirty="0"/>
-          </a:p>
-          <a:p>
-            <a:r>
-              <a:rPr lang="en-US" dirty="0" smtClean="0"/>
-              <a:t>Create </a:t>
-            </a:r>
-            <a:r>
-              <a:rPr lang="en-US" dirty="0"/>
-              <a:t>the world in which the agents will evolve with the function </a:t>
-            </a:r>
-            <a:r>
-              <a:rPr lang="en-US" sz="2100" b="1" u="sng" dirty="0" err="1"/>
-              <a:t>createWorld</a:t>
-            </a:r>
-            <a:r>
-              <a:rPr lang="en-US" sz="2100" b="1" u="sng" dirty="0" smtClean="0"/>
-              <a:t>()</a:t>
-            </a:r>
-            <a:r>
-              <a:rPr lang="en-US" sz="2100" dirty="0" smtClean="0"/>
-              <a:t> </a:t>
-            </a:r>
-            <a:r>
-              <a:rPr lang="en-US" dirty="0" smtClean="0"/>
-              <a:t>and assign patch values if necessary. Visualize </a:t>
-            </a:r>
-            <a:r>
-              <a:rPr lang="en-US" dirty="0"/>
-              <a:t>the world with plot(</a:t>
-            </a:r>
-            <a:r>
-              <a:rPr lang="en-US" dirty="0" err="1"/>
-              <a:t>nameWorld</a:t>
-            </a:r>
-            <a:r>
-              <a:rPr lang="en-US" dirty="0" smtClean="0"/>
-              <a:t>).</a:t>
-            </a:r>
-            <a:endParaRPr lang="en-US" dirty="0"/>
-          </a:p>
-          <a:p>
-            <a:r>
-              <a:rPr lang="en-US" dirty="0"/>
-              <a:t>Create the turtles (i.e., moving agents) with the function </a:t>
-            </a:r>
-            <a:r>
-              <a:rPr lang="en-US" sz="2100" b="1" u="sng" dirty="0" err="1"/>
-              <a:t>createTurtles</a:t>
-            </a:r>
-            <a:r>
-              <a:rPr lang="en-US" sz="2100" b="1" u="sng" dirty="0"/>
-              <a:t>()</a:t>
-            </a:r>
-            <a:r>
-              <a:rPr lang="en-US" dirty="0"/>
-              <a:t>. </a:t>
-            </a:r>
-            <a:r>
-              <a:rPr lang="en-US" dirty="0" smtClean="0"/>
-              <a:t>Visualize </a:t>
-            </a:r>
-            <a:r>
-              <a:rPr lang="en-US" dirty="0"/>
-              <a:t>the turtles by plotting them on the world with </a:t>
-            </a:r>
-            <a:r>
-              <a:rPr lang="en-US" dirty="0" smtClean="0"/>
-              <a:t>points(</a:t>
-            </a:r>
-            <a:r>
-              <a:rPr lang="en-US" dirty="0" err="1" smtClean="0"/>
-              <a:t>nameTurtles</a:t>
-            </a:r>
-            <a:r>
-              <a:rPr lang="en-US" dirty="0" smtClean="0"/>
-              <a:t>).</a:t>
-            </a:r>
-            <a:endParaRPr lang="en-US" dirty="0"/>
-          </a:p>
-          <a:p>
-            <a:r>
-              <a:rPr lang="en-US" sz="2100" b="1" u="sng" dirty="0"/>
-              <a:t>Create the different </a:t>
-            </a:r>
-            <a:r>
-              <a:rPr lang="en-US" sz="2100" b="1" u="sng" dirty="0" smtClean="0"/>
-              <a:t>processes </a:t>
-            </a:r>
-            <a:r>
-              <a:rPr lang="en-US" dirty="0" smtClean="0"/>
-              <a:t>(i.e</a:t>
-            </a:r>
-            <a:r>
-              <a:rPr lang="en-US" dirty="0"/>
-              <a:t>., functions affecting the </a:t>
-            </a:r>
-            <a:r>
-              <a:rPr lang="en-US" dirty="0" smtClean="0"/>
-              <a:t>patches and/or turtles) </a:t>
-            </a:r>
-            <a:r>
-              <a:rPr lang="en-US" dirty="0"/>
-              <a:t>by using the </a:t>
-            </a:r>
-            <a:r>
-              <a:rPr lang="en-US" dirty="0" err="1"/>
-              <a:t>NetLogoR</a:t>
-            </a:r>
-            <a:r>
-              <a:rPr lang="en-US" dirty="0"/>
-              <a:t> functions, the R functions or some from other packages</a:t>
-            </a:r>
-            <a:r>
-              <a:rPr lang="en-US" dirty="0" smtClean="0"/>
-              <a:t>.</a:t>
-            </a:r>
-          </a:p>
-          <a:p>
-            <a:r>
-              <a:rPr lang="en-US" dirty="0" smtClean="0"/>
-              <a:t>Don’t hesitate to use </a:t>
-            </a:r>
-            <a:r>
-              <a:rPr lang="en-US" sz="2100" b="1" u="sng" dirty="0" smtClean="0"/>
-              <a:t>help()</a:t>
-            </a:r>
-            <a:r>
-              <a:rPr lang="en-US" sz="2100" dirty="0" smtClean="0"/>
-              <a:t> </a:t>
-            </a:r>
-            <a:r>
-              <a:rPr lang="en-US" dirty="0" smtClean="0"/>
-              <a:t>to understand how </a:t>
-            </a:r>
-            <a:r>
-              <a:rPr lang="en-US" dirty="0" err="1" smtClean="0"/>
-              <a:t>NetLogoR</a:t>
-            </a:r>
-            <a:r>
-              <a:rPr lang="en-US" dirty="0" smtClean="0"/>
-              <a:t> functions and their arguments work. Don’t hesitate to look at the </a:t>
-            </a:r>
-            <a:r>
-              <a:rPr lang="en-US" sz="2100" b="1" u="sng" dirty="0" smtClean="0"/>
-              <a:t>list of </a:t>
-            </a:r>
-            <a:r>
-              <a:rPr lang="en-US" sz="2100" b="1" u="sng" dirty="0" err="1" smtClean="0"/>
-              <a:t>NetLogoR</a:t>
-            </a:r>
-            <a:r>
-              <a:rPr lang="en-US" sz="2100" b="1" u="sng" dirty="0" smtClean="0"/>
-              <a:t> functions </a:t>
-            </a:r>
-            <a:r>
-              <a:rPr lang="en-US" dirty="0" smtClean="0"/>
-              <a:t>to find a function which already does what you want to do.</a:t>
-            </a:r>
-            <a:endParaRPr lang="en-US" dirty="0"/>
-          </a:p>
-          <a:p>
-            <a:r>
-              <a:rPr lang="en-US" sz="2100" b="1" u="sng" dirty="0" smtClean="0"/>
-              <a:t>Test</a:t>
-            </a:r>
-            <a:r>
-              <a:rPr lang="en-US" sz="2100" dirty="0" smtClean="0"/>
-              <a:t> </a:t>
-            </a:r>
-            <a:r>
-              <a:rPr lang="en-US" dirty="0"/>
-              <a:t>the different </a:t>
-            </a:r>
-            <a:r>
-              <a:rPr lang="en-US" dirty="0" smtClean="0"/>
-              <a:t>processes individually </a:t>
-            </a:r>
-            <a:r>
-              <a:rPr lang="en-US" sz="2100" b="1" u="sng" dirty="0"/>
-              <a:t>with a small world and a few numbers of turtles </a:t>
-            </a:r>
-            <a:r>
-              <a:rPr lang="en-US" dirty="0"/>
-              <a:t>to make sure the code is doing what you want it to do</a:t>
-            </a:r>
-            <a:r>
-              <a:rPr lang="en-US" dirty="0" smtClean="0"/>
-              <a:t>.</a:t>
-            </a:r>
-          </a:p>
-          <a:p>
-            <a:r>
-              <a:rPr lang="en-US" sz="2100" b="1" u="sng" dirty="0" smtClean="0"/>
-              <a:t>Plot</a:t>
-            </a:r>
-            <a:r>
-              <a:rPr lang="en-US" sz="2100" dirty="0" smtClean="0"/>
-              <a:t> </a:t>
-            </a:r>
-            <a:r>
-              <a:rPr lang="en-US" dirty="0" smtClean="0"/>
-              <a:t>regularly to </a:t>
-            </a:r>
-            <a:r>
-              <a:rPr lang="en-US" dirty="0"/>
-              <a:t>make sure the code is doing what you want it to </a:t>
-            </a:r>
-            <a:r>
-              <a:rPr lang="en-US" dirty="0" smtClean="0"/>
-              <a:t>do. Visuals are of great help to spot bugs in model. Also </a:t>
-            </a:r>
-            <a:r>
-              <a:rPr lang="en-US" sz="2100" b="1" u="sng" dirty="0" smtClean="0"/>
-              <a:t>display </a:t>
-            </a:r>
-            <a:r>
-              <a:rPr lang="en-US" sz="2100" b="1" u="sng" dirty="0"/>
-              <a:t>elements</a:t>
-            </a:r>
-            <a:r>
-              <a:rPr lang="en-US" sz="2100" b="1" u="sng" dirty="0" smtClean="0"/>
-              <a:t> </a:t>
-            </a:r>
-            <a:r>
-              <a:rPr lang="en-US" dirty="0" smtClean="0"/>
-              <a:t>(what’s inside the world and the turtles objects) regularly.</a:t>
-            </a:r>
-          </a:p>
-          <a:p>
-            <a:r>
-              <a:rPr lang="en-US" dirty="0" smtClean="0"/>
-              <a:t>Then</a:t>
-            </a:r>
-            <a:r>
-              <a:rPr lang="en-US" dirty="0"/>
-              <a:t>, build the </a:t>
-            </a:r>
-            <a:r>
-              <a:rPr lang="en-US" sz="2100" b="1" u="sng" dirty="0"/>
-              <a:t>main procedure </a:t>
-            </a:r>
-            <a:r>
-              <a:rPr lang="en-US" dirty="0"/>
-              <a:t>for the </a:t>
-            </a:r>
-            <a:r>
-              <a:rPr lang="en-US" dirty="0" smtClean="0"/>
-              <a:t>model (e.g., with a for-loop </a:t>
-            </a:r>
-            <a:r>
-              <a:rPr lang="en-US" dirty="0"/>
-              <a:t>or a scheduler </a:t>
-            </a:r>
-            <a:r>
-              <a:rPr lang="en-US" dirty="0" smtClean="0"/>
-              <a:t>function). The </a:t>
-            </a:r>
-            <a:r>
-              <a:rPr lang="en-US" dirty="0"/>
-              <a:t>functions placed inside the for-loop or the scheduler function will be iterated the number of time steps defined. </a:t>
-            </a:r>
-            <a:endParaRPr lang="en-US" dirty="0" smtClean="0"/>
-          </a:p>
-          <a:p>
-            <a:r>
-              <a:rPr lang="en-US" dirty="0" smtClean="0"/>
-              <a:t>Create </a:t>
-            </a:r>
-            <a:r>
-              <a:rPr lang="en-US" sz="2100" b="1" u="sng" dirty="0" smtClean="0"/>
-              <a:t>test </a:t>
-            </a:r>
-            <a:r>
-              <a:rPr lang="en-US" sz="2100" b="1" u="sng" dirty="0"/>
-              <a:t>units </a:t>
-            </a:r>
-            <a:r>
-              <a:rPr lang="en-US" dirty="0"/>
-              <a:t>to </a:t>
-            </a:r>
-            <a:r>
-              <a:rPr lang="en-US" dirty="0" smtClean="0"/>
-              <a:t>check if there are some bugs and to </a:t>
-            </a:r>
-            <a:r>
-              <a:rPr lang="en-US" dirty="0"/>
-              <a:t>locate </a:t>
-            </a:r>
-            <a:r>
-              <a:rPr lang="en-US" dirty="0" smtClean="0"/>
-              <a:t>them easily. </a:t>
-            </a:r>
-            <a:r>
-              <a:rPr lang="en-US" dirty="0"/>
-              <a:t>Use </a:t>
-            </a:r>
-            <a:r>
-              <a:rPr lang="en-US" sz="2100" b="1" u="sng" dirty="0"/>
-              <a:t>browser() </a:t>
-            </a:r>
-            <a:r>
-              <a:rPr lang="en-US" dirty="0"/>
-              <a:t>when debugging</a:t>
-            </a:r>
-            <a:r>
-              <a:rPr lang="en-US" dirty="0" smtClean="0"/>
-              <a:t>.</a:t>
-            </a:r>
-          </a:p>
-          <a:p>
-            <a:r>
-              <a:rPr lang="en-US" sz="2100" b="1" u="sng" dirty="0" smtClean="0"/>
-              <a:t>Visuals</a:t>
-            </a:r>
-            <a:r>
-              <a:rPr lang="en-US" sz="2100" dirty="0" smtClean="0"/>
-              <a:t> </a:t>
-            </a:r>
-            <a:r>
-              <a:rPr lang="en-US" dirty="0"/>
-              <a:t>can be </a:t>
-            </a:r>
-            <a:r>
-              <a:rPr lang="en-US" dirty="0" smtClean="0"/>
-              <a:t>plotted </a:t>
-            </a:r>
-            <a:r>
-              <a:rPr lang="en-US" dirty="0"/>
-              <a:t>at each time step and/or </a:t>
-            </a:r>
-            <a:r>
-              <a:rPr lang="en-US" dirty="0" smtClean="0"/>
-              <a:t>at </a:t>
-            </a:r>
-            <a:r>
-              <a:rPr lang="en-US" dirty="0"/>
-              <a:t>the end when the iterations are over. </a:t>
-            </a:r>
-            <a:r>
-              <a:rPr lang="en-US" dirty="0" smtClean="0"/>
-              <a:t>Plot </a:t>
-            </a:r>
-            <a:r>
-              <a:rPr lang="en-US" dirty="0"/>
-              <a:t>functions take time to be executed and </a:t>
-            </a:r>
-            <a:r>
-              <a:rPr lang="en-US" dirty="0" smtClean="0"/>
-              <a:t>slow </a:t>
-            </a:r>
-            <a:r>
-              <a:rPr lang="en-US" dirty="0"/>
-              <a:t>down the </a:t>
-            </a:r>
-            <a:r>
-              <a:rPr lang="en-US" dirty="0" smtClean="0"/>
-              <a:t>model but they are of great help.</a:t>
-            </a:r>
-            <a:endParaRPr lang="fr-CA" dirty="0"/>
+              <a:rPr lang="fr-CA" dirty="0"/>
+              <a:t>solutions: 11_ExerciseSolutions.R</a:t>
+            </a:r>
           </a:p>
         </p:txBody>
       </p:sp>
     </p:spTree>
     <p:extLst>
       <p:ext uri="{BB962C8B-B14F-4D97-AF65-F5344CB8AC3E}">
-        <p14:creationId xmlns:p14="http://schemas.microsoft.com/office/powerpoint/2010/main" val="1658004668"/>
+        <p14:creationId xmlns:p14="http://schemas.microsoft.com/office/powerpoint/2010/main" val="1454751761"/>
       </p:ext>
     </p:extLst>
   </p:cSld>
@@ -9087,20 +8416,36 @@
             <p:ph type="title"/>
           </p:nvPr>
         </p:nvSpPr>
-        <p:spPr/>
+        <p:spPr>
+          <a:xfrm>
+            <a:off x="677334" y="609600"/>
+            <a:ext cx="9472506" cy="1320800"/>
+          </a:xfrm>
+        </p:spPr>
         <p:txBody>
           <a:bodyPr/>
           <a:lstStyle/>
           <a:p>
             <a:r>
-              <a:rPr lang="fr-CA" dirty="0" err="1" smtClean="0"/>
-              <a:t>Exercise</a:t>
-            </a:r>
-            <a:r>
-              <a:rPr lang="fr-CA" dirty="0" smtClean="0"/>
-              <a:t> 3/3</a:t>
-            </a:r>
-            <a:endParaRPr lang="fr-CA" dirty="0"/>
+              <a:rPr lang="fr-CA" dirty="0"/>
+              <a:t>Reproduction </a:t>
+            </a:r>
+            <a:r>
+              <a:rPr lang="fr-CA" dirty="0" err="1"/>
+              <a:t>creates</a:t>
+            </a:r>
+            <a:r>
+              <a:rPr lang="fr-CA" dirty="0"/>
+              <a:t> a new </a:t>
+            </a:r>
+            <a:r>
+              <a:rPr lang="fr-CA" dirty="0" err="1"/>
+              <a:t>individual</a:t>
+            </a:r>
+            <a:r>
+              <a:rPr lang="fr-CA" dirty="0"/>
+              <a:t> (3/3)</a:t>
+            </a:r>
           </a:p>
         </p:txBody>
       </p:sp>
@@ -9116,506 +8461,133 @@
         </p:nvSpPr>
         <p:spPr>
           <a:xfrm>
-            <a:off x="398033" y="1609344"/>
-            <a:ext cx="10671586" cy="5248655"/>
+            <a:off x="398032" y="1432480"/>
+            <a:ext cx="11332414" cy="5294891"/>
           </a:xfrm>
         </p:spPr>
         <p:txBody>
           <a:bodyPr>
-            <a:normAutofit/>
+            <a:normAutofit fontScale="62500" lnSpcReduction="20000"/>
           </a:bodyPr>
           <a:lstStyle/>
           <a:p>
             <a:r>
-              <a:rPr lang="fr-CA" dirty="0" smtClean="0"/>
-              <a:t>Plot and show the </a:t>
-            </a:r>
-            <a:r>
-              <a:rPr lang="fr-CA" dirty="0" err="1" smtClean="0"/>
-              <a:t>evolution</a:t>
-            </a:r>
-            <a:r>
-              <a:rPr lang="fr-CA" dirty="0" smtClean="0"/>
-              <a:t> of the population</a:t>
+              <a:rPr lang="en-US" sz="2600" dirty="0"/>
+              <a:t>Make reproduction happens when a male is on the same patch as a female, with the production of one offspring</a:t>
             </a:r>
           </a:p>
           <a:p>
             <a:pPr lvl="1"/>
             <a:r>
-              <a:rPr lang="fr-CA" dirty="0" smtClean="0"/>
-              <a:t>Plot the world</a:t>
+              <a:rPr lang="en-US" sz="2600" dirty="0"/>
+              <a:t>Define a reproduction function where all females produce one offspring each</a:t>
+            </a:r>
+          </a:p>
+          <a:p>
+            <a:pPr lvl="2"/>
+            <a:r>
+              <a:rPr lang="en-US" sz="2300" dirty="0"/>
+              <a:t>Update the sex (randomly), breed and color (according to the sex) of the offspring</a:t>
             </a:r>
           </a:p>
           <a:p>
             <a:pPr lvl="1"/>
             <a:r>
-              <a:rPr lang="fr-CA" dirty="0" smtClean="0"/>
-              <a:t>Plot the </a:t>
-            </a:r>
-            <a:r>
-              <a:rPr lang="fr-CA" dirty="0" err="1" smtClean="0"/>
-              <a:t>individuals</a:t>
-            </a:r>
-            <a:r>
-              <a:rPr lang="fr-CA" dirty="0" smtClean="0"/>
-              <a:t> at </a:t>
-            </a:r>
-            <a:r>
-              <a:rPr lang="fr-CA" dirty="0" err="1" smtClean="0"/>
-              <a:t>each</a:t>
-            </a:r>
-            <a:r>
-              <a:rPr lang="fr-CA" dirty="0" smtClean="0"/>
-              <a:t> time </a:t>
-            </a:r>
-            <a:r>
-              <a:rPr lang="fr-CA" dirty="0" err="1" smtClean="0"/>
-              <a:t>step</a:t>
-            </a:r>
-            <a:r>
-              <a:rPr lang="fr-CA" dirty="0" smtClean="0"/>
-              <a:t> </a:t>
-            </a:r>
-          </a:p>
-          <a:p>
-            <a:pPr lvl="2"/>
-            <a:r>
-              <a:rPr lang="fr-CA" dirty="0" err="1" smtClean="0"/>
-              <a:t>Add</a:t>
-            </a:r>
-            <a:r>
-              <a:rPr lang="fr-CA" dirty="0" smtClean="0"/>
-              <a:t> </a:t>
-            </a:r>
-            <a:r>
-              <a:rPr lang="fr-CA" dirty="0" err="1" smtClean="0"/>
-              <a:t>plotting</a:t>
-            </a:r>
-            <a:r>
-              <a:rPr lang="fr-CA" dirty="0" smtClean="0"/>
-              <a:t> </a:t>
-            </a:r>
-            <a:r>
-              <a:rPr lang="fr-CA" dirty="0" err="1" smtClean="0"/>
-              <a:t>functions</a:t>
-            </a:r>
-            <a:r>
-              <a:rPr lang="fr-CA" dirty="0" smtClean="0"/>
-              <a:t> </a:t>
-            </a:r>
-            <a:r>
-              <a:rPr lang="fr-CA" dirty="0" err="1" smtClean="0"/>
-              <a:t>after</a:t>
-            </a:r>
-            <a:r>
-              <a:rPr lang="fr-CA" dirty="0" smtClean="0"/>
-              <a:t> all </a:t>
-            </a:r>
-            <a:r>
-              <a:rPr lang="fr-CA" dirty="0" err="1" smtClean="0"/>
-              <a:t>other</a:t>
-            </a:r>
-            <a:r>
-              <a:rPr lang="fr-CA" dirty="0" smtClean="0"/>
-              <a:t> </a:t>
-            </a:r>
-            <a:r>
-              <a:rPr lang="fr-CA" dirty="0" err="1" smtClean="0"/>
-              <a:t>functions</a:t>
-            </a:r>
-            <a:endParaRPr lang="fr-CA" dirty="0" smtClean="0"/>
-          </a:p>
-          <a:p>
-            <a:pPr lvl="2"/>
-            <a:r>
-              <a:rPr lang="fr-CA" dirty="0" smtClean="0"/>
-              <a:t>Plot males and </a:t>
-            </a:r>
-            <a:r>
-              <a:rPr lang="fr-CA" dirty="0" err="1" smtClean="0"/>
-              <a:t>females</a:t>
-            </a:r>
-            <a:r>
-              <a:rPr lang="fr-CA" dirty="0" smtClean="0"/>
-              <a:t> </a:t>
-            </a:r>
-            <a:r>
-              <a:rPr lang="fr-CA" dirty="0" err="1" smtClean="0"/>
-              <a:t>with</a:t>
-            </a:r>
-            <a:r>
-              <a:rPr lang="fr-CA" dirty="0" smtClean="0"/>
-              <a:t> </a:t>
-            </a:r>
-            <a:r>
-              <a:rPr lang="fr-CA" dirty="0" err="1" smtClean="0"/>
-              <a:t>their</a:t>
-            </a:r>
-            <a:r>
-              <a:rPr lang="fr-CA" dirty="0" smtClean="0"/>
-              <a:t> respective </a:t>
-            </a:r>
-            <a:r>
-              <a:rPr lang="fr-CA" dirty="0" err="1" smtClean="0"/>
-              <a:t>colors</a:t>
-            </a:r>
-            <a:endParaRPr lang="fr-CA" dirty="0" smtClean="0"/>
-          </a:p>
-          <a:p>
-            <a:pPr lvl="2"/>
-            <a:r>
-              <a:rPr lang="fr-CA" dirty="0" smtClean="0"/>
-              <a:t>Use </a:t>
-            </a:r>
-            <a:r>
-              <a:rPr lang="fr-CA" dirty="0" err="1" smtClean="0"/>
-              <a:t>Sys.sleep</a:t>
-            </a:r>
-            <a:r>
-              <a:rPr lang="fr-CA" dirty="0" smtClean="0"/>
-              <a:t>(1) to slow the </a:t>
-            </a:r>
-            <a:r>
-              <a:rPr lang="fr-CA" dirty="0" err="1" smtClean="0"/>
-              <a:t>function</a:t>
-            </a:r>
-            <a:endParaRPr lang="fr-CA" dirty="0" smtClean="0"/>
+              <a:rPr lang="en-US" sz="2600" dirty="0"/>
+              <a:t>Identify when a male and a female are on a patch together</a:t>
+            </a:r>
           </a:p>
           <a:p>
             <a:pPr lvl="1"/>
             <a:r>
-              <a:rPr lang="fr-CA" dirty="0" smtClean="0"/>
-              <a:t>Count the </a:t>
-            </a:r>
-            <a:r>
-              <a:rPr lang="fr-CA" dirty="0" err="1" smtClean="0"/>
-              <a:t>number</a:t>
-            </a:r>
-            <a:r>
-              <a:rPr lang="fr-CA" dirty="0" smtClean="0"/>
-              <a:t> of </a:t>
-            </a:r>
-            <a:r>
-              <a:rPr lang="fr-CA" dirty="0" err="1" smtClean="0"/>
-              <a:t>individuals</a:t>
-            </a:r>
-            <a:r>
-              <a:rPr lang="fr-CA" dirty="0" smtClean="0"/>
-              <a:t>, of males and of </a:t>
-            </a:r>
-            <a:r>
-              <a:rPr lang="fr-CA" dirty="0" err="1" smtClean="0"/>
-              <a:t>females</a:t>
-            </a:r>
-            <a:r>
-              <a:rPr lang="fr-CA" dirty="0" smtClean="0"/>
-              <a:t> at </a:t>
-            </a:r>
-            <a:r>
-              <a:rPr lang="fr-CA" dirty="0" err="1" smtClean="0"/>
-              <a:t>each</a:t>
-            </a:r>
-            <a:r>
-              <a:rPr lang="fr-CA" dirty="0" smtClean="0"/>
-              <a:t> time </a:t>
-            </a:r>
-            <a:r>
-              <a:rPr lang="fr-CA" dirty="0" err="1" smtClean="0"/>
-              <a:t>step</a:t>
-            </a:r>
-            <a:endParaRPr lang="fr-CA" dirty="0" smtClean="0"/>
-          </a:p>
-          <a:p>
-            <a:pPr lvl="2"/>
-            <a:r>
-              <a:rPr lang="fr-CA" dirty="0" err="1" smtClean="0"/>
-              <a:t>Increment</a:t>
-            </a:r>
-            <a:r>
-              <a:rPr lang="fr-CA" dirty="0" smtClean="0"/>
-              <a:t> </a:t>
-            </a:r>
-            <a:r>
-              <a:rPr lang="fr-CA" dirty="0" err="1" smtClean="0"/>
-              <a:t>this</a:t>
-            </a:r>
-            <a:r>
-              <a:rPr lang="fr-CA" dirty="0" smtClean="0"/>
-              <a:t> </a:t>
-            </a:r>
-            <a:r>
-              <a:rPr lang="fr-CA" dirty="0" err="1" smtClean="0"/>
-              <a:t>vector</a:t>
-            </a:r>
-            <a:r>
-              <a:rPr lang="fr-CA" dirty="0" smtClean="0"/>
-              <a:t> at </a:t>
-            </a:r>
-            <a:r>
-              <a:rPr lang="fr-CA" dirty="0" err="1" smtClean="0"/>
-              <a:t>each</a:t>
-            </a:r>
-            <a:r>
-              <a:rPr lang="fr-CA" dirty="0" smtClean="0"/>
-              <a:t> time </a:t>
-            </a:r>
-            <a:r>
-              <a:rPr lang="fr-CA" dirty="0" err="1" smtClean="0"/>
-              <a:t>step</a:t>
-            </a:r>
-            <a:endParaRPr lang="fr-CA" dirty="0" smtClean="0"/>
+              <a:rPr lang="en-US" sz="2600" dirty="0" smtClean="0"/>
+              <a:t>Keep </a:t>
+            </a:r>
+            <a:r>
+              <a:rPr lang="en-US" sz="2600" dirty="0"/>
+              <a:t>in memory the ID of these females which will reproduce</a:t>
+            </a:r>
           </a:p>
           <a:p>
             <a:pPr lvl="1"/>
             <a:r>
-              <a:rPr lang="fr-CA" dirty="0" smtClean="0"/>
-              <a:t>Plot the </a:t>
-            </a:r>
-            <a:r>
-              <a:rPr lang="fr-CA" dirty="0" err="1" smtClean="0"/>
-              <a:t>number</a:t>
-            </a:r>
-            <a:r>
-              <a:rPr lang="fr-CA" dirty="0" smtClean="0"/>
-              <a:t> of </a:t>
-            </a:r>
-            <a:r>
-              <a:rPr lang="fr-CA" dirty="0" err="1" smtClean="0"/>
-              <a:t>individuals</a:t>
-            </a:r>
-            <a:r>
-              <a:rPr lang="fr-CA" dirty="0" smtClean="0"/>
-              <a:t> (all, males and </a:t>
-            </a:r>
-            <a:r>
-              <a:rPr lang="fr-CA" dirty="0" err="1" smtClean="0"/>
-              <a:t>females</a:t>
-            </a:r>
-            <a:r>
-              <a:rPr lang="fr-CA" dirty="0" smtClean="0"/>
-              <a:t>) over time</a:t>
-            </a:r>
-          </a:p>
-          <a:p>
-            <a:pPr lvl="2"/>
-            <a:r>
-              <a:rPr lang="fr-CA" dirty="0" smtClean="0"/>
-              <a:t>Plot line </a:t>
-            </a:r>
-            <a:r>
-              <a:rPr lang="fr-CA" dirty="0" err="1" smtClean="0"/>
-              <a:t>color</a:t>
-            </a:r>
-            <a:r>
-              <a:rPr lang="fr-CA" dirty="0" smtClean="0"/>
-              <a:t> </a:t>
-            </a:r>
-            <a:r>
-              <a:rPr lang="fr-CA" dirty="0" err="1" smtClean="0"/>
-              <a:t>according</a:t>
-            </a:r>
-            <a:r>
-              <a:rPr lang="fr-CA" dirty="0" smtClean="0"/>
-              <a:t> to the male and </a:t>
-            </a:r>
-            <a:r>
-              <a:rPr lang="fr-CA" dirty="0" err="1" smtClean="0"/>
-              <a:t>female</a:t>
-            </a:r>
-            <a:r>
-              <a:rPr lang="fr-CA" dirty="0" smtClean="0"/>
-              <a:t> </a:t>
-            </a:r>
-            <a:r>
-              <a:rPr lang="fr-CA" dirty="0" err="1" smtClean="0"/>
-              <a:t>colors</a:t>
-            </a:r>
-            <a:endParaRPr lang="fr-CA" dirty="0" smtClean="0"/>
-          </a:p>
-          <a:p>
-            <a:pPr lvl="2"/>
-            <a:r>
-              <a:rPr lang="fr-CA" dirty="0" err="1" smtClean="0"/>
-              <a:t>Add</a:t>
-            </a:r>
-            <a:r>
-              <a:rPr lang="fr-CA" dirty="0" smtClean="0"/>
-              <a:t> a </a:t>
-            </a:r>
-            <a:r>
-              <a:rPr lang="fr-CA" dirty="0" err="1" smtClean="0"/>
-              <a:t>legend</a:t>
-            </a:r>
-            <a:endParaRPr lang="fr-CA" dirty="0"/>
-          </a:p>
-        </p:txBody>
-      </p:sp>
-      <p:sp>
-        <p:nvSpPr>
-          <p:cNvPr id="5" name="ZoneTexte 4"/>
-          <p:cNvSpPr txBox="1"/>
-          <p:nvPr/>
-        </p:nvSpPr>
-        <p:spPr>
-          <a:xfrm rot="21033023">
-            <a:off x="5299788" y="709127"/>
-            <a:ext cx="1826141" cy="523220"/>
-          </a:xfrm>
-          <a:prstGeom prst="rect">
-            <a:avLst/>
-          </a:prstGeom>
-          <a:solidFill>
-            <a:schemeClr val="accent1">
-              <a:lumMod val="20000"/>
-              <a:lumOff val="80000"/>
-            </a:schemeClr>
-          </a:solidFill>
-        </p:spPr>
-        <p:txBody>
-          <a:bodyPr wrap="none" rtlCol="0">
-            <a:spAutoFit/>
-          </a:bodyPr>
-          <a:lstStyle/>
-          <a:p>
-            <a:r>
-              <a:rPr lang="fr-CA" sz="2800" dirty="0" smtClean="0">
-                <a:solidFill>
-                  <a:srgbClr val="92D050"/>
-                </a:solidFill>
-              </a:rPr>
-              <a:t>Use help()</a:t>
-            </a:r>
-            <a:endParaRPr lang="fr-CA" sz="2800" dirty="0">
-              <a:solidFill>
-                <a:srgbClr val="92D050"/>
-              </a:solidFill>
-            </a:endParaRPr>
-          </a:p>
-        </p:txBody>
-      </p:sp>
-      <p:sp>
-        <p:nvSpPr>
-          <p:cNvPr id="6" name="ZoneTexte 5"/>
-          <p:cNvSpPr txBox="1"/>
-          <p:nvPr/>
-        </p:nvSpPr>
-        <p:spPr>
-          <a:xfrm rot="469770">
-            <a:off x="7535291" y="377723"/>
-            <a:ext cx="3799438" cy="523220"/>
-          </a:xfrm>
-          <a:prstGeom prst="rect">
-            <a:avLst/>
-          </a:prstGeom>
-          <a:solidFill>
-            <a:schemeClr val="accent1">
-              <a:lumMod val="20000"/>
-              <a:lumOff val="80000"/>
-            </a:schemeClr>
-          </a:solidFill>
-        </p:spPr>
-        <p:txBody>
-          <a:bodyPr wrap="none" rtlCol="0">
-            <a:spAutoFit/>
-          </a:bodyPr>
-          <a:lstStyle/>
-          <a:p>
-            <a:r>
-              <a:rPr lang="fr-CA" sz="2800" dirty="0" smtClean="0">
-                <a:solidFill>
-                  <a:srgbClr val="92D050"/>
-                </a:solidFill>
-              </a:rPr>
-              <a:t>Use </a:t>
-            </a:r>
-            <a:r>
-              <a:rPr lang="fr-CA" sz="2800" dirty="0" err="1" smtClean="0">
-                <a:solidFill>
-                  <a:srgbClr val="92D050"/>
-                </a:solidFill>
-              </a:rPr>
-              <a:t>previous</a:t>
-            </a:r>
-            <a:r>
-              <a:rPr lang="fr-CA" sz="2800" dirty="0" smtClean="0">
-                <a:solidFill>
-                  <a:srgbClr val="92D050"/>
-                </a:solidFill>
-              </a:rPr>
-              <a:t> </a:t>
-            </a:r>
-            <a:r>
-              <a:rPr lang="fr-CA" sz="2800" dirty="0" err="1" smtClean="0">
-                <a:solidFill>
-                  <a:srgbClr val="92D050"/>
-                </a:solidFill>
-              </a:rPr>
-              <a:t>exercises</a:t>
-            </a:r>
-            <a:endParaRPr lang="fr-CA" sz="2800" dirty="0">
-              <a:solidFill>
-                <a:srgbClr val="92D050"/>
-              </a:solidFill>
-            </a:endParaRPr>
-          </a:p>
-        </p:txBody>
-      </p:sp>
-      <p:sp>
-        <p:nvSpPr>
-          <p:cNvPr id="7" name="ZoneTexte 6"/>
-          <p:cNvSpPr txBox="1"/>
-          <p:nvPr/>
-        </p:nvSpPr>
-        <p:spPr>
-          <a:xfrm>
-            <a:off x="7156491" y="915919"/>
-            <a:ext cx="2300630" cy="523220"/>
-          </a:xfrm>
-          <a:prstGeom prst="rect">
-            <a:avLst/>
-          </a:prstGeom>
-          <a:solidFill>
-            <a:schemeClr val="accent1">
-              <a:lumMod val="20000"/>
-              <a:lumOff val="80000"/>
-            </a:schemeClr>
-          </a:solidFill>
-        </p:spPr>
-        <p:txBody>
-          <a:bodyPr wrap="none" rtlCol="0">
-            <a:spAutoFit/>
-          </a:bodyPr>
-          <a:lstStyle/>
-          <a:p>
-            <a:r>
-              <a:rPr lang="fr-CA" sz="2800" dirty="0" smtClean="0">
-                <a:solidFill>
-                  <a:srgbClr val="92D050"/>
-                </a:solidFill>
-              </a:rPr>
-              <a:t>Plot </a:t>
-            </a:r>
-            <a:r>
-              <a:rPr lang="fr-CA" sz="2800" dirty="0" err="1" smtClean="0">
-                <a:solidFill>
-                  <a:srgbClr val="92D050"/>
-                </a:solidFill>
-              </a:rPr>
-              <a:t>can</a:t>
-            </a:r>
-            <a:r>
-              <a:rPr lang="fr-CA" sz="2800" dirty="0" smtClean="0">
-                <a:solidFill>
-                  <a:srgbClr val="92D050"/>
-                </a:solidFill>
-              </a:rPr>
-              <a:t> help</a:t>
-            </a:r>
-            <a:endParaRPr lang="fr-CA" sz="2800" dirty="0">
-              <a:solidFill>
-                <a:srgbClr val="92D050"/>
-              </a:solidFill>
-            </a:endParaRPr>
+              <a:rPr lang="en-US" sz="2600" dirty="0"/>
+              <a:t>Apply the reproduction function in this </a:t>
+            </a:r>
+            <a:r>
+              <a:rPr lang="en-US" sz="2600" dirty="0" smtClean="0"/>
+              <a:t>case</a:t>
+            </a:r>
+          </a:p>
+          <a:p>
+            <a:pPr lvl="1"/>
+            <a:endParaRPr lang="en-US" sz="2600" dirty="0"/>
+          </a:p>
+          <a:p>
+            <a:r>
+              <a:rPr lang="en-US" sz="2600" dirty="0"/>
+              <a:t>Use the movement loop written before</a:t>
+            </a:r>
+          </a:p>
+          <a:p>
+            <a:pPr lvl="1"/>
+            <a:r>
+              <a:rPr lang="en-US" sz="2600" dirty="0"/>
+              <a:t>After the movement, evaluate which females will reproduce (i.e., are on a patch with a male)</a:t>
+            </a:r>
+          </a:p>
+          <a:p>
+            <a:pPr lvl="1"/>
+            <a:r>
+              <a:rPr lang="en-US" sz="2600" dirty="0"/>
+              <a:t>If there are reproducing females, apply reproduction</a:t>
+            </a:r>
+          </a:p>
+          <a:p>
+            <a:endParaRPr lang="en-US" sz="2600" dirty="0"/>
+          </a:p>
+          <a:p>
+            <a:r>
+              <a:rPr lang="en-US" sz="2600" dirty="0"/>
+              <a:t>Count the number of individuals, of males and of females at each time step</a:t>
+            </a:r>
+          </a:p>
+          <a:p>
+            <a:pPr lvl="1"/>
+            <a:r>
+              <a:rPr lang="en-US" sz="2600" dirty="0"/>
+              <a:t>Increment this vector at each time step</a:t>
+            </a:r>
+          </a:p>
+          <a:p>
+            <a:r>
+              <a:rPr lang="en-US" sz="2600" dirty="0" smtClean="0"/>
+              <a:t>At then end, plot </a:t>
+            </a:r>
+            <a:r>
+              <a:rPr lang="en-US" sz="2600" dirty="0"/>
+              <a:t>the number of individuals (all, males and females) over time</a:t>
+            </a:r>
+          </a:p>
+          <a:p>
+            <a:pPr lvl="1"/>
+            <a:r>
+              <a:rPr lang="en-US" sz="2600" dirty="0"/>
+              <a:t>Plot line color according to the male and female colors</a:t>
+            </a:r>
+          </a:p>
+          <a:p>
+            <a:pPr lvl="1"/>
+            <a:r>
+              <a:rPr lang="en-US" sz="2600" dirty="0"/>
+              <a:t>Add a legend</a:t>
+            </a:r>
+          </a:p>
+          <a:p>
+            <a:pPr marL="0" indent="0">
+              <a:buNone/>
+            </a:pPr>
+            <a:endParaRPr lang="fr-CA" sz="2200" dirty="0" smtClean="0"/>
           </a:p>
         </p:txBody>
       </p:sp>
@@ -9682,7 +8654,7 @@
     </p:spTree>
     <p:extLst>
       <p:ext uri="{BB962C8B-B14F-4D97-AF65-F5344CB8AC3E}">
-        <p14:creationId xmlns:p14="http://schemas.microsoft.com/office/powerpoint/2010/main" val="2815940581"/>
+        <p14:creationId xmlns:p14="http://schemas.microsoft.com/office/powerpoint/2010/main" val="3744910360"/>
       </p:ext>
     </p:extLst>
   </p:cSld>
@@ -9718,508 +8690,6 @@
       </p:grpSpPr>
       <p:sp>
         <p:nvSpPr>
-          <p:cNvPr id="2" name="Titre 1"/>
-          <p:cNvSpPr>
-            <a:spLocks noGrp="1"/>
-          </p:cNvSpPr>
-          <p:nvPr>
-            <p:ph type="title"/>
-          </p:nvPr>
-        </p:nvSpPr>
-        <p:spPr>
-          <a:xfrm>
-            <a:off x="677333" y="324307"/>
-            <a:ext cx="9886675" cy="1320800"/>
-          </a:xfrm>
-        </p:spPr>
-        <p:txBody>
-          <a:bodyPr/>
-          <a:lstStyle/>
-          <a:p>
-            <a:r>
-              <a:rPr lang="fr-CA" dirty="0" smtClean="0"/>
-              <a:t>Main </a:t>
-            </a:r>
-            <a:r>
-              <a:rPr lang="fr-CA" dirty="0" err="1" smtClean="0"/>
-              <a:t>steps</a:t>
-            </a:r>
-            <a:r>
-              <a:rPr lang="fr-CA" dirty="0" smtClean="0"/>
-              <a:t> to </a:t>
-            </a:r>
-            <a:r>
-              <a:rPr lang="fr-CA" dirty="0" err="1" smtClean="0"/>
-              <a:t>build</a:t>
-            </a:r>
-            <a:r>
-              <a:rPr lang="fr-CA" dirty="0" smtClean="0"/>
-              <a:t> an IBM </a:t>
-            </a:r>
-            <a:r>
-              <a:rPr lang="fr-CA" dirty="0" err="1" smtClean="0"/>
-              <a:t>with</a:t>
-            </a:r>
-            <a:r>
-              <a:rPr lang="fr-CA" dirty="0" smtClean="0"/>
-              <a:t> </a:t>
-            </a:r>
-            <a:r>
-              <a:rPr lang="fr-CA" dirty="0" err="1" smtClean="0"/>
-              <a:t>NetLogoR</a:t>
-            </a:r>
-            <a:endParaRPr lang="fr-CA" dirty="0"/>
-          </a:p>
-        </p:txBody>
-      </p:sp>
-      <p:sp>
-        <p:nvSpPr>
-          <p:cNvPr id="3" name="Espace réservé du contenu 2"/>
-          <p:cNvSpPr>
-            <a:spLocks noGrp="1"/>
-          </p:cNvSpPr>
-          <p:nvPr>
-            <p:ph idx="1"/>
-          </p:nvPr>
-        </p:nvSpPr>
-        <p:spPr>
-          <a:xfrm>
-            <a:off x="395021" y="1243584"/>
-            <a:ext cx="10351007" cy="5464453"/>
-          </a:xfrm>
-        </p:spPr>
-        <p:txBody>
-          <a:bodyPr>
-            <a:normAutofit fontScale="85000" lnSpcReduction="10000"/>
-          </a:bodyPr>
-          <a:lstStyle/>
-          <a:p>
-            <a:r>
-              <a:rPr lang="en-US" dirty="0" smtClean="0"/>
-              <a:t>Draw the </a:t>
-            </a:r>
-            <a:r>
-              <a:rPr lang="en-US" sz="2100" b="1" u="sng" dirty="0" smtClean="0"/>
-              <a:t>model diagram</a:t>
-            </a:r>
-            <a:r>
-              <a:rPr lang="en-US" sz="2100" dirty="0" smtClean="0"/>
-              <a:t> </a:t>
-            </a:r>
-            <a:r>
-              <a:rPr lang="en-US" dirty="0" smtClean="0"/>
-              <a:t>to define the workflow</a:t>
-            </a:r>
-            <a:r>
-              <a:rPr lang="en-US" dirty="0"/>
-              <a:t> </a:t>
-            </a:r>
-            <a:r>
-              <a:rPr lang="en-US" dirty="0" smtClean="0"/>
-              <a:t>and identify the different processes and their relationships.</a:t>
-            </a:r>
-            <a:endParaRPr lang="en-US" dirty="0"/>
-          </a:p>
-          <a:p>
-            <a:r>
-              <a:rPr lang="en-US" dirty="0" smtClean="0"/>
-              <a:t>Create </a:t>
-            </a:r>
-            <a:r>
-              <a:rPr lang="en-US" dirty="0"/>
-              <a:t>the world in which the agents will evolve with the function </a:t>
-            </a:r>
-            <a:r>
-              <a:rPr lang="en-US" sz="2100" b="1" u="sng" dirty="0" err="1"/>
-              <a:t>createWorld</a:t>
-            </a:r>
-            <a:r>
-              <a:rPr lang="en-US" sz="2100" b="1" u="sng" dirty="0" smtClean="0"/>
-              <a:t>()</a:t>
-            </a:r>
-            <a:r>
-              <a:rPr lang="en-US" sz="2100" dirty="0" smtClean="0"/>
-              <a:t> </a:t>
-            </a:r>
-            <a:r>
-              <a:rPr lang="en-US" dirty="0" smtClean="0"/>
-              <a:t>and assign patch values if necessary. Visualize </a:t>
-            </a:r>
-            <a:r>
-              <a:rPr lang="en-US" dirty="0"/>
-              <a:t>the world with plot(</a:t>
-            </a:r>
-            <a:r>
-              <a:rPr lang="en-US" dirty="0" err="1"/>
-              <a:t>nameWorld</a:t>
-            </a:r>
-            <a:r>
-              <a:rPr lang="en-US" dirty="0" smtClean="0"/>
-              <a:t>).</a:t>
-            </a:r>
-            <a:endParaRPr lang="en-US" dirty="0"/>
-          </a:p>
-          <a:p>
-            <a:r>
-              <a:rPr lang="en-US" dirty="0"/>
-              <a:t>Create the turtles (i.e., moving agents) with the function </a:t>
-            </a:r>
-            <a:r>
-              <a:rPr lang="en-US" sz="2100" b="1" u="sng" dirty="0" err="1"/>
-              <a:t>createTurtles</a:t>
-            </a:r>
-            <a:r>
-              <a:rPr lang="en-US" sz="2100" b="1" u="sng" dirty="0"/>
-              <a:t>()</a:t>
-            </a:r>
-            <a:r>
-              <a:rPr lang="en-US" dirty="0"/>
-              <a:t>. </a:t>
-            </a:r>
-            <a:r>
-              <a:rPr lang="en-US" dirty="0" smtClean="0"/>
-              <a:t>Visualize </a:t>
-            </a:r>
-            <a:r>
-              <a:rPr lang="en-US" dirty="0"/>
-              <a:t>the turtles by plotting them on the world with </a:t>
-            </a:r>
-            <a:r>
-              <a:rPr lang="en-US" dirty="0" smtClean="0"/>
-              <a:t>points(</a:t>
-            </a:r>
-            <a:r>
-              <a:rPr lang="en-US" dirty="0" err="1" smtClean="0"/>
-              <a:t>nameTurtles</a:t>
-            </a:r>
-            <a:r>
-              <a:rPr lang="en-US" dirty="0" smtClean="0"/>
-              <a:t>).</a:t>
-            </a:r>
-            <a:endParaRPr lang="en-US" dirty="0"/>
-          </a:p>
-          <a:p>
-            <a:r>
-              <a:rPr lang="en-US" sz="2100" b="1" u="sng" dirty="0"/>
-              <a:t>Create the different </a:t>
-            </a:r>
-            <a:r>
-              <a:rPr lang="en-US" sz="2100" b="1" u="sng" dirty="0" smtClean="0"/>
-              <a:t>processes </a:t>
-            </a:r>
-            <a:r>
-              <a:rPr lang="en-US" dirty="0" smtClean="0"/>
-              <a:t>(i.e</a:t>
-            </a:r>
-            <a:r>
-              <a:rPr lang="en-US" dirty="0"/>
-              <a:t>., functions affecting the </a:t>
-            </a:r>
-            <a:r>
-              <a:rPr lang="en-US" dirty="0" smtClean="0"/>
-              <a:t>patches and/or turtles) </a:t>
-            </a:r>
-            <a:r>
-              <a:rPr lang="en-US" dirty="0"/>
-              <a:t>by using the </a:t>
-            </a:r>
-            <a:r>
-              <a:rPr lang="en-US" dirty="0" err="1"/>
-              <a:t>NetLogoR</a:t>
-            </a:r>
-            <a:r>
-              <a:rPr lang="en-US" dirty="0"/>
-              <a:t> functions, the R functions or some from other packages</a:t>
-            </a:r>
-            <a:r>
-              <a:rPr lang="en-US" dirty="0" smtClean="0"/>
-              <a:t>.</a:t>
-            </a:r>
-          </a:p>
-          <a:p>
-            <a:r>
-              <a:rPr lang="en-US" dirty="0" smtClean="0"/>
-              <a:t>Don’t hesitate to use </a:t>
-            </a:r>
-            <a:r>
-              <a:rPr lang="en-US" sz="2100" b="1" u="sng" dirty="0" smtClean="0"/>
-              <a:t>help()</a:t>
-            </a:r>
-            <a:r>
-              <a:rPr lang="en-US" sz="2100" dirty="0" smtClean="0"/>
-              <a:t> </a:t>
-            </a:r>
-            <a:r>
-              <a:rPr lang="en-US" dirty="0" smtClean="0"/>
-              <a:t>to understand how </a:t>
-            </a:r>
-            <a:r>
-              <a:rPr lang="en-US" dirty="0" err="1" smtClean="0"/>
-              <a:t>NetLogoR</a:t>
-            </a:r>
-            <a:r>
-              <a:rPr lang="en-US" dirty="0" smtClean="0"/>
-              <a:t> functions and their arguments work. Don’t hesitate to look at the </a:t>
-            </a:r>
-            <a:r>
-              <a:rPr lang="en-US" sz="2100" b="1" u="sng" dirty="0" smtClean="0"/>
-              <a:t>list of </a:t>
-            </a:r>
-            <a:r>
-              <a:rPr lang="en-US" sz="2100" b="1" u="sng" dirty="0" err="1" smtClean="0"/>
-              <a:t>NetLogoR</a:t>
-            </a:r>
-            <a:r>
-              <a:rPr lang="en-US" sz="2100" b="1" u="sng" dirty="0" smtClean="0"/>
-              <a:t> functions </a:t>
-            </a:r>
-            <a:r>
-              <a:rPr lang="en-US" dirty="0" smtClean="0"/>
-              <a:t>to find a function which already does what you want to do.</a:t>
-            </a:r>
-            <a:endParaRPr lang="en-US" dirty="0"/>
-          </a:p>
-          <a:p>
-            <a:r>
-              <a:rPr lang="en-US" sz="2100" b="1" u="sng" dirty="0" smtClean="0"/>
-              <a:t>Test</a:t>
-            </a:r>
-            <a:r>
-              <a:rPr lang="en-US" sz="2100" dirty="0" smtClean="0"/>
-              <a:t> </a:t>
-            </a:r>
-            <a:r>
-              <a:rPr lang="en-US" dirty="0"/>
-              <a:t>the different </a:t>
-            </a:r>
-            <a:r>
-              <a:rPr lang="en-US" dirty="0" smtClean="0"/>
-              <a:t>processes individually </a:t>
-            </a:r>
-            <a:r>
-              <a:rPr lang="en-US" sz="2100" b="1" u="sng" dirty="0"/>
-              <a:t>with a small world and a few numbers of turtles </a:t>
-            </a:r>
-            <a:r>
-              <a:rPr lang="en-US" dirty="0"/>
-              <a:t>to make sure the code is doing what you want it to do</a:t>
-            </a:r>
-            <a:r>
-              <a:rPr lang="en-US" dirty="0" smtClean="0"/>
-              <a:t>.</a:t>
-            </a:r>
-          </a:p>
-          <a:p>
-            <a:r>
-              <a:rPr lang="en-US" sz="2100" b="1" u="sng" dirty="0" smtClean="0"/>
-              <a:t>Plot</a:t>
-            </a:r>
-            <a:r>
-              <a:rPr lang="en-US" sz="2100" dirty="0" smtClean="0"/>
-              <a:t> </a:t>
-            </a:r>
-            <a:r>
-              <a:rPr lang="en-US" dirty="0" smtClean="0"/>
-              <a:t>regularly to </a:t>
-            </a:r>
-            <a:r>
-              <a:rPr lang="en-US" dirty="0"/>
-              <a:t>make sure the code is doing what you want it to </a:t>
-            </a:r>
-            <a:r>
-              <a:rPr lang="en-US" dirty="0" smtClean="0"/>
-              <a:t>do. Visuals are of great help to spot bugs in model. Also </a:t>
-            </a:r>
-            <a:r>
-              <a:rPr lang="en-US" sz="2100" b="1" u="sng" dirty="0" smtClean="0"/>
-              <a:t>display </a:t>
-            </a:r>
-            <a:r>
-              <a:rPr lang="en-US" sz="2100" b="1" u="sng" dirty="0"/>
-              <a:t>elements</a:t>
-            </a:r>
-            <a:r>
-              <a:rPr lang="en-US" sz="2100" b="1" u="sng" dirty="0" smtClean="0"/>
-              <a:t> </a:t>
-            </a:r>
-            <a:r>
-              <a:rPr lang="en-US" dirty="0" smtClean="0"/>
-              <a:t>(what’s inside the world and the turtles objects) regularly.</a:t>
-            </a:r>
-          </a:p>
-          <a:p>
-            <a:r>
-              <a:rPr lang="en-US" dirty="0" smtClean="0"/>
-              <a:t>Then</a:t>
-            </a:r>
-            <a:r>
-              <a:rPr lang="en-US" dirty="0"/>
-              <a:t>, build the </a:t>
-            </a:r>
-            <a:r>
-              <a:rPr lang="en-US" sz="2100" b="1" u="sng" dirty="0"/>
-              <a:t>main procedure </a:t>
-            </a:r>
-            <a:r>
-              <a:rPr lang="en-US" dirty="0"/>
-              <a:t>for the </a:t>
-            </a:r>
-            <a:r>
-              <a:rPr lang="en-US" dirty="0" smtClean="0"/>
-              <a:t>model (e.g., with a for-loop </a:t>
-            </a:r>
-            <a:r>
-              <a:rPr lang="en-US" dirty="0"/>
-              <a:t>or a scheduler </a:t>
-            </a:r>
-            <a:r>
-              <a:rPr lang="en-US" dirty="0" smtClean="0"/>
-              <a:t>function). The </a:t>
-            </a:r>
-            <a:r>
-              <a:rPr lang="en-US" dirty="0"/>
-              <a:t>functions placed inside the for-loop or the scheduler function will be iterated the number of time steps defined. </a:t>
-            </a:r>
-            <a:endParaRPr lang="en-US" dirty="0" smtClean="0"/>
-          </a:p>
-          <a:p>
-            <a:r>
-              <a:rPr lang="en-US" dirty="0" smtClean="0"/>
-              <a:t>Create </a:t>
-            </a:r>
-            <a:r>
-              <a:rPr lang="en-US" sz="2100" b="1" u="sng" dirty="0" smtClean="0"/>
-              <a:t>test </a:t>
-            </a:r>
-            <a:r>
-              <a:rPr lang="en-US" sz="2100" b="1" u="sng" dirty="0"/>
-              <a:t>units </a:t>
-            </a:r>
-            <a:r>
-              <a:rPr lang="en-US" dirty="0"/>
-              <a:t>to </a:t>
-            </a:r>
-            <a:r>
-              <a:rPr lang="en-US" dirty="0" smtClean="0"/>
-              <a:t>check if there are some bugs and to </a:t>
-            </a:r>
-            <a:r>
-              <a:rPr lang="en-US" dirty="0"/>
-              <a:t>locate </a:t>
-            </a:r>
-            <a:r>
-              <a:rPr lang="en-US" dirty="0" smtClean="0"/>
-              <a:t>them easily. </a:t>
-            </a:r>
-            <a:r>
-              <a:rPr lang="en-US" dirty="0"/>
-              <a:t>Use </a:t>
-            </a:r>
-            <a:r>
-              <a:rPr lang="en-US" sz="2100" b="1" u="sng" dirty="0"/>
-              <a:t>browser() </a:t>
-            </a:r>
-            <a:r>
-              <a:rPr lang="en-US" dirty="0"/>
-              <a:t>when debugging</a:t>
-            </a:r>
-            <a:r>
-              <a:rPr lang="en-US" dirty="0" smtClean="0"/>
-              <a:t>.</a:t>
-            </a:r>
-          </a:p>
-          <a:p>
-            <a:r>
-              <a:rPr lang="en-US" sz="2100" b="1" u="sng" dirty="0" smtClean="0"/>
-              <a:t>Visuals</a:t>
-            </a:r>
-            <a:r>
-              <a:rPr lang="en-US" sz="2100" dirty="0" smtClean="0"/>
-              <a:t> </a:t>
-            </a:r>
-            <a:r>
-              <a:rPr lang="en-US" dirty="0"/>
-              <a:t>can be </a:t>
-            </a:r>
-            <a:r>
-              <a:rPr lang="en-US" dirty="0" smtClean="0"/>
-              <a:t>plotted </a:t>
-            </a:r>
-            <a:r>
-              <a:rPr lang="en-US" dirty="0"/>
-              <a:t>at each time step and/or </a:t>
-            </a:r>
-            <a:r>
-              <a:rPr lang="en-US" dirty="0" smtClean="0"/>
-              <a:t>at </a:t>
-            </a:r>
-            <a:r>
-              <a:rPr lang="en-US" dirty="0"/>
-              <a:t>the end when the iterations are over. </a:t>
-            </a:r>
-            <a:r>
-              <a:rPr lang="en-US" dirty="0" smtClean="0"/>
-              <a:t>Plot </a:t>
-            </a:r>
-            <a:r>
-              <a:rPr lang="en-US" dirty="0"/>
-              <a:t>functions take time to be executed and </a:t>
-            </a:r>
-            <a:r>
-              <a:rPr lang="en-US" dirty="0" smtClean="0"/>
-              <a:t>slow </a:t>
-            </a:r>
-            <a:r>
-              <a:rPr lang="en-US" dirty="0"/>
-              <a:t>down the </a:t>
-            </a:r>
-            <a:r>
-              <a:rPr lang="en-US" dirty="0" smtClean="0"/>
-              <a:t>model but they are of great help.</a:t>
-            </a:r>
-            <a:endParaRPr lang="fr-CA" dirty="0"/>
-          </a:p>
-        </p:txBody>
-      </p:sp>
-    </p:spTree>
-    <p:extLst>
-      <p:ext uri="{BB962C8B-B14F-4D97-AF65-F5344CB8AC3E}">
-        <p14:creationId xmlns:p14="http://schemas.microsoft.com/office/powerpoint/2010/main" val="3318220563"/>
-      </p:ext>
-    </p:extLst>
-  </p:cSld>
-  <p:clrMapOvr>
-    <a:masterClrMapping/>
-  </p:clrMapOvr>
-  <p:timing>
-    <p:tnLst>
-      <p:par>
-        <p:cTn id="1" dur="indefinite" restart="never" nodeType="tmRoot"/>
-      </p:par>
-    </p:tnLst>
-  </p:timing>
-</p:sld>
-</file>
-
-<file path=ppt/slides/slide9.xml><?xml version="1.0" encoding="utf-8"?>
-<p:sld xmlns:a="http://schemas.openxmlformats.org/drawingml/2006/main" xmlns:r="http://schemas.openxmlformats.org/officeDocument/2006/relationships" xmlns:p="http://schemas.openxmlformats.org/presentationml/2006/main">
-  <p:cSld>
-    <p:spTree>
-      <p:nvGrpSpPr>
-        <p:cNvPr id="1" name=""/>
-        <p:cNvGrpSpPr/>
-        <p:nvPr/>
-      </p:nvGrpSpPr>
-      <p:grpSpPr>
-        <a:xfrm>
-          <a:off x="0" y="0"/>
-          <a:ext cx="0" cy="0"/>
-          <a:chOff x="0" y="0"/>
-          <a:chExt cx="0" cy="0"/>
-        </a:xfrm>
-      </p:grpSpPr>
-      <p:sp>
-        <p:nvSpPr>
           <p:cNvPr id="2" name="AutoShape 2" descr="http://127.0.0.1:17756/graphics/c33e102f-761f-4177-8c43-3cc7a660543c.png"/>
           <p:cNvSpPr>
             <a:spLocks noChangeAspect="1" noChangeArrowheads="1"/>
@@ -10332,40 +8802,6 @@
           <a:lstStyle/>
           <a:p>
             <a:endParaRPr lang="fr-FR"/>
-          </a:p>
-        </p:txBody>
-      </p:sp>
-      <p:sp>
-        <p:nvSpPr>
-          <p:cNvPr id="7" name="ZoneTexte 6"/>
-          <p:cNvSpPr txBox="1"/>
-          <p:nvPr/>
-        </p:nvSpPr>
-        <p:spPr>
-          <a:xfrm>
-            <a:off x="124358" y="103743"/>
-            <a:ext cx="1712328" cy="369332"/>
-          </a:xfrm>
-          <a:prstGeom prst="rect">
-            <a:avLst/>
-          </a:prstGeom>
-          <a:noFill/>
-        </p:spPr>
-        <p:txBody>
-          <a:bodyPr wrap="none" rtlCol="0">
-            <a:spAutoFit/>
-          </a:bodyPr>
-          <a:lstStyle/>
-          <a:p>
-            <a:r>
-              <a:rPr lang="fr-CA" dirty="0" err="1" smtClean="0"/>
-              <a:t>set.seed</a:t>
-            </a:r>
-            <a:r>
-              <a:rPr lang="fr-CA" dirty="0" smtClean="0"/>
-              <a:t>(1234)</a:t>
-            </a:r>
-            <a:endParaRPr lang="fr-FR" dirty="0"/>
           </a:p>
         </p:txBody>
       </p:sp>

</xml_diff>